<commit_message>
added info to the KL vs CE slide
</commit_message>
<xml_diff>
--- a/umap/UMAP.pptx
+++ b/umap/UMAP.pptx
@@ -14710,7 +14710,7 @@
             </p:nvSpPr>
             <p:spPr>
               <a:xfrm>
-                <a:off x="423423" y="1717505"/>
+                <a:off x="416933" y="2167140"/>
                 <a:ext cx="5383491" cy="3693842"/>
               </a:xfrm>
             </p:spPr>
@@ -14730,7 +14730,7 @@
                 <a14:m>
                   <m:oMath xmlns:m="http://schemas.openxmlformats.org/officeDocument/2006/math">
                     <m:r>
-                      <a:rPr lang="it-IT" sz="1800" i="1" smtClean="0">
+                      <a:rPr lang="it-IT" sz="1600" i="1" smtClean="0">
                         <a:effectLst/>
                         <a:latin typeface="Cambria Math" panose="02040503050406030204" pitchFamily="18" charset="0"/>
                         <a:ea typeface="Times New Roman" panose="02020603050405020304" pitchFamily="18" charset="0"/>
@@ -14741,7 +14741,7 @@
                     <m:d>
                       <m:dPr>
                         <m:ctrlPr>
-                          <a:rPr lang="it-IT" sz="1200" i="1">
+                          <a:rPr lang="it-IT" sz="1600" i="1">
                             <a:effectLst/>
                             <a:latin typeface="Cambria Math" panose="02040503050406030204" pitchFamily="18" charset="0"/>
                             <a:ea typeface="Times New Roman" panose="02020603050405020304" pitchFamily="18" charset="0"/>
@@ -14750,7 +14750,7 @@
                       </m:dPr>
                       <m:e>
                         <m:r>
-                          <a:rPr lang="it-IT" sz="1800" i="1">
+                          <a:rPr lang="it-IT" sz="1600" i="1">
                             <a:effectLst/>
                             <a:latin typeface="Cambria Math" panose="02040503050406030204" pitchFamily="18" charset="0"/>
                             <a:ea typeface="Times New Roman" panose="02020603050405020304" pitchFamily="18" charset="0"/>
@@ -14759,7 +14759,7 @@
                           <m:t>𝑋</m:t>
                         </m:r>
                         <m:r>
-                          <a:rPr lang="it-IT" sz="1800" i="1">
+                          <a:rPr lang="it-IT" sz="1600" i="1">
                             <a:effectLst/>
                             <a:latin typeface="Cambria Math" panose="02040503050406030204" pitchFamily="18" charset="0"/>
                             <a:ea typeface="Times New Roman" panose="02020603050405020304" pitchFamily="18" charset="0"/>
@@ -14768,7 +14768,7 @@
                           <m:t>,</m:t>
                         </m:r>
                         <m:r>
-                          <a:rPr lang="it-IT" sz="1800" i="1">
+                          <a:rPr lang="it-IT" sz="1600" i="1">
                             <a:effectLst/>
                             <a:latin typeface="Cambria Math" panose="02040503050406030204" pitchFamily="18" charset="0"/>
                             <a:ea typeface="Times New Roman" panose="02020603050405020304" pitchFamily="18" charset="0"/>
@@ -14779,7 +14779,7 @@
                       </m:e>
                     </m:d>
                     <m:r>
-                      <a:rPr lang="it-IT" sz="1800" i="1">
+                      <a:rPr lang="it-IT" sz="1600" i="1">
                         <a:effectLst/>
                         <a:latin typeface="Cambria Math" panose="02040503050406030204" pitchFamily="18" charset="0"/>
                         <a:ea typeface="Times New Roman" panose="02020603050405020304" pitchFamily="18" charset="0"/>
@@ -14788,7 +14788,7 @@
                       <m:t>=</m:t>
                     </m:r>
                     <m:r>
-                      <a:rPr lang="it-IT" sz="1800" i="1">
+                      <a:rPr lang="it-IT" sz="1600" i="1">
                         <a:effectLst/>
                         <a:latin typeface="Cambria Math" panose="02040503050406030204" pitchFamily="18" charset="0"/>
                         <a:ea typeface="Times New Roman" panose="02020603050405020304" pitchFamily="18" charset="0"/>
@@ -14799,7 +14799,7 @@
                     <m:d>
                       <m:dPr>
                         <m:ctrlPr>
-                          <a:rPr lang="it-IT" sz="1200" i="1">
+                          <a:rPr lang="it-IT" sz="1600" i="1">
                             <a:effectLst/>
                             <a:latin typeface="Cambria Math" panose="02040503050406030204" pitchFamily="18" charset="0"/>
                             <a:ea typeface="Times New Roman" panose="02020603050405020304" pitchFamily="18" charset="0"/>
@@ -14808,7 +14808,7 @@
                       </m:dPr>
                       <m:e>
                         <m:r>
-                          <a:rPr lang="it-IT" sz="1800" i="1">
+                          <a:rPr lang="it-IT" sz="1600" i="1">
                             <a:effectLst/>
                             <a:latin typeface="Cambria Math" panose="02040503050406030204" pitchFamily="18" charset="0"/>
                             <a:ea typeface="Times New Roman" panose="02020603050405020304" pitchFamily="18" charset="0"/>
@@ -14821,7 +14821,7 @@
                     <m:func>
                       <m:funcPr>
                         <m:ctrlPr>
-                          <a:rPr lang="it-IT" sz="1200" i="1">
+                          <a:rPr lang="it-IT" sz="1600" i="1">
                             <a:effectLst/>
                             <a:latin typeface="Cambria Math" panose="02040503050406030204" pitchFamily="18" charset="0"/>
                             <a:ea typeface="Times New Roman" panose="02020603050405020304" pitchFamily="18" charset="0"/>
@@ -14833,7 +14833,7 @@
                           <m:rPr>
                             <m:sty m:val="p"/>
                           </m:rPr>
-                          <a:rPr lang="it-IT" sz="1800">
+                          <a:rPr lang="it-IT" sz="1600">
                             <a:effectLst/>
                             <a:latin typeface="Cambria Math" panose="02040503050406030204" pitchFamily="18" charset="0"/>
                             <a:ea typeface="Times New Roman" panose="02020603050405020304" pitchFamily="18" charset="0"/>
@@ -14846,7 +14846,7 @@
                         <m:f>
                           <m:fPr>
                             <m:ctrlPr>
-                              <a:rPr lang="it-IT" sz="1200" i="1">
+                              <a:rPr lang="it-IT" sz="1600" i="1">
                                 <a:effectLst/>
                                 <a:latin typeface="Cambria Math" panose="02040503050406030204" pitchFamily="18" charset="0"/>
                                 <a:ea typeface="Times New Roman" panose="02020603050405020304" pitchFamily="18" charset="0"/>
@@ -14855,7 +14855,7 @@
                           </m:fPr>
                           <m:num>
                             <m:r>
-                              <a:rPr lang="it-IT" sz="1800" i="1">
+                              <a:rPr lang="it-IT" sz="1600" i="1">
                                 <a:effectLst/>
                                 <a:latin typeface="Cambria Math" panose="02040503050406030204" pitchFamily="18" charset="0"/>
                                 <a:ea typeface="Times New Roman" panose="02020603050405020304" pitchFamily="18" charset="0"/>
@@ -14866,7 +14866,7 @@
                             <m:d>
                               <m:dPr>
                                 <m:ctrlPr>
-                                  <a:rPr lang="it-IT" sz="1200" i="1">
+                                  <a:rPr lang="it-IT" sz="1600" i="1">
                                     <a:effectLst/>
                                     <a:latin typeface="Cambria Math" panose="02040503050406030204" pitchFamily="18" charset="0"/>
                                     <a:ea typeface="Times New Roman" panose="02020603050405020304" pitchFamily="18" charset="0"/>
@@ -14875,7 +14875,7 @@
                               </m:dPr>
                               <m:e>
                                 <m:r>
-                                  <a:rPr lang="it-IT" sz="1800" i="1">
+                                  <a:rPr lang="it-IT" sz="1600" i="1">
                                     <a:effectLst/>
                                     <a:latin typeface="Cambria Math" panose="02040503050406030204" pitchFamily="18" charset="0"/>
                                     <a:ea typeface="Times New Roman" panose="02020603050405020304" pitchFamily="18" charset="0"/>
@@ -14888,7 +14888,7 @@
                           </m:num>
                           <m:den>
                             <m:r>
-                              <a:rPr lang="it-IT" sz="1800" i="1">
+                              <a:rPr lang="it-IT" sz="1600" i="1">
                                 <a:effectLst/>
                                 <a:latin typeface="Cambria Math" panose="02040503050406030204" pitchFamily="18" charset="0"/>
                                 <a:ea typeface="Times New Roman" panose="02020603050405020304" pitchFamily="18" charset="0"/>
@@ -14899,7 +14899,7 @@
                             <m:d>
                               <m:dPr>
                                 <m:ctrlPr>
-                                  <a:rPr lang="it-IT" sz="1200" i="1">
+                                  <a:rPr lang="it-IT" sz="1600" i="1">
                                     <a:effectLst/>
                                     <a:latin typeface="Cambria Math" panose="02040503050406030204" pitchFamily="18" charset="0"/>
                                     <a:ea typeface="Times New Roman" panose="02020603050405020304" pitchFamily="18" charset="0"/>
@@ -14908,7 +14908,7 @@
                               </m:dPr>
                               <m:e>
                                 <m:r>
-                                  <a:rPr lang="it-IT" sz="1800" i="1">
+                                  <a:rPr lang="it-IT" sz="1600" i="1">
                                     <a:effectLst/>
                                     <a:latin typeface="Cambria Math" panose="02040503050406030204" pitchFamily="18" charset="0"/>
                                     <a:ea typeface="Times New Roman" panose="02020603050405020304" pitchFamily="18" charset="0"/>
@@ -14923,7 +14923,7 @@
                       </m:e>
                     </m:func>
                     <m:r>
-                      <a:rPr lang="it-IT" sz="1800" i="1">
+                      <a:rPr lang="it-IT" sz="1600" i="1">
                         <a:effectLst/>
                         <a:latin typeface="Cambria Math" panose="02040503050406030204" pitchFamily="18" charset="0"/>
                         <a:ea typeface="Times New Roman" panose="02020603050405020304" pitchFamily="18" charset="0"/>
@@ -14932,7 +14932,7 @@
                       <m:t>=</m:t>
                     </m:r>
                     <m:r>
-                      <a:rPr lang="it-IT" sz="1800" i="1">
+                      <a:rPr lang="it-IT" sz="1600" i="1">
                         <a:effectLst/>
                         <a:latin typeface="Cambria Math" panose="02040503050406030204" pitchFamily="18" charset="0"/>
                         <a:ea typeface="Times New Roman" panose="02020603050405020304" pitchFamily="18" charset="0"/>
@@ -14943,7 +14943,7 @@
                     <m:d>
                       <m:dPr>
                         <m:ctrlPr>
-                          <a:rPr lang="it-IT" sz="1200" i="1">
+                          <a:rPr lang="it-IT" sz="1600" i="1">
                             <a:effectLst/>
                             <a:latin typeface="Cambria Math" panose="02040503050406030204" pitchFamily="18" charset="0"/>
                             <a:ea typeface="Times New Roman" panose="02020603050405020304" pitchFamily="18" charset="0"/>
@@ -14952,7 +14952,7 @@
                       </m:dPr>
                       <m:e>
                         <m:r>
-                          <a:rPr lang="it-IT" sz="1800" i="1">
+                          <a:rPr lang="it-IT" sz="1600" i="1">
                             <a:effectLst/>
                             <a:latin typeface="Cambria Math" panose="02040503050406030204" pitchFamily="18" charset="0"/>
                             <a:ea typeface="Times New Roman" panose="02020603050405020304" pitchFamily="18" charset="0"/>
@@ -14965,7 +14965,7 @@
                     <m:func>
                       <m:funcPr>
                         <m:ctrlPr>
-                          <a:rPr lang="it-IT" sz="1200" i="1">
+                          <a:rPr lang="it-IT" sz="1600" i="1">
                             <a:effectLst/>
                             <a:latin typeface="Cambria Math" panose="02040503050406030204" pitchFamily="18" charset="0"/>
                             <a:ea typeface="Times New Roman" panose="02020603050405020304" pitchFamily="18" charset="0"/>
@@ -14977,7 +14977,7 @@
                           <m:rPr>
                             <m:sty m:val="p"/>
                           </m:rPr>
-                          <a:rPr lang="it-IT" sz="1800">
+                          <a:rPr lang="it-IT" sz="1600">
                             <a:effectLst/>
                             <a:latin typeface="Cambria Math" panose="02040503050406030204" pitchFamily="18" charset="0"/>
                             <a:ea typeface="Times New Roman" panose="02020603050405020304" pitchFamily="18" charset="0"/>
@@ -14988,7 +14988,7 @@
                       </m:fName>
                       <m:e>
                         <m:r>
-                          <a:rPr lang="it-IT" sz="1800" i="1">
+                          <a:rPr lang="it-IT" sz="1600" i="1">
                             <a:effectLst/>
                             <a:latin typeface="Cambria Math" panose="02040503050406030204" pitchFamily="18" charset="0"/>
                             <a:ea typeface="Times New Roman" panose="02020603050405020304" pitchFamily="18" charset="0"/>
@@ -14999,7 +14999,7 @@
                         <m:d>
                           <m:dPr>
                             <m:ctrlPr>
-                              <a:rPr lang="it-IT" sz="1200" i="1">
+                              <a:rPr lang="it-IT" sz="1600" i="1">
                                 <a:effectLst/>
                                 <a:latin typeface="Cambria Math" panose="02040503050406030204" pitchFamily="18" charset="0"/>
                                 <a:ea typeface="Times New Roman" panose="02020603050405020304" pitchFamily="18" charset="0"/>
@@ -15008,7 +15008,7 @@
                           </m:dPr>
                           <m:e>
                             <m:r>
-                              <a:rPr lang="it-IT" sz="1800" i="1">
+                              <a:rPr lang="it-IT" sz="1600" i="1">
                                 <a:effectLst/>
                                 <a:latin typeface="Cambria Math" panose="02040503050406030204" pitchFamily="18" charset="0"/>
                                 <a:ea typeface="Times New Roman" panose="02020603050405020304" pitchFamily="18" charset="0"/>
@@ -15021,7 +15021,7 @@
                       </m:e>
                     </m:func>
                     <m:r>
-                      <a:rPr lang="it-IT" sz="1800" i="1">
+                      <a:rPr lang="it-IT" sz="1600" i="1">
                         <a:effectLst/>
                         <a:latin typeface="Cambria Math" panose="02040503050406030204" pitchFamily="18" charset="0"/>
                         <a:ea typeface="Times New Roman" panose="02020603050405020304" pitchFamily="18" charset="0"/>
@@ -15030,7 +15030,7 @@
                       <m:t>−</m:t>
                     </m:r>
                     <m:r>
-                      <a:rPr lang="it-IT" sz="1800" i="1">
+                      <a:rPr lang="it-IT" sz="1600" i="1">
                         <a:effectLst/>
                         <a:latin typeface="Cambria Math" panose="02040503050406030204" pitchFamily="18" charset="0"/>
                         <a:ea typeface="Times New Roman" panose="02020603050405020304" pitchFamily="18" charset="0"/>
@@ -15041,7 +15041,7 @@
                     <m:d>
                       <m:dPr>
                         <m:ctrlPr>
-                          <a:rPr lang="it-IT" sz="1200" i="1">
+                          <a:rPr lang="it-IT" sz="1600" i="1">
                             <a:effectLst/>
                             <a:latin typeface="Cambria Math" panose="02040503050406030204" pitchFamily="18" charset="0"/>
                             <a:ea typeface="Times New Roman" panose="02020603050405020304" pitchFamily="18" charset="0"/>
@@ -15050,7 +15050,7 @@
                       </m:dPr>
                       <m:e>
                         <m:r>
-                          <a:rPr lang="it-IT" sz="1800" i="1">
+                          <a:rPr lang="it-IT" sz="1600" i="1">
                             <a:effectLst/>
                             <a:latin typeface="Cambria Math" panose="02040503050406030204" pitchFamily="18" charset="0"/>
                             <a:ea typeface="Times New Roman" panose="02020603050405020304" pitchFamily="18" charset="0"/>
@@ -15063,7 +15063,7 @@
                     <m:func>
                       <m:funcPr>
                         <m:ctrlPr>
-                          <a:rPr lang="it-IT" sz="1200" i="1">
+                          <a:rPr lang="it-IT" sz="1600" i="1">
                             <a:effectLst/>
                             <a:latin typeface="Cambria Math" panose="02040503050406030204" pitchFamily="18" charset="0"/>
                             <a:ea typeface="Times New Roman" panose="02020603050405020304" pitchFamily="18" charset="0"/>
@@ -15075,7 +15075,7 @@
                           <m:rPr>
                             <m:sty m:val="p"/>
                           </m:rPr>
-                          <a:rPr lang="it-IT" sz="1800">
+                          <a:rPr lang="it-IT" sz="1600">
                             <a:effectLst/>
                             <a:latin typeface="Cambria Math" panose="02040503050406030204" pitchFamily="18" charset="0"/>
                             <a:ea typeface="Times New Roman" panose="02020603050405020304" pitchFamily="18" charset="0"/>
@@ -15086,7 +15086,7 @@
                       </m:fName>
                       <m:e>
                         <m:r>
-                          <a:rPr lang="it-IT" sz="1800" i="1">
+                          <a:rPr lang="it-IT" sz="1600" i="1">
                             <a:effectLst/>
                             <a:latin typeface="Cambria Math" panose="02040503050406030204" pitchFamily="18" charset="0"/>
                             <a:ea typeface="Times New Roman" panose="02020603050405020304" pitchFamily="18" charset="0"/>
@@ -15097,7 +15097,7 @@
                         <m:d>
                           <m:dPr>
                             <m:ctrlPr>
-                              <a:rPr lang="it-IT" sz="1200" i="1">
+                              <a:rPr lang="it-IT" sz="1600" i="1">
                                 <a:effectLst/>
                                 <a:latin typeface="Cambria Math" panose="02040503050406030204" pitchFamily="18" charset="0"/>
                                 <a:ea typeface="Times New Roman" panose="02020603050405020304" pitchFamily="18" charset="0"/>
@@ -15106,7 +15106,7 @@
                           </m:dPr>
                           <m:e>
                             <m:r>
-                              <a:rPr lang="it-IT" sz="1800" i="1">
+                              <a:rPr lang="it-IT" sz="1600" i="1">
                                 <a:effectLst/>
                                 <a:latin typeface="Cambria Math" panose="02040503050406030204" pitchFamily="18" charset="0"/>
                                 <a:ea typeface="Times New Roman" panose="02020603050405020304" pitchFamily="18" charset="0"/>
@@ -15121,7 +15121,7 @@
                   </m:oMath>
                 </a14:m>
                 <a:r>
-                  <a:rPr lang="it-IT" sz="1800" dirty="0">
+                  <a:rPr lang="it-IT" sz="1600" dirty="0">
                     <a:effectLst/>
                     <a:latin typeface="Calibri" panose="020F0502020204030204" pitchFamily="34" charset="0"/>
                     <a:ea typeface="Times New Roman" panose="02020603050405020304" pitchFamily="18" charset="0"/>
@@ -15129,7 +15129,7 @@
                   </a:rPr>
                   <a:t> </a:t>
                 </a:r>
-                <a:endParaRPr lang="it-IT" sz="1800" dirty="0">
+                <a:endParaRPr lang="it-IT" sz="1600" dirty="0">
                   <a:latin typeface="Calibri" panose="020F0502020204030204" pitchFamily="34" charset="0"/>
                   <a:ea typeface="Times New Roman" panose="02020603050405020304" pitchFamily="18" charset="0"/>
                   <a:cs typeface="Times New Roman" panose="02020603050405020304" pitchFamily="18" charset="0"/>
@@ -15152,7 +15152,7 @@
                     </m:oMathParaPr>
                     <m:oMath xmlns:m="http://schemas.openxmlformats.org/officeDocument/2006/math">
                       <m:r>
-                        <a:rPr lang="it-IT" sz="1800" smtClean="0">
+                        <a:rPr lang="it-IT" sz="1600" smtClean="0">
                           <a:effectLst/>
                           <a:latin typeface="Cambria Math" panose="02040503050406030204" pitchFamily="18" charset="0"/>
                           <a:ea typeface="Times New Roman" panose="02020603050405020304" pitchFamily="18" charset="0"/>
@@ -15161,7 +15161,7 @@
                         <m:t>≈</m:t>
                       </m:r>
                       <m:r>
-                        <a:rPr lang="it-IT" sz="1800" i="1">
+                        <a:rPr lang="it-IT" sz="1600" i="1">
                           <a:effectLst/>
                           <a:latin typeface="Cambria Math" panose="02040503050406030204" pitchFamily="18" charset="0"/>
                           <a:ea typeface="Times New Roman" panose="02020603050405020304" pitchFamily="18" charset="0"/>
@@ -15170,7 +15170,7 @@
                         <m:t>−</m:t>
                       </m:r>
                       <m:r>
-                        <a:rPr lang="it-IT" sz="1800" i="1">
+                        <a:rPr lang="it-IT" sz="1600" i="1">
                           <a:effectLst/>
                           <a:latin typeface="Cambria Math" panose="02040503050406030204" pitchFamily="18" charset="0"/>
                           <a:ea typeface="Times New Roman" panose="02020603050405020304" pitchFamily="18" charset="0"/>
@@ -15181,7 +15181,7 @@
                       <m:d>
                         <m:dPr>
                           <m:ctrlPr>
-                            <a:rPr lang="it-IT" sz="1800" i="1">
+                            <a:rPr lang="it-IT" sz="1600" i="1">
                               <a:effectLst/>
                               <a:latin typeface="Cambria Math" panose="02040503050406030204" pitchFamily="18" charset="0"/>
                               <a:ea typeface="Times New Roman" panose="02020603050405020304" pitchFamily="18" charset="0"/>
@@ -15191,7 +15191,7 @@
                         </m:dPr>
                         <m:e>
                           <m:r>
-                            <a:rPr lang="it-IT" sz="1800" i="1">
+                            <a:rPr lang="it-IT" sz="1600" i="1">
                               <a:effectLst/>
                               <a:latin typeface="Cambria Math" panose="02040503050406030204" pitchFamily="18" charset="0"/>
                               <a:ea typeface="Times New Roman" panose="02020603050405020304" pitchFamily="18" charset="0"/>
@@ -15204,7 +15204,7 @@
                       <m:func>
                         <m:funcPr>
                           <m:ctrlPr>
-                            <a:rPr lang="it-IT" sz="1800" i="1">
+                            <a:rPr lang="it-IT" sz="1600" i="1">
                               <a:effectLst/>
                               <a:latin typeface="Cambria Math" panose="02040503050406030204" pitchFamily="18" charset="0"/>
                               <a:ea typeface="Times New Roman" panose="02020603050405020304" pitchFamily="18" charset="0"/>
@@ -15217,7 +15217,7 @@
                             <m:rPr>
                               <m:sty m:val="p"/>
                             </m:rPr>
-                            <a:rPr lang="it-IT" sz="1800">
+                            <a:rPr lang="it-IT" sz="1600">
                               <a:effectLst/>
                               <a:latin typeface="Cambria Math" panose="02040503050406030204" pitchFamily="18" charset="0"/>
                               <a:ea typeface="Times New Roman" panose="02020603050405020304" pitchFamily="18" charset="0"/>
@@ -15228,7 +15228,7 @@
                         </m:fName>
                         <m:e>
                           <m:r>
-                            <a:rPr lang="it-IT" sz="1800" i="1">
+                            <a:rPr lang="it-IT" sz="1600" i="1">
                               <a:effectLst/>
                               <a:latin typeface="Cambria Math" panose="02040503050406030204" pitchFamily="18" charset="0"/>
                               <a:ea typeface="Times New Roman" panose="02020603050405020304" pitchFamily="18" charset="0"/>
@@ -15239,7 +15239,7 @@
                           <m:d>
                             <m:dPr>
                               <m:ctrlPr>
-                                <a:rPr lang="it-IT" sz="1800" i="1">
+                                <a:rPr lang="it-IT" sz="1600" i="1">
                                   <a:effectLst/>
                                   <a:latin typeface="Cambria Math" panose="02040503050406030204" pitchFamily="18" charset="0"/>
                                   <a:ea typeface="Times New Roman" panose="02020603050405020304" pitchFamily="18" charset="0"/>
@@ -15249,7 +15249,7 @@
                             </m:dPr>
                             <m:e>
                               <m:r>
-                                <a:rPr lang="it-IT" sz="1800" i="1">
+                                <a:rPr lang="it-IT" sz="1600" i="1">
                                   <a:effectLst/>
                                   <a:latin typeface="Cambria Math" panose="02040503050406030204" pitchFamily="18" charset="0"/>
                                   <a:ea typeface="Times New Roman" panose="02020603050405020304" pitchFamily="18" charset="0"/>
@@ -15262,7 +15262,7 @@
                         </m:e>
                       </m:func>
                       <m:r>
-                        <a:rPr lang="it-IT" sz="1800" i="1">
+                        <a:rPr lang="it-IT" sz="1600" i="1">
                           <a:effectLst/>
                           <a:latin typeface="Cambria Math" panose="02040503050406030204" pitchFamily="18" charset="0"/>
                           <a:ea typeface="Times New Roman" panose="02020603050405020304" pitchFamily="18" charset="0"/>
@@ -15273,7 +15273,7 @@
                       <m:sSup>
                         <m:sSupPr>
                           <m:ctrlPr>
-                            <a:rPr lang="it-IT" sz="1800" i="1">
+                            <a:rPr lang="it-IT" sz="1600" i="1">
                               <a:effectLst/>
                               <a:latin typeface="Cambria Math" panose="02040503050406030204" pitchFamily="18" charset="0"/>
                               <a:ea typeface="Times New Roman" panose="02020603050405020304" pitchFamily="18" charset="0"/>
@@ -15283,7 +15283,7 @@
                         </m:sSupPr>
                         <m:e>
                           <m:r>
-                            <a:rPr lang="it-IT" sz="1800" i="1">
+                            <a:rPr lang="it-IT" sz="1600" i="1">
                               <a:effectLst/>
                               <a:latin typeface="Cambria Math" panose="02040503050406030204" pitchFamily="18" charset="0"/>
                               <a:ea typeface="Times New Roman" panose="02020603050405020304" pitchFamily="18" charset="0"/>
@@ -15294,7 +15294,7 @@
                         </m:e>
                         <m:sup>
                           <m:r>
-                            <a:rPr lang="it-IT" sz="1800" i="1">
+                            <a:rPr lang="it-IT" sz="1600" i="1">
                               <a:effectLst/>
                               <a:latin typeface="Cambria Math" panose="02040503050406030204" pitchFamily="18" charset="0"/>
                               <a:ea typeface="Times New Roman" panose="02020603050405020304" pitchFamily="18" charset="0"/>
@@ -15305,7 +15305,7 @@
                           <m:sSup>
                             <m:sSupPr>
                               <m:ctrlPr>
-                                <a:rPr lang="it-IT" sz="1800" i="1">
+                                <a:rPr lang="it-IT" sz="1600" i="1">
                                   <a:effectLst/>
                                   <a:latin typeface="Cambria Math" panose="02040503050406030204" pitchFamily="18" charset="0"/>
                                   <a:ea typeface="Times New Roman" panose="02020603050405020304" pitchFamily="18" charset="0"/>
@@ -15315,7 +15315,7 @@
                             </m:sSupPr>
                             <m:e>
                               <m:r>
-                                <a:rPr lang="it-IT" sz="1800" i="1">
+                                <a:rPr lang="it-IT" sz="1600" i="1">
                                   <a:effectLst/>
                                   <a:latin typeface="Cambria Math" panose="02040503050406030204" pitchFamily="18" charset="0"/>
                                   <a:ea typeface="Times New Roman" panose="02020603050405020304" pitchFamily="18" charset="0"/>
@@ -15326,7 +15326,7 @@
                             </m:e>
                             <m:sup>
                               <m:r>
-                                <a:rPr lang="it-IT" sz="1800" i="1">
+                                <a:rPr lang="it-IT" sz="1600" i="1">
                                   <a:effectLst/>
                                   <a:latin typeface="Cambria Math" panose="02040503050406030204" pitchFamily="18" charset="0"/>
                                   <a:ea typeface="Times New Roman" panose="02020603050405020304" pitchFamily="18" charset="0"/>
@@ -15341,7 +15341,7 @@
                       <m:func>
                         <m:funcPr>
                           <m:ctrlPr>
-                            <a:rPr lang="it-IT" sz="1800" i="1">
+                            <a:rPr lang="it-IT" sz="1600" i="1">
                               <a:effectLst/>
                               <a:latin typeface="Cambria Math" panose="02040503050406030204" pitchFamily="18" charset="0"/>
                               <a:ea typeface="Times New Roman" panose="02020603050405020304" pitchFamily="18" charset="0"/>
@@ -15354,7 +15354,7 @@
                             <m:rPr>
                               <m:sty m:val="p"/>
                             </m:rPr>
-                            <a:rPr lang="it-IT" sz="1800">
+                            <a:rPr lang="it-IT" sz="1600">
                               <a:effectLst/>
                               <a:latin typeface="Cambria Math" panose="02040503050406030204" pitchFamily="18" charset="0"/>
                               <a:ea typeface="Times New Roman" panose="02020603050405020304" pitchFamily="18" charset="0"/>
@@ -15367,7 +15367,7 @@
                           <m:d>
                             <m:dPr>
                               <m:ctrlPr>
-                                <a:rPr lang="it-IT" sz="1800" i="1">
+                                <a:rPr lang="it-IT" sz="1600" i="1">
                                   <a:effectLst/>
                                   <a:latin typeface="Cambria Math" panose="02040503050406030204" pitchFamily="18" charset="0"/>
                                   <a:ea typeface="Times New Roman" panose="02020603050405020304" pitchFamily="18" charset="0"/>
@@ -15377,7 +15377,7 @@
                             </m:dPr>
                             <m:e>
                               <m:r>
-                                <a:rPr lang="it-IT" sz="1800" i="1">
+                                <a:rPr lang="it-IT" sz="1600" i="1">
                                   <a:effectLst/>
                                   <a:latin typeface="Cambria Math" panose="02040503050406030204" pitchFamily="18" charset="0"/>
                                   <a:ea typeface="Times New Roman" panose="02020603050405020304" pitchFamily="18" charset="0"/>
@@ -15388,7 +15388,7 @@
                               <m:sSup>
                                 <m:sSupPr>
                                   <m:ctrlPr>
-                                    <a:rPr lang="it-IT" sz="1800" i="1">
+                                    <a:rPr lang="it-IT" sz="1600" i="1">
                                       <a:effectLst/>
                                       <a:latin typeface="Cambria Math" panose="02040503050406030204" pitchFamily="18" charset="0"/>
                                       <a:ea typeface="Times New Roman" panose="02020603050405020304" pitchFamily="18" charset="0"/>
@@ -15398,7 +15398,7 @@
                                 </m:sSupPr>
                                 <m:e>
                                   <m:r>
-                                    <a:rPr lang="it-IT" sz="1800" i="1">
+                                    <a:rPr lang="it-IT" sz="1600" i="1">
                                       <a:effectLst/>
                                       <a:latin typeface="Cambria Math" panose="02040503050406030204" pitchFamily="18" charset="0"/>
                                       <a:ea typeface="Times New Roman" panose="02020603050405020304" pitchFamily="18" charset="0"/>
@@ -15409,7 +15409,7 @@
                                 </m:e>
                                 <m:sup>
                                   <m:r>
-                                    <a:rPr lang="it-IT" sz="1800" i="1">
+                                    <a:rPr lang="it-IT" sz="1600" i="1">
                                       <a:effectLst/>
                                       <a:latin typeface="Cambria Math" panose="02040503050406030204" pitchFamily="18" charset="0"/>
                                       <a:ea typeface="Times New Roman" panose="02020603050405020304" pitchFamily="18" charset="0"/>
@@ -15426,7 +15426,7 @@
                     </m:oMath>
                   </m:oMathPara>
                 </a14:m>
-                <a:endParaRPr lang="it-IT" sz="1800" dirty="0">
+                <a:endParaRPr lang="it-IT" sz="1600" dirty="0">
                   <a:effectLst/>
                   <a:latin typeface="Calibri" panose="020F0502020204030204" pitchFamily="34" charset="0"/>
                   <a:ea typeface="Calibri" panose="020F0502020204030204" pitchFamily="34" charset="0"/>
@@ -15450,7 +15450,7 @@
                     </m:oMathParaPr>
                     <m:oMath xmlns:m="http://schemas.openxmlformats.org/officeDocument/2006/math">
                       <m:r>
-                        <a:rPr lang="en-US" sz="1800" b="0" i="1" smtClean="0">
+                        <a:rPr lang="en-US" sz="1600" b="0" i="1" smtClean="0">
                           <a:effectLst/>
                           <a:latin typeface="Cambria Math" panose="02040503050406030204" pitchFamily="18" charset="0"/>
                           <a:ea typeface="Calibri" panose="020F0502020204030204" pitchFamily="34" charset="0"/>
@@ -15459,7 +15459,7 @@
                         <m:t>𝑋</m:t>
                       </m:r>
                       <m:r>
-                        <a:rPr lang="en-US" sz="1800" b="0" i="1" smtClean="0">
+                        <a:rPr lang="en-US" sz="1600" b="0" i="1" smtClean="0">
                           <a:effectLst/>
                           <a:latin typeface="Cambria Math" panose="02040503050406030204" pitchFamily="18" charset="0"/>
                           <a:ea typeface="Cambria Math" panose="02040503050406030204" pitchFamily="18" charset="0"/>
@@ -15468,7 +15468,7 @@
                         <m:t>→0:</m:t>
                       </m:r>
                       <m:r>
-                        <a:rPr lang="en-US" sz="1800" b="0" i="1" smtClean="0">
+                        <a:rPr lang="en-US" sz="1600" b="0" i="1" smtClean="0">
                           <a:effectLst/>
                           <a:latin typeface="Cambria Math" panose="02040503050406030204" pitchFamily="18" charset="0"/>
                           <a:ea typeface="Cambria Math" panose="02040503050406030204" pitchFamily="18" charset="0"/>
@@ -15479,7 +15479,7 @@
                       <m:d>
                         <m:dPr>
                           <m:ctrlPr>
-                            <a:rPr lang="en-US" sz="1800" b="0" i="1" smtClean="0">
+                            <a:rPr lang="en-US" sz="1600" b="0" i="1" smtClean="0">
                               <a:effectLst/>
                               <a:latin typeface="Cambria Math" panose="02040503050406030204" pitchFamily="18" charset="0"/>
                               <a:ea typeface="Cambria Math" panose="02040503050406030204" pitchFamily="18" charset="0"/>
@@ -15489,7 +15489,7 @@
                         </m:dPr>
                         <m:e>
                           <m:r>
-                            <a:rPr lang="en-US" sz="1800" b="0" i="1" smtClean="0">
+                            <a:rPr lang="en-US" sz="1600" b="0" i="1" smtClean="0">
                               <a:effectLst/>
                               <a:latin typeface="Cambria Math" panose="02040503050406030204" pitchFamily="18" charset="0"/>
                               <a:ea typeface="Cambria Math" panose="02040503050406030204" pitchFamily="18" charset="0"/>
@@ -15498,7 +15498,7 @@
                             <m:t>𝑋</m:t>
                           </m:r>
                           <m:r>
-                            <a:rPr lang="en-US" sz="1800" b="0" i="1" smtClean="0">
+                            <a:rPr lang="en-US" sz="1600" b="0" i="1" smtClean="0">
                               <a:effectLst/>
                               <a:latin typeface="Cambria Math" panose="02040503050406030204" pitchFamily="18" charset="0"/>
                               <a:ea typeface="Cambria Math" panose="02040503050406030204" pitchFamily="18" charset="0"/>
@@ -15507,7 +15507,7 @@
                             <m:t>,</m:t>
                           </m:r>
                           <m:r>
-                            <a:rPr lang="en-US" sz="1800" b="0" i="1" smtClean="0">
+                            <a:rPr lang="en-US" sz="1600" b="0" i="1" smtClean="0">
                               <a:effectLst/>
                               <a:latin typeface="Cambria Math" panose="02040503050406030204" pitchFamily="18" charset="0"/>
                               <a:ea typeface="Cambria Math" panose="02040503050406030204" pitchFamily="18" charset="0"/>
@@ -15518,7 +15518,7 @@
                         </m:e>
                       </m:d>
                       <m:r>
-                        <a:rPr lang="en-US" sz="1800" b="0" i="1" smtClean="0">
+                        <a:rPr lang="en-US" sz="1600" b="0" i="1" smtClean="0">
                           <a:effectLst/>
                           <a:latin typeface="Cambria Math" panose="02040503050406030204" pitchFamily="18" charset="0"/>
                           <a:ea typeface="Cambria Math" panose="02040503050406030204" pitchFamily="18" charset="0"/>
@@ -15529,7 +15529,7 @@
                       <m:func>
                         <m:funcPr>
                           <m:ctrlPr>
-                            <a:rPr lang="it-IT" sz="1800" i="1">
+                            <a:rPr lang="it-IT" sz="1600" i="1">
                               <a:latin typeface="Cambria Math" panose="02040503050406030204" pitchFamily="18" charset="0"/>
                               <a:ea typeface="Times New Roman" panose="02020603050405020304" pitchFamily="18" charset="0"/>
                               <a:cs typeface="Times New Roman" panose="02020603050405020304" pitchFamily="18" charset="0"/>
@@ -15541,7 +15541,7 @@
                             <m:rPr>
                               <m:sty m:val="p"/>
                             </m:rPr>
-                            <a:rPr lang="it-IT" sz="1800">
+                            <a:rPr lang="it-IT" sz="1600">
                               <a:latin typeface="Cambria Math" panose="02040503050406030204" pitchFamily="18" charset="0"/>
                               <a:ea typeface="Times New Roman" panose="02020603050405020304" pitchFamily="18" charset="0"/>
                               <a:cs typeface="Times New Roman" panose="02020603050405020304" pitchFamily="18" charset="0"/>
@@ -15553,7 +15553,7 @@
                           <m:d>
                             <m:dPr>
                               <m:ctrlPr>
-                                <a:rPr lang="it-IT" sz="1800" i="1">
+                                <a:rPr lang="it-IT" sz="1600" i="1">
                                   <a:latin typeface="Cambria Math" panose="02040503050406030204" pitchFamily="18" charset="0"/>
                                   <a:ea typeface="Times New Roman" panose="02020603050405020304" pitchFamily="18" charset="0"/>
                                   <a:cs typeface="Times New Roman" panose="02020603050405020304" pitchFamily="18" charset="0"/>
@@ -15562,7 +15562,7 @@
                             </m:dPr>
                             <m:e>
                               <m:r>
-                                <a:rPr lang="it-IT" sz="1800" i="1">
+                                <a:rPr lang="it-IT" sz="1600" i="1">
                                   <a:latin typeface="Cambria Math" panose="02040503050406030204" pitchFamily="18" charset="0"/>
                                   <a:ea typeface="Times New Roman" panose="02020603050405020304" pitchFamily="18" charset="0"/>
                                   <a:cs typeface="Times New Roman" panose="02020603050405020304" pitchFamily="18" charset="0"/>
@@ -15572,7 +15572,7 @@
                               <m:sSup>
                                 <m:sSupPr>
                                   <m:ctrlPr>
-                                    <a:rPr lang="it-IT" sz="1800" i="1">
+                                    <a:rPr lang="it-IT" sz="1600" i="1">
                                       <a:latin typeface="Cambria Math" panose="02040503050406030204" pitchFamily="18" charset="0"/>
                                       <a:ea typeface="Times New Roman" panose="02020603050405020304" pitchFamily="18" charset="0"/>
                                       <a:cs typeface="Times New Roman" panose="02020603050405020304" pitchFamily="18" charset="0"/>
@@ -15581,7 +15581,7 @@
                                 </m:sSupPr>
                                 <m:e>
                                   <m:r>
-                                    <a:rPr lang="it-IT" sz="1800" i="1">
+                                    <a:rPr lang="it-IT" sz="1600" i="1">
                                       <a:latin typeface="Cambria Math" panose="02040503050406030204" pitchFamily="18" charset="0"/>
                                       <a:ea typeface="Times New Roman" panose="02020603050405020304" pitchFamily="18" charset="0"/>
                                       <a:cs typeface="Times New Roman" panose="02020603050405020304" pitchFamily="18" charset="0"/>
@@ -15591,7 +15591,7 @@
                                 </m:e>
                                 <m:sup>
                                   <m:r>
-                                    <a:rPr lang="it-IT" sz="1800" i="1">
+                                    <a:rPr lang="it-IT" sz="1600" i="1">
                                       <a:latin typeface="Cambria Math" panose="02040503050406030204" pitchFamily="18" charset="0"/>
                                       <a:ea typeface="Times New Roman" panose="02020603050405020304" pitchFamily="18" charset="0"/>
                                       <a:cs typeface="Times New Roman" panose="02020603050405020304" pitchFamily="18" charset="0"/>
@@ -15607,7 +15607,7 @@
                     </m:oMath>
                   </m:oMathPara>
                 </a14:m>
-                <a:endParaRPr lang="it-IT" sz="1800" dirty="0">
+                <a:endParaRPr lang="it-IT" sz="1600" dirty="0">
                   <a:effectLst/>
                   <a:latin typeface="Calibri" panose="020F0502020204030204" pitchFamily="34" charset="0"/>
                   <a:ea typeface="Calibri" panose="020F0502020204030204" pitchFamily="34" charset="0"/>
@@ -15625,7 +15625,7 @@
                   <a:buNone/>
                 </a:pPr>
                 <a:r>
-                  <a:rPr lang="en-US" sz="1800" b="0" dirty="0">
+                  <a:rPr lang="en-US" sz="1600" b="0" dirty="0">
                     <a:effectLst/>
                     <a:ea typeface="Calibri" panose="020F0502020204030204" pitchFamily="34" charset="0"/>
                     <a:cs typeface="Times New Roman" panose="02020603050405020304" pitchFamily="18" charset="0"/>
@@ -15635,7 +15635,7 @@
                 <a14:m>
                   <m:oMath xmlns:m="http://schemas.openxmlformats.org/officeDocument/2006/math">
                     <m:r>
-                      <a:rPr lang="en-US" sz="1800" b="0" i="1" smtClean="0">
+                      <a:rPr lang="en-US" sz="1600" b="0" i="1" smtClean="0">
                         <a:effectLst/>
                         <a:latin typeface="Cambria Math" panose="02040503050406030204" pitchFamily="18" charset="0"/>
                         <a:ea typeface="Calibri" panose="020F0502020204030204" pitchFamily="34" charset="0"/>
@@ -15644,7 +15644,7 @@
                       <m:t>𝑌</m:t>
                     </m:r>
                     <m:r>
-                      <a:rPr lang="en-US" sz="1800" b="0" i="1" smtClean="0">
+                      <a:rPr lang="en-US" sz="1600" b="0" i="1" smtClean="0">
                         <a:effectLst/>
                         <a:latin typeface="Cambria Math" panose="02040503050406030204" pitchFamily="18" charset="0"/>
                         <a:ea typeface="Calibri" panose="020F0502020204030204" pitchFamily="34" charset="0"/>
@@ -15653,7 +15653,7 @@
                       <m:t> →0:</m:t>
                     </m:r>
                     <m:r>
-                      <a:rPr lang="en-US" sz="1800" b="0" i="1" smtClean="0">
+                      <a:rPr lang="en-US" sz="1600" b="0" i="1" smtClean="0">
                         <a:effectLst/>
                         <a:latin typeface="Cambria Math" panose="02040503050406030204" pitchFamily="18" charset="0"/>
                         <a:ea typeface="Cambria Math" panose="02040503050406030204" pitchFamily="18" charset="0"/>
@@ -15664,7 +15664,7 @@
                     <m:d>
                       <m:dPr>
                         <m:ctrlPr>
-                          <a:rPr lang="en-US" sz="1800" b="0" i="1" smtClean="0">
+                          <a:rPr lang="en-US" sz="1600" b="0" i="1" smtClean="0">
                             <a:effectLst/>
                             <a:latin typeface="Cambria Math" panose="02040503050406030204" pitchFamily="18" charset="0"/>
                             <a:ea typeface="Cambria Math" panose="02040503050406030204" pitchFamily="18" charset="0"/>
@@ -15674,7 +15674,7 @@
                       </m:dPr>
                       <m:e>
                         <m:r>
-                          <a:rPr lang="en-US" sz="1800" b="0" i="1" smtClean="0">
+                          <a:rPr lang="en-US" sz="1600" b="0" i="1" smtClean="0">
                             <a:effectLst/>
                             <a:latin typeface="Cambria Math" panose="02040503050406030204" pitchFamily="18" charset="0"/>
                             <a:ea typeface="Cambria Math" panose="02040503050406030204" pitchFamily="18" charset="0"/>
@@ -15683,7 +15683,7 @@
                           <m:t>𝑋</m:t>
                         </m:r>
                         <m:r>
-                          <a:rPr lang="en-US" sz="1800" b="0" i="1" smtClean="0">
+                          <a:rPr lang="en-US" sz="1600" b="0" i="1" smtClean="0">
                             <a:effectLst/>
                             <a:latin typeface="Cambria Math" panose="02040503050406030204" pitchFamily="18" charset="0"/>
                             <a:ea typeface="Cambria Math" panose="02040503050406030204" pitchFamily="18" charset="0"/>
@@ -15692,7 +15692,7 @@
                           <m:t>,</m:t>
                         </m:r>
                         <m:r>
-                          <a:rPr lang="en-US" sz="1800" b="0" i="1" smtClean="0">
+                          <a:rPr lang="en-US" sz="1600" b="0" i="1" smtClean="0">
                             <a:effectLst/>
                             <a:latin typeface="Cambria Math" panose="02040503050406030204" pitchFamily="18" charset="0"/>
                             <a:ea typeface="Cambria Math" panose="02040503050406030204" pitchFamily="18" charset="0"/>
@@ -15703,7 +15703,7 @@
                       </m:e>
                     </m:d>
                     <m:r>
-                      <a:rPr lang="en-US" sz="1800" b="0" i="1" smtClean="0">
+                      <a:rPr lang="en-US" sz="1600" b="0" i="1" smtClean="0">
                         <a:effectLst/>
                         <a:latin typeface="Cambria Math" panose="02040503050406030204" pitchFamily="18" charset="0"/>
                         <a:ea typeface="Cambria Math" panose="02040503050406030204" pitchFamily="18" charset="0"/>
@@ -15713,7 +15713,7 @@
                     </m:r>
                   </m:oMath>
                 </a14:m>
-                <a:endParaRPr lang="it-IT" sz="1800" dirty="0">
+                <a:endParaRPr lang="it-IT" sz="1600" dirty="0">
                   <a:effectLst/>
                   <a:latin typeface="Calibri" panose="020F0502020204030204" pitchFamily="34" charset="0"/>
                   <a:ea typeface="Calibri" panose="020F0502020204030204" pitchFamily="34" charset="0"/>
@@ -15731,7 +15731,7 @@
                   <a:buNone/>
                 </a:pPr>
                 <a:r>
-                  <a:rPr lang="en-US" sz="1800" dirty="0">
+                  <a:rPr lang="en-US" sz="1600" dirty="0">
                     <a:ea typeface="Calibri" panose="020F0502020204030204" pitchFamily="34" charset="0"/>
                     <a:cs typeface="Times New Roman" panose="02020603050405020304" pitchFamily="18" charset="0"/>
                   </a:rPr>
@@ -15740,7 +15740,7 @@
                 <a14:m>
                   <m:oMath xmlns:m="http://schemas.openxmlformats.org/officeDocument/2006/math">
                     <m:r>
-                      <a:rPr lang="en-US" sz="1800" i="1">
+                      <a:rPr lang="en-US" sz="1600" i="1">
                         <a:latin typeface="Cambria Math" panose="02040503050406030204" pitchFamily="18" charset="0"/>
                         <a:ea typeface="Calibri" panose="020F0502020204030204" pitchFamily="34" charset="0"/>
                         <a:cs typeface="Times New Roman" panose="02020603050405020304" pitchFamily="18" charset="0"/>
@@ -15748,7 +15748,7 @@
                       <m:t>𝑌</m:t>
                     </m:r>
                     <m:r>
-                      <a:rPr lang="en-US" sz="1800" i="1">
+                      <a:rPr lang="en-US" sz="1600" i="1">
                         <a:latin typeface="Cambria Math" panose="02040503050406030204" pitchFamily="18" charset="0"/>
                         <a:ea typeface="Calibri" panose="020F0502020204030204" pitchFamily="34" charset="0"/>
                         <a:cs typeface="Times New Roman" panose="02020603050405020304" pitchFamily="18" charset="0"/>
@@ -15756,7 +15756,7 @@
                       <m:t> →±∞:</m:t>
                     </m:r>
                     <m:r>
-                      <a:rPr lang="en-US" sz="1800" i="1">
+                      <a:rPr lang="en-US" sz="1600" i="1">
                         <a:latin typeface="Cambria Math" panose="02040503050406030204" pitchFamily="18" charset="0"/>
                         <a:ea typeface="Cambria Math" panose="02040503050406030204" pitchFamily="18" charset="0"/>
                         <a:cs typeface="Times New Roman" panose="02020603050405020304" pitchFamily="18" charset="0"/>
@@ -15766,7 +15766,7 @@
                     <m:d>
                       <m:dPr>
                         <m:ctrlPr>
-                          <a:rPr lang="en-US" sz="1800" i="1">
+                          <a:rPr lang="en-US" sz="1600" i="1">
                             <a:latin typeface="Cambria Math" panose="02040503050406030204" pitchFamily="18" charset="0"/>
                             <a:ea typeface="Cambria Math" panose="02040503050406030204" pitchFamily="18" charset="0"/>
                             <a:cs typeface="Times New Roman" panose="02020603050405020304" pitchFamily="18" charset="0"/>
@@ -15775,7 +15775,7 @@
                       </m:dPr>
                       <m:e>
                         <m:r>
-                          <a:rPr lang="en-US" sz="1800" i="1">
+                          <a:rPr lang="en-US" sz="1600" i="1">
                             <a:latin typeface="Cambria Math" panose="02040503050406030204" pitchFamily="18" charset="0"/>
                             <a:ea typeface="Cambria Math" panose="02040503050406030204" pitchFamily="18" charset="0"/>
                             <a:cs typeface="Times New Roman" panose="02020603050405020304" pitchFamily="18" charset="0"/>
@@ -15783,7 +15783,7 @@
                           <m:t>𝑋</m:t>
                         </m:r>
                         <m:r>
-                          <a:rPr lang="en-US" sz="1800" i="1">
+                          <a:rPr lang="en-US" sz="1600" i="1">
                             <a:latin typeface="Cambria Math" panose="02040503050406030204" pitchFamily="18" charset="0"/>
                             <a:ea typeface="Cambria Math" panose="02040503050406030204" pitchFamily="18" charset="0"/>
                             <a:cs typeface="Times New Roman" panose="02020603050405020304" pitchFamily="18" charset="0"/>
@@ -15791,7 +15791,7 @@
                           <m:t>,</m:t>
                         </m:r>
                         <m:r>
-                          <a:rPr lang="en-US" sz="1800" i="1">
+                          <a:rPr lang="en-US" sz="1600" i="1">
                             <a:latin typeface="Cambria Math" panose="02040503050406030204" pitchFamily="18" charset="0"/>
                             <a:ea typeface="Cambria Math" panose="02040503050406030204" pitchFamily="18" charset="0"/>
                             <a:cs typeface="Times New Roman" panose="02020603050405020304" pitchFamily="18" charset="0"/>
@@ -15801,7 +15801,7 @@
                       </m:e>
                     </m:d>
                     <m:r>
-                      <a:rPr lang="en-US" sz="1800" i="1">
+                      <a:rPr lang="en-US" sz="1600" i="1">
                         <a:latin typeface="Cambria Math" panose="02040503050406030204" pitchFamily="18" charset="0"/>
                         <a:ea typeface="Cambria Math" panose="02040503050406030204" pitchFamily="18" charset="0"/>
                         <a:cs typeface="Times New Roman" panose="02020603050405020304" pitchFamily="18" charset="0"/>
@@ -15809,7 +15809,7 @@
                       <m:t>→</m:t>
                     </m:r>
                     <m:r>
-                      <a:rPr lang="en-US" sz="1800" b="0" i="1" smtClean="0">
+                      <a:rPr lang="en-US" sz="1600" b="0" i="1" smtClean="0">
                         <a:latin typeface="Cambria Math" panose="02040503050406030204" pitchFamily="18" charset="0"/>
                         <a:ea typeface="Cambria Math" panose="02040503050406030204" pitchFamily="18" charset="0"/>
                         <a:cs typeface="Times New Roman" panose="02020603050405020304" pitchFamily="18" charset="0"/>
@@ -15817,7 +15817,7 @@
                       <m:t>+</m:t>
                     </m:r>
                     <m:r>
-                      <a:rPr lang="en-US" sz="1800" i="1" smtClean="0">
+                      <a:rPr lang="en-US" sz="1600" i="1" smtClean="0">
                         <a:latin typeface="Cambria Math" panose="02040503050406030204" pitchFamily="18" charset="0"/>
                         <a:ea typeface="Cambria Math" panose="02040503050406030204" pitchFamily="18" charset="0"/>
                         <a:cs typeface="Times New Roman" panose="02020603050405020304" pitchFamily="18" charset="0"/>
@@ -15826,7 +15826,7 @@
                     </m:r>
                   </m:oMath>
                 </a14:m>
-                <a:endParaRPr lang="it-IT" sz="1800" dirty="0">
+                <a:endParaRPr lang="it-IT" sz="1600" dirty="0">
                   <a:latin typeface="Calibri" panose="020F0502020204030204" pitchFamily="34" charset="0"/>
                   <a:ea typeface="Calibri" panose="020F0502020204030204" pitchFamily="34" charset="0"/>
                   <a:cs typeface="Times New Roman" panose="02020603050405020304" pitchFamily="18" charset="0"/>
@@ -15843,7 +15843,7 @@
                   <a:buNone/>
                 </a:pPr>
                 <a:r>
-                  <a:rPr lang="it-IT" sz="1800" dirty="0">
+                  <a:rPr lang="it-IT" sz="1600" dirty="0">
                     <a:latin typeface="Calibri" panose="020F0502020204030204" pitchFamily="34" charset="0"/>
                     <a:ea typeface="Calibri" panose="020F0502020204030204" pitchFamily="34" charset="0"/>
                     <a:cs typeface="Times New Roman" panose="02020603050405020304" pitchFamily="18" charset="0"/>
@@ -15853,7 +15853,7 @@
                 <a14:m>
                   <m:oMath xmlns:m="http://schemas.openxmlformats.org/officeDocument/2006/math">
                     <m:r>
-                      <a:rPr lang="en-US" sz="1800" i="1">
+                      <a:rPr lang="en-US" sz="1600" i="1">
                         <a:latin typeface="Cambria Math" panose="02040503050406030204" pitchFamily="18" charset="0"/>
                         <a:ea typeface="Calibri" panose="020F0502020204030204" pitchFamily="34" charset="0"/>
                         <a:cs typeface="Times New Roman" panose="02020603050405020304" pitchFamily="18" charset="0"/>
@@ -15861,7 +15861,7 @@
                       <m:t>𝑋</m:t>
                     </m:r>
                     <m:r>
-                      <a:rPr lang="en-US" sz="1800" i="1">
+                      <a:rPr lang="en-US" sz="1600" i="1">
                         <a:latin typeface="Cambria Math" panose="02040503050406030204" pitchFamily="18" charset="0"/>
                         <a:ea typeface="Cambria Math" panose="02040503050406030204" pitchFamily="18" charset="0"/>
                         <a:cs typeface="Times New Roman" panose="02020603050405020304" pitchFamily="18" charset="0"/>
@@ -15869,7 +15869,7 @@
                       <m:t>→</m:t>
                     </m:r>
                     <m:r>
-                      <a:rPr lang="en-US" sz="1800" i="1" smtClean="0">
+                      <a:rPr lang="en-US" sz="1600" i="1" smtClean="0">
                         <a:latin typeface="Cambria Math" panose="02040503050406030204" pitchFamily="18" charset="0"/>
                         <a:ea typeface="Cambria Math" panose="02040503050406030204" pitchFamily="18" charset="0"/>
                         <a:cs typeface="Times New Roman" panose="02020603050405020304" pitchFamily="18" charset="0"/>
@@ -15877,7 +15877,7 @@
                       <m:t>±∞</m:t>
                     </m:r>
                     <m:r>
-                      <a:rPr lang="en-US" sz="1800" i="1">
+                      <a:rPr lang="en-US" sz="1600" i="1">
                         <a:latin typeface="Cambria Math" panose="02040503050406030204" pitchFamily="18" charset="0"/>
                         <a:ea typeface="Cambria Math" panose="02040503050406030204" pitchFamily="18" charset="0"/>
                         <a:cs typeface="Times New Roman" panose="02020603050405020304" pitchFamily="18" charset="0"/>
@@ -15885,7 +15885,7 @@
                       <m:t>:</m:t>
                     </m:r>
                     <m:r>
-                      <a:rPr lang="en-US" sz="1800" i="1">
+                      <a:rPr lang="en-US" sz="1600" i="1">
                         <a:latin typeface="Cambria Math" panose="02040503050406030204" pitchFamily="18" charset="0"/>
                         <a:ea typeface="Cambria Math" panose="02040503050406030204" pitchFamily="18" charset="0"/>
                         <a:cs typeface="Times New Roman" panose="02020603050405020304" pitchFamily="18" charset="0"/>
@@ -15895,7 +15895,7 @@
                     <m:d>
                       <m:dPr>
                         <m:ctrlPr>
-                          <a:rPr lang="en-US" sz="1800" i="1">
+                          <a:rPr lang="en-US" sz="1600" i="1">
                             <a:latin typeface="Cambria Math" panose="02040503050406030204" pitchFamily="18" charset="0"/>
                             <a:ea typeface="Cambria Math" panose="02040503050406030204" pitchFamily="18" charset="0"/>
                             <a:cs typeface="Times New Roman" panose="02020603050405020304" pitchFamily="18" charset="0"/>
@@ -15904,7 +15904,7 @@
                       </m:dPr>
                       <m:e>
                         <m:r>
-                          <a:rPr lang="en-US" sz="1800" i="1">
+                          <a:rPr lang="en-US" sz="1600" i="1">
                             <a:latin typeface="Cambria Math" panose="02040503050406030204" pitchFamily="18" charset="0"/>
                             <a:ea typeface="Cambria Math" panose="02040503050406030204" pitchFamily="18" charset="0"/>
                             <a:cs typeface="Times New Roman" panose="02020603050405020304" pitchFamily="18" charset="0"/>
@@ -15912,7 +15912,7 @@
                           <m:t>𝑋</m:t>
                         </m:r>
                         <m:r>
-                          <a:rPr lang="en-US" sz="1800" i="1">
+                          <a:rPr lang="en-US" sz="1600" i="1">
                             <a:latin typeface="Cambria Math" panose="02040503050406030204" pitchFamily="18" charset="0"/>
                             <a:ea typeface="Cambria Math" panose="02040503050406030204" pitchFamily="18" charset="0"/>
                             <a:cs typeface="Times New Roman" panose="02020603050405020304" pitchFamily="18" charset="0"/>
@@ -15920,7 +15920,7 @@
                           <m:t>,</m:t>
                         </m:r>
                         <m:r>
-                          <a:rPr lang="en-US" sz="1800" i="1">
+                          <a:rPr lang="en-US" sz="1600" i="1">
                             <a:latin typeface="Cambria Math" panose="02040503050406030204" pitchFamily="18" charset="0"/>
                             <a:ea typeface="Cambria Math" panose="02040503050406030204" pitchFamily="18" charset="0"/>
                             <a:cs typeface="Times New Roman" panose="02020603050405020304" pitchFamily="18" charset="0"/>
@@ -15930,7 +15930,7 @@
                       </m:e>
                     </m:d>
                     <m:r>
-                      <a:rPr lang="en-US" sz="1800" i="1" smtClean="0">
+                      <a:rPr lang="en-US" sz="1600" i="1" smtClean="0">
                         <a:latin typeface="Cambria Math" panose="02040503050406030204" pitchFamily="18" charset="0"/>
                         <a:ea typeface="Cambria Math" panose="02040503050406030204" pitchFamily="18" charset="0"/>
                         <a:cs typeface="Times New Roman" panose="02020603050405020304" pitchFamily="18" charset="0"/>
@@ -15938,7 +15938,7 @@
                       <m:t>→</m:t>
                     </m:r>
                     <m:r>
-                      <a:rPr lang="en-US" sz="1800" b="0" i="1" smtClean="0">
+                      <a:rPr lang="en-US" sz="1600" b="0" i="1" smtClean="0">
                         <a:latin typeface="Cambria Math" panose="02040503050406030204" pitchFamily="18" charset="0"/>
                         <a:ea typeface="Cambria Math" panose="02040503050406030204" pitchFamily="18" charset="0"/>
                         <a:cs typeface="Times New Roman" panose="02020603050405020304" pitchFamily="18" charset="0"/>
@@ -15947,7 +15947,7 @@
                     </m:r>
                   </m:oMath>
                 </a14:m>
-                <a:endParaRPr lang="it-IT" sz="1800" dirty="0">
+                <a:endParaRPr lang="it-IT" sz="1600" dirty="0">
                   <a:latin typeface="Calibri" panose="020F0502020204030204" pitchFamily="34" charset="0"/>
                   <a:ea typeface="Calibri" panose="020F0502020204030204" pitchFamily="34" charset="0"/>
                   <a:cs typeface="Times New Roman" panose="02020603050405020304" pitchFamily="18" charset="0"/>
@@ -16030,7 +16030,7 @@
             </p:nvSpPr>
             <p:spPr>
               <a:xfrm>
-                <a:off x="423423" y="1717505"/>
+                <a:off x="416933" y="2167140"/>
                 <a:ext cx="5383491" cy="3693842"/>
               </a:xfrm>
               <a:blipFill>
@@ -16096,8 +16096,8 @@
             </p:nvSpPr>
             <p:spPr>
               <a:xfrm>
-                <a:off x="4252243" y="968915"/>
-                <a:ext cx="3448701" cy="617348"/>
+                <a:off x="1780381" y="760271"/>
+                <a:ext cx="8040085" cy="894347"/>
               </a:xfrm>
               <a:prstGeom prst="rect">
                 <a:avLst/>
@@ -16110,6 +16110,313 @@
               </a:bodyPr>
               <a:lstStyle/>
               <a:p>
+                <a:pPr/>
+                <a14:m>
+                  <m:oMathPara xmlns:m="http://schemas.openxmlformats.org/officeDocument/2006/math">
+                    <m:oMathParaPr>
+                      <m:jc m:val="centerGroup"/>
+                    </m:oMathParaPr>
+                    <m:oMath xmlns:m="http://schemas.openxmlformats.org/officeDocument/2006/math">
+                      <m:r>
+                        <a:rPr lang="en-US" sz="1800" b="0" i="1" smtClean="0">
+                          <a:effectLst/>
+                          <a:latin typeface="Cambria Math" panose="02040503050406030204" pitchFamily="18" charset="0"/>
+                          <a:ea typeface="Times New Roman" panose="02020603050405020304" pitchFamily="18" charset="0"/>
+                          <a:cs typeface="Times New Roman" panose="02020603050405020304" pitchFamily="18" charset="0"/>
+                        </a:rPr>
+                        <m:t>𝑋</m:t>
+                      </m:r>
+                      <m:r>
+                        <a:rPr lang="en-US" sz="1800" b="0" i="1" smtClean="0">
+                          <a:effectLst/>
+                          <a:latin typeface="Cambria Math" panose="02040503050406030204" pitchFamily="18" charset="0"/>
+                          <a:ea typeface="Times New Roman" panose="02020603050405020304" pitchFamily="18" charset="0"/>
+                          <a:cs typeface="Times New Roman" panose="02020603050405020304" pitchFamily="18" charset="0"/>
+                        </a:rPr>
+                        <m:t>=</m:t>
+                      </m:r>
+                      <m:r>
+                        <a:rPr lang="en-US" sz="1800" b="0" i="1" smtClean="0">
+                          <a:effectLst/>
+                          <a:latin typeface="Cambria Math" panose="02040503050406030204" pitchFamily="18" charset="0"/>
+                          <a:ea typeface="Times New Roman" panose="02020603050405020304" pitchFamily="18" charset="0"/>
+                          <a:cs typeface="Times New Roman" panose="02020603050405020304" pitchFamily="18" charset="0"/>
+                        </a:rPr>
+                        <m:t>𝑑𝑖𝑠𝑡𝑎𝑛𝑧𝑎</m:t>
+                      </m:r>
+                      <m:r>
+                        <a:rPr lang="en-US" sz="1800" b="0" i="1" smtClean="0">
+                          <a:effectLst/>
+                          <a:latin typeface="Cambria Math" panose="02040503050406030204" pitchFamily="18" charset="0"/>
+                          <a:ea typeface="Times New Roman" panose="02020603050405020304" pitchFamily="18" charset="0"/>
+                          <a:cs typeface="Times New Roman" panose="02020603050405020304" pitchFamily="18" charset="0"/>
+                        </a:rPr>
+                        <m:t> </m:t>
+                      </m:r>
+                      <m:r>
+                        <a:rPr lang="en-US" sz="1800" b="0" i="1" smtClean="0">
+                          <a:effectLst/>
+                          <a:latin typeface="Cambria Math" panose="02040503050406030204" pitchFamily="18" charset="0"/>
+                          <a:ea typeface="Times New Roman" panose="02020603050405020304" pitchFamily="18" charset="0"/>
+                          <a:cs typeface="Times New Roman" panose="02020603050405020304" pitchFamily="18" charset="0"/>
+                        </a:rPr>
+                        <m:t>𝑓𝑟𝑎</m:t>
+                      </m:r>
+                      <m:r>
+                        <a:rPr lang="en-US" sz="1800" b="0" i="1" smtClean="0">
+                          <a:effectLst/>
+                          <a:latin typeface="Cambria Math" panose="02040503050406030204" pitchFamily="18" charset="0"/>
+                          <a:ea typeface="Times New Roman" panose="02020603050405020304" pitchFamily="18" charset="0"/>
+                          <a:cs typeface="Times New Roman" panose="02020603050405020304" pitchFamily="18" charset="0"/>
+                        </a:rPr>
+                        <m:t> </m:t>
+                      </m:r>
+                      <m:r>
+                        <a:rPr lang="en-US" sz="1800" b="0" i="1" smtClean="0">
+                          <a:effectLst/>
+                          <a:latin typeface="Cambria Math" panose="02040503050406030204" pitchFamily="18" charset="0"/>
+                          <a:ea typeface="Times New Roman" panose="02020603050405020304" pitchFamily="18" charset="0"/>
+                          <a:cs typeface="Times New Roman" panose="02020603050405020304" pitchFamily="18" charset="0"/>
+                        </a:rPr>
+                        <m:t>𝑖</m:t>
+                      </m:r>
+                      <m:r>
+                        <a:rPr lang="en-US" sz="1800" b="0" i="1" smtClean="0">
+                          <a:effectLst/>
+                          <a:latin typeface="Cambria Math" panose="02040503050406030204" pitchFamily="18" charset="0"/>
+                          <a:ea typeface="Times New Roman" panose="02020603050405020304" pitchFamily="18" charset="0"/>
+                          <a:cs typeface="Times New Roman" panose="02020603050405020304" pitchFamily="18" charset="0"/>
+                        </a:rPr>
+                        <m:t> </m:t>
+                      </m:r>
+                      <m:r>
+                        <a:rPr lang="en-US" sz="1800" b="0" i="1" smtClean="0">
+                          <a:effectLst/>
+                          <a:latin typeface="Cambria Math" panose="02040503050406030204" pitchFamily="18" charset="0"/>
+                          <a:ea typeface="Times New Roman" panose="02020603050405020304" pitchFamily="18" charset="0"/>
+                          <a:cs typeface="Times New Roman" panose="02020603050405020304" pitchFamily="18" charset="0"/>
+                        </a:rPr>
+                        <m:t>𝑝𝑢𝑛𝑡𝑖</m:t>
+                      </m:r>
+                      <m:r>
+                        <a:rPr lang="en-US" sz="1800" b="0" i="1" smtClean="0">
+                          <a:effectLst/>
+                          <a:latin typeface="Cambria Math" panose="02040503050406030204" pitchFamily="18" charset="0"/>
+                          <a:ea typeface="Times New Roman" panose="02020603050405020304" pitchFamily="18" charset="0"/>
+                          <a:cs typeface="Times New Roman" panose="02020603050405020304" pitchFamily="18" charset="0"/>
+                        </a:rPr>
+                        <m:t> </m:t>
+                      </m:r>
+                      <m:r>
+                        <a:rPr lang="en-US" sz="1800" b="0" i="1" smtClean="0">
+                          <a:effectLst/>
+                          <a:latin typeface="Cambria Math" panose="02040503050406030204" pitchFamily="18" charset="0"/>
+                          <a:ea typeface="Times New Roman" panose="02020603050405020304" pitchFamily="18" charset="0"/>
+                          <a:cs typeface="Times New Roman" panose="02020603050405020304" pitchFamily="18" charset="0"/>
+                        </a:rPr>
+                        <m:t>𝑎𝑑</m:t>
+                      </m:r>
+                      <m:r>
+                        <a:rPr lang="en-US" sz="1800" b="0" i="1" smtClean="0">
+                          <a:effectLst/>
+                          <a:latin typeface="Cambria Math" panose="02040503050406030204" pitchFamily="18" charset="0"/>
+                          <a:ea typeface="Times New Roman" panose="02020603050405020304" pitchFamily="18" charset="0"/>
+                          <a:cs typeface="Times New Roman" panose="02020603050405020304" pitchFamily="18" charset="0"/>
+                        </a:rPr>
+                        <m:t> </m:t>
+                      </m:r>
+                      <m:r>
+                        <a:rPr lang="en-US" sz="1800" b="0" i="1" smtClean="0">
+                          <a:effectLst/>
+                          <a:latin typeface="Cambria Math" panose="02040503050406030204" pitchFamily="18" charset="0"/>
+                          <a:ea typeface="Times New Roman" panose="02020603050405020304" pitchFamily="18" charset="0"/>
+                          <a:cs typeface="Times New Roman" panose="02020603050405020304" pitchFamily="18" charset="0"/>
+                        </a:rPr>
+                        <m:t>𝑎𝑙𝑡𝑎</m:t>
+                      </m:r>
+                      <m:r>
+                        <a:rPr lang="en-US" sz="1800" b="0" i="1" smtClean="0">
+                          <a:effectLst/>
+                          <a:latin typeface="Cambria Math" panose="02040503050406030204" pitchFamily="18" charset="0"/>
+                          <a:ea typeface="Times New Roman" panose="02020603050405020304" pitchFamily="18" charset="0"/>
+                          <a:cs typeface="Times New Roman" panose="02020603050405020304" pitchFamily="18" charset="0"/>
+                        </a:rPr>
+                        <m:t> </m:t>
+                      </m:r>
+                      <m:r>
+                        <a:rPr lang="en-US" sz="1800" b="0" i="1" smtClean="0">
+                          <a:effectLst/>
+                          <a:latin typeface="Cambria Math" panose="02040503050406030204" pitchFamily="18" charset="0"/>
+                          <a:ea typeface="Times New Roman" panose="02020603050405020304" pitchFamily="18" charset="0"/>
+                          <a:cs typeface="Times New Roman" panose="02020603050405020304" pitchFamily="18" charset="0"/>
+                        </a:rPr>
+                        <m:t>𝑑𝑖𝑚</m:t>
+                      </m:r>
+                      <m:r>
+                        <a:rPr lang="en-US" sz="1800" b="0" i="1" smtClean="0">
+                          <a:effectLst/>
+                          <a:latin typeface="Cambria Math" panose="02040503050406030204" pitchFamily="18" charset="0"/>
+                          <a:ea typeface="Times New Roman" panose="02020603050405020304" pitchFamily="18" charset="0"/>
+                          <a:cs typeface="Times New Roman" panose="02020603050405020304" pitchFamily="18" charset="0"/>
+                        </a:rPr>
+                        <m:t>.  </m:t>
+                      </m:r>
+                      <m:r>
+                        <a:rPr lang="en-US" sz="1800" b="0" i="1" smtClean="0">
+                          <a:effectLst/>
+                          <a:latin typeface="Cambria Math" panose="02040503050406030204" pitchFamily="18" charset="0"/>
+                          <a:ea typeface="Times New Roman" panose="02020603050405020304" pitchFamily="18" charset="0"/>
+                          <a:cs typeface="Times New Roman" panose="02020603050405020304" pitchFamily="18" charset="0"/>
+                        </a:rPr>
+                        <m:t>𝑌</m:t>
+                      </m:r>
+                      <m:r>
+                        <a:rPr lang="en-US" sz="1800" b="0" i="1" smtClean="0">
+                          <a:effectLst/>
+                          <a:latin typeface="Cambria Math" panose="02040503050406030204" pitchFamily="18" charset="0"/>
+                          <a:ea typeface="Times New Roman" panose="02020603050405020304" pitchFamily="18" charset="0"/>
+                          <a:cs typeface="Times New Roman" panose="02020603050405020304" pitchFamily="18" charset="0"/>
+                        </a:rPr>
+                        <m:t>=</m:t>
+                      </m:r>
+                      <m:r>
+                        <a:rPr lang="en-US" sz="1800" b="0" i="1" smtClean="0">
+                          <a:effectLst/>
+                          <a:latin typeface="Cambria Math" panose="02040503050406030204" pitchFamily="18" charset="0"/>
+                          <a:ea typeface="Times New Roman" panose="02020603050405020304" pitchFamily="18" charset="0"/>
+                          <a:cs typeface="Times New Roman" panose="02020603050405020304" pitchFamily="18" charset="0"/>
+                        </a:rPr>
+                        <m:t>𝑑𝑖𝑠𝑡𝑎𝑛𝑧𝑎</m:t>
+                      </m:r>
+                      <m:r>
+                        <a:rPr lang="en-US" sz="1800" b="0" i="1" smtClean="0">
+                          <a:effectLst/>
+                          <a:latin typeface="Cambria Math" panose="02040503050406030204" pitchFamily="18" charset="0"/>
+                          <a:ea typeface="Times New Roman" panose="02020603050405020304" pitchFamily="18" charset="0"/>
+                          <a:cs typeface="Times New Roman" panose="02020603050405020304" pitchFamily="18" charset="0"/>
+                        </a:rPr>
+                        <m:t> </m:t>
+                      </m:r>
+                      <m:r>
+                        <a:rPr lang="en-US" sz="1800" b="0" i="1" smtClean="0">
+                          <a:effectLst/>
+                          <a:latin typeface="Cambria Math" panose="02040503050406030204" pitchFamily="18" charset="0"/>
+                          <a:ea typeface="Times New Roman" panose="02020603050405020304" pitchFamily="18" charset="0"/>
+                          <a:cs typeface="Times New Roman" panose="02020603050405020304" pitchFamily="18" charset="0"/>
+                        </a:rPr>
+                        <m:t>𝑓𝑟𝑎</m:t>
+                      </m:r>
+                      <m:r>
+                        <a:rPr lang="en-US" sz="1800" b="0" i="1" smtClean="0">
+                          <a:effectLst/>
+                          <a:latin typeface="Cambria Math" panose="02040503050406030204" pitchFamily="18" charset="0"/>
+                          <a:ea typeface="Times New Roman" panose="02020603050405020304" pitchFamily="18" charset="0"/>
+                          <a:cs typeface="Times New Roman" panose="02020603050405020304" pitchFamily="18" charset="0"/>
+                        </a:rPr>
+                        <m:t> </m:t>
+                      </m:r>
+                      <m:r>
+                        <a:rPr lang="en-US" sz="1800" b="0" i="1" smtClean="0">
+                          <a:effectLst/>
+                          <a:latin typeface="Cambria Math" panose="02040503050406030204" pitchFamily="18" charset="0"/>
+                          <a:ea typeface="Times New Roman" panose="02020603050405020304" pitchFamily="18" charset="0"/>
+                          <a:cs typeface="Times New Roman" panose="02020603050405020304" pitchFamily="18" charset="0"/>
+                        </a:rPr>
+                        <m:t>𝑖</m:t>
+                      </m:r>
+                      <m:r>
+                        <a:rPr lang="en-US" sz="1800" b="0" i="1" smtClean="0">
+                          <a:effectLst/>
+                          <a:latin typeface="Cambria Math" panose="02040503050406030204" pitchFamily="18" charset="0"/>
+                          <a:ea typeface="Times New Roman" panose="02020603050405020304" pitchFamily="18" charset="0"/>
+                          <a:cs typeface="Times New Roman" panose="02020603050405020304" pitchFamily="18" charset="0"/>
+                        </a:rPr>
+                        <m:t> </m:t>
+                      </m:r>
+                      <m:r>
+                        <a:rPr lang="en-US" sz="1800" b="0" i="1" smtClean="0">
+                          <a:effectLst/>
+                          <a:latin typeface="Cambria Math" panose="02040503050406030204" pitchFamily="18" charset="0"/>
+                          <a:ea typeface="Times New Roman" panose="02020603050405020304" pitchFamily="18" charset="0"/>
+                          <a:cs typeface="Times New Roman" panose="02020603050405020304" pitchFamily="18" charset="0"/>
+                        </a:rPr>
+                        <m:t>𝑝𝑢𝑛𝑡𝑖</m:t>
+                      </m:r>
+                      <m:r>
+                        <a:rPr lang="en-US" sz="1800" b="0" i="1" smtClean="0">
+                          <a:effectLst/>
+                          <a:latin typeface="Cambria Math" panose="02040503050406030204" pitchFamily="18" charset="0"/>
+                          <a:ea typeface="Times New Roman" panose="02020603050405020304" pitchFamily="18" charset="0"/>
+                          <a:cs typeface="Times New Roman" panose="02020603050405020304" pitchFamily="18" charset="0"/>
+                        </a:rPr>
+                        <m:t> </m:t>
+                      </m:r>
+                      <m:r>
+                        <a:rPr lang="en-US" sz="1800" b="0" i="1" smtClean="0">
+                          <a:effectLst/>
+                          <a:latin typeface="Cambria Math" panose="02040503050406030204" pitchFamily="18" charset="0"/>
+                          <a:ea typeface="Times New Roman" panose="02020603050405020304" pitchFamily="18" charset="0"/>
+                          <a:cs typeface="Times New Roman" panose="02020603050405020304" pitchFamily="18" charset="0"/>
+                        </a:rPr>
+                        <m:t>𝑎</m:t>
+                      </m:r>
+                      <m:r>
+                        <a:rPr lang="en-US" sz="1800" b="0" i="1" smtClean="0">
+                          <a:effectLst/>
+                          <a:latin typeface="Cambria Math" panose="02040503050406030204" pitchFamily="18" charset="0"/>
+                          <a:ea typeface="Times New Roman" panose="02020603050405020304" pitchFamily="18" charset="0"/>
+                          <a:cs typeface="Times New Roman" panose="02020603050405020304" pitchFamily="18" charset="0"/>
+                        </a:rPr>
+                        <m:t> </m:t>
+                      </m:r>
+                      <m:r>
+                        <a:rPr lang="en-US" sz="1800" b="0" i="1" smtClean="0">
+                          <a:effectLst/>
+                          <a:latin typeface="Cambria Math" panose="02040503050406030204" pitchFamily="18" charset="0"/>
+                          <a:ea typeface="Times New Roman" panose="02020603050405020304" pitchFamily="18" charset="0"/>
+                          <a:cs typeface="Times New Roman" panose="02020603050405020304" pitchFamily="18" charset="0"/>
+                        </a:rPr>
+                        <m:t>𝑏𝑎𝑠𝑠𝑎</m:t>
+                      </m:r>
+                      <m:r>
+                        <a:rPr lang="en-US" sz="1800" b="0" i="1" smtClean="0">
+                          <a:effectLst/>
+                          <a:latin typeface="Cambria Math" panose="02040503050406030204" pitchFamily="18" charset="0"/>
+                          <a:ea typeface="Times New Roman" panose="02020603050405020304" pitchFamily="18" charset="0"/>
+                          <a:cs typeface="Times New Roman" panose="02020603050405020304" pitchFamily="18" charset="0"/>
+                        </a:rPr>
+                        <m:t> </m:t>
+                      </m:r>
+                      <m:r>
+                        <a:rPr lang="en-US" sz="1800" b="0" i="1" smtClean="0">
+                          <a:effectLst/>
+                          <a:latin typeface="Cambria Math" panose="02040503050406030204" pitchFamily="18" charset="0"/>
+                          <a:ea typeface="Times New Roman" panose="02020603050405020304" pitchFamily="18" charset="0"/>
+                          <a:cs typeface="Times New Roman" panose="02020603050405020304" pitchFamily="18" charset="0"/>
+                        </a:rPr>
+                        <m:t>𝑑𝑖𝑚</m:t>
+                      </m:r>
+                      <m:r>
+                        <a:rPr lang="it-IT" sz="1800" b="0" i="1" smtClean="0">
+                          <a:effectLst/>
+                          <a:latin typeface="Cambria Math" panose="02040503050406030204" pitchFamily="18" charset="0"/>
+                          <a:ea typeface="Times New Roman" panose="02020603050405020304" pitchFamily="18" charset="0"/>
+                          <a:cs typeface="Times New Roman" panose="02020603050405020304" pitchFamily="18" charset="0"/>
+                        </a:rPr>
+                        <m:t>.</m:t>
+                      </m:r>
+                    </m:oMath>
+                  </m:oMathPara>
+                </a14:m>
+                <a:endParaRPr lang="it-IT" sz="1800" b="0" i="1" dirty="0">
+                  <a:effectLst/>
+                  <a:latin typeface="Cambria Math" panose="02040503050406030204" pitchFamily="18" charset="0"/>
+                  <a:ea typeface="Times New Roman" panose="02020603050405020304" pitchFamily="18" charset="0"/>
+                  <a:cs typeface="Times New Roman" panose="02020603050405020304" pitchFamily="18" charset="0"/>
+                </a:endParaRPr>
+              </a:p>
+              <a:p>
+                <a:pPr/>
                 <a14:m>
                   <m:oMathPara xmlns:m="http://schemas.openxmlformats.org/officeDocument/2006/math">
                     <m:oMathParaPr>
@@ -16226,13 +16533,13 @@
                         </m:sup>
                       </m:sSup>
                       <m:r>
-                        <a:rPr lang="it-IT" sz="1800">
+                        <a:rPr lang="it-IT" sz="1800" b="0" i="1" smtClean="0">
                           <a:effectLst/>
                           <a:latin typeface="Cambria Math" panose="02040503050406030204" pitchFamily="18" charset="0"/>
                           <a:ea typeface="Times New Roman" panose="02020603050405020304" pitchFamily="18" charset="0"/>
                           <a:cs typeface="Times New Roman" panose="02020603050405020304" pitchFamily="18" charset="0"/>
                         </a:rPr>
-                        <m:t>  </m:t>
+                        <m:t>      </m:t>
                       </m:r>
                       <m:r>
                         <a:rPr lang="it-IT" sz="1800" i="1">
@@ -16368,8 +16675,8 @@
             </p:nvSpPr>
             <p:spPr>
               <a:xfrm>
-                <a:off x="4252243" y="968915"/>
-                <a:ext cx="3448701" cy="617348"/>
+                <a:off x="1780381" y="760271"/>
+                <a:ext cx="8040085" cy="894347"/>
               </a:xfrm>
               <a:prstGeom prst="rect">
                 <a:avLst/>
@@ -16411,9 +16718,9 @@
           <p:nvPr/>
         </p:nvCxnSpPr>
         <p:spPr>
-          <a:xfrm flipH="1" flipV="1">
-            <a:off x="2509921" y="1519316"/>
-            <a:ext cx="846024" cy="274221"/>
+          <a:xfrm flipV="1">
+            <a:off x="3355944" y="2009149"/>
+            <a:ext cx="709877" cy="207570"/>
           </a:xfrm>
           <a:prstGeom prst="straightConnector1">
             <a:avLst/>
@@ -16453,8 +16760,8 @@
             </p:nvSpPr>
             <p:spPr>
               <a:xfrm>
-                <a:off x="2620573" y="1154433"/>
-                <a:ext cx="904350" cy="523220"/>
+                <a:off x="3103603" y="1662095"/>
+                <a:ext cx="752193" cy="430887"/>
               </a:xfrm>
               <a:prstGeom prst="rect">
                 <a:avLst/>
@@ -16467,6 +16774,7 @@
               </a:bodyPr>
               <a:lstStyle/>
               <a:p>
+                <a:pPr/>
                 <a14:m>
                   <m:oMathPara xmlns:m="http://schemas.openxmlformats.org/officeDocument/2006/math">
                     <m:oMathParaPr>
@@ -16474,26 +16782,41 @@
                     </m:oMathParaPr>
                     <m:oMath xmlns:m="http://schemas.openxmlformats.org/officeDocument/2006/math">
                       <m:r>
-                        <a:rPr lang="en-US" sz="1400" b="0" i="1" smtClean="0">
+                        <a:rPr lang="en-US" sz="1100" b="0" i="1" smtClean="0">
                           <a:latin typeface="Cambria Math" panose="02040503050406030204" pitchFamily="18" charset="0"/>
                         </a:rPr>
                         <m:t>𝑋</m:t>
                       </m:r>
                       <m:r>
-                        <a:rPr lang="en-US" sz="1400" b="0" i="1" smtClean="0">
+                        <a:rPr lang="en-US" sz="1100" b="0" i="1" smtClean="0">
                           <a:latin typeface="Cambria Math" panose="02040503050406030204" pitchFamily="18" charset="0"/>
                           <a:ea typeface="Cambria Math" panose="02040503050406030204" pitchFamily="18" charset="0"/>
                         </a:rPr>
-                        <m:t>→0 </m:t>
+                        <m:t>→0</m:t>
+                      </m:r>
+                      <m:r>
+                        <a:rPr lang="it-IT" sz="1100" b="0" i="1" smtClean="0">
+                          <a:latin typeface="Cambria Math" panose="02040503050406030204" pitchFamily="18" charset="0"/>
+                          <a:ea typeface="Cambria Math" panose="02040503050406030204" pitchFamily="18" charset="0"/>
+                        </a:rPr>
+                        <m:t> </m:t>
+                      </m:r>
+                      <m:r>
+                        <a:rPr lang="en-US" sz="1100" b="0" i="1" smtClean="0">
+                          <a:latin typeface="Cambria Math" panose="02040503050406030204" pitchFamily="18" charset="0"/>
+                          <a:ea typeface="Cambria Math" panose="02040503050406030204" pitchFamily="18" charset="0"/>
+                        </a:rPr>
+                        <m:t> </m:t>
                       </m:r>
                     </m:oMath>
                   </m:oMathPara>
                 </a14:m>
-                <a:endParaRPr lang="it-IT" sz="1400" b="0" dirty="0">
+                <a:endParaRPr lang="it-IT" sz="1100" b="0" dirty="0">
                   <a:ea typeface="Cambria Math" panose="02040503050406030204" pitchFamily="18" charset="0"/>
                 </a:endParaRPr>
               </a:p>
               <a:p>
+                <a:pPr/>
                 <a14:m>
                   <m:oMathPara xmlns:m="http://schemas.openxmlformats.org/officeDocument/2006/math">
                     <m:oMathParaPr>
@@ -16501,14 +16824,14 @@
                     </m:oMathParaPr>
                     <m:oMath xmlns:m="http://schemas.openxmlformats.org/officeDocument/2006/math">
                       <m:r>
-                        <a:rPr lang="en-US" sz="1400" b="0" i="1" smtClean="0">
+                        <a:rPr lang="en-US" sz="1100" b="0" i="1" smtClean="0">
                           <a:latin typeface="Cambria Math" panose="02040503050406030204" pitchFamily="18" charset="0"/>
                           <a:ea typeface="Cambria Math" panose="02040503050406030204" pitchFamily="18" charset="0"/>
                         </a:rPr>
                         <m:t>𝑋</m:t>
                       </m:r>
                       <m:r>
-                        <a:rPr lang="en-US" sz="1400" b="0" i="1" smtClean="0">
+                        <a:rPr lang="en-US" sz="1100" b="0" i="1" smtClean="0">
                           <a:latin typeface="Cambria Math" panose="02040503050406030204" pitchFamily="18" charset="0"/>
                           <a:ea typeface="Cambria Math" panose="02040503050406030204" pitchFamily="18" charset="0"/>
                         </a:rPr>
@@ -16517,7 +16840,7 @@
                     </m:oMath>
                   </m:oMathPara>
                 </a14:m>
-                <a:endParaRPr lang="en-US" sz="1400" b="0" dirty="0">
+                <a:endParaRPr lang="en-US" sz="1100" b="0" dirty="0">
                   <a:ea typeface="Cambria Math" panose="02040503050406030204" pitchFamily="18" charset="0"/>
                 </a:endParaRPr>
               </a:p>
@@ -16541,8 +16864,8 @@
             </p:nvSpPr>
             <p:spPr>
               <a:xfrm>
-                <a:off x="2620573" y="1154433"/>
-                <a:ext cx="904350" cy="523220"/>
+                <a:off x="3103603" y="1662095"/>
+                <a:ext cx="752193" cy="430887"/>
               </a:xfrm>
               <a:prstGeom prst="rect">
                 <a:avLst/>
@@ -16583,7 +16906,7 @@
         </p:nvSpPr>
         <p:spPr>
           <a:xfrm>
-            <a:off x="2177778" y="1312769"/>
+            <a:off x="4065821" y="1803850"/>
             <a:ext cx="332142" cy="369332"/>
           </a:xfrm>
           <a:prstGeom prst="rect">
@@ -16623,8 +16946,8 @@
             </p:nvSpPr>
             <p:spPr>
               <a:xfrm>
-                <a:off x="6149417" y="1586263"/>
-                <a:ext cx="5383491" cy="4274720"/>
+                <a:off x="6211563" y="1803850"/>
+                <a:ext cx="5556315" cy="4198887"/>
               </a:xfrm>
               <a:prstGeom prst="rect">
                 <a:avLst/>
@@ -16632,7 +16955,7 @@
             </p:spPr>
             <p:txBody>
               <a:bodyPr vert="horz" lIns="91440" tIns="45720" rIns="91440" bIns="45720" rtlCol="0">
-                <a:normAutofit fontScale="92500" lnSpcReduction="20000"/>
+                <a:noAutofit/>
               </a:bodyPr>
               <a:lstStyle>
                 <a:lvl1pPr marL="228600" indent="-228600" algn="l" defTabSz="914400" rtl="0" eaLnBrk="1" latinLnBrk="0" hangingPunct="1">
@@ -16811,20 +17134,27 @@
                 <a14:m>
                   <m:oMathPara xmlns:m="http://schemas.openxmlformats.org/officeDocument/2006/math">
                     <m:oMathParaPr>
-                      <m:jc m:val="centerGroup"/>
+                      <m:jc m:val="left"/>
                     </m:oMathParaPr>
                     <m:oMath xmlns:m="http://schemas.openxmlformats.org/officeDocument/2006/math">
                       <m:r>
-                        <a:rPr lang="en-US" sz="1800" b="0" i="1" smtClean="0">
+                        <a:rPr lang="en-US" sz="1600" b="0" i="1" smtClean="0">
                           <a:latin typeface="Cambria Math" panose="02040503050406030204" pitchFamily="18" charset="0"/>
                           <a:ea typeface="Cambria Math" panose="02040503050406030204" pitchFamily="18" charset="0"/>
                         </a:rPr>
-                        <m:t>𝐶𝐸</m:t>
+                        <m:t>𝐶</m:t>
+                      </m:r>
+                      <m:r>
+                        <a:rPr lang="en-US" sz="1600" b="0" i="1" smtClean="0">
+                          <a:latin typeface="Cambria Math" panose="02040503050406030204" pitchFamily="18" charset="0"/>
+                          <a:ea typeface="Cambria Math" panose="02040503050406030204" pitchFamily="18" charset="0"/>
+                        </a:rPr>
+                        <m:t>𝐸</m:t>
                       </m:r>
                       <m:d>
                         <m:dPr>
                           <m:ctrlPr>
-                            <a:rPr lang="it-IT" sz="1800" i="1">
+                            <a:rPr lang="it-IT" sz="1600" i="1">
                               <a:latin typeface="Cambria Math" panose="02040503050406030204" pitchFamily="18" charset="0"/>
                               <a:ea typeface="Cambria Math" panose="02040503050406030204" pitchFamily="18" charset="0"/>
                             </a:rPr>
@@ -16832,7 +17162,7 @@
                         </m:dPr>
                         <m:e>
                           <m:r>
-                            <a:rPr lang="it-IT" sz="1800" i="1">
+                            <a:rPr lang="it-IT" sz="1600" i="1">
                               <a:latin typeface="Cambria Math" panose="02040503050406030204" pitchFamily="18" charset="0"/>
                               <a:ea typeface="Cambria Math" panose="02040503050406030204" pitchFamily="18" charset="0"/>
                               <a:cs typeface="Times New Roman" panose="02020603050405020304" pitchFamily="18" charset="0"/>
@@ -16840,7 +17170,7 @@
                             <m:t>𝑋</m:t>
                           </m:r>
                           <m:r>
-                            <a:rPr lang="it-IT" sz="1800" i="1">
+                            <a:rPr lang="it-IT" sz="1600" i="1">
                               <a:latin typeface="Cambria Math" panose="02040503050406030204" pitchFamily="18" charset="0"/>
                               <a:ea typeface="Cambria Math" panose="02040503050406030204" pitchFamily="18" charset="0"/>
                               <a:cs typeface="Times New Roman" panose="02020603050405020304" pitchFamily="18" charset="0"/>
@@ -16848,7 +17178,7 @@
                             <m:t>,</m:t>
                           </m:r>
                           <m:r>
-                            <a:rPr lang="it-IT" sz="1800" i="1">
+                            <a:rPr lang="it-IT" sz="1600" i="1">
                               <a:latin typeface="Cambria Math" panose="02040503050406030204" pitchFamily="18" charset="0"/>
                               <a:ea typeface="Cambria Math" panose="02040503050406030204" pitchFamily="18" charset="0"/>
                               <a:cs typeface="Times New Roman" panose="02020603050405020304" pitchFamily="18" charset="0"/>
@@ -16858,7 +17188,7 @@
                         </m:e>
                       </m:d>
                       <m:r>
-                        <a:rPr lang="it-IT" sz="1800" i="1">
+                        <a:rPr lang="it-IT" sz="1600" i="1">
                           <a:latin typeface="Cambria Math" panose="02040503050406030204" pitchFamily="18" charset="0"/>
                           <a:ea typeface="Cambria Math" panose="02040503050406030204" pitchFamily="18" charset="0"/>
                           <a:cs typeface="Times New Roman" panose="02020603050405020304" pitchFamily="18" charset="0"/>
@@ -16866,7 +17196,7 @@
                         <m:t>=</m:t>
                       </m:r>
                       <m:r>
-                        <a:rPr lang="it-IT" sz="1800" i="1">
+                        <a:rPr lang="it-IT" sz="1600" i="1">
                           <a:latin typeface="Cambria Math" panose="02040503050406030204" pitchFamily="18" charset="0"/>
                           <a:ea typeface="Cambria Math" panose="02040503050406030204" pitchFamily="18" charset="0"/>
                         </a:rPr>
@@ -16875,7 +17205,7 @@
                       <m:d>
                         <m:dPr>
                           <m:ctrlPr>
-                            <a:rPr lang="it-IT" sz="1800" i="1">
+                            <a:rPr lang="it-IT" sz="1600" i="1">
                               <a:latin typeface="Cambria Math" panose="02040503050406030204" pitchFamily="18" charset="0"/>
                               <a:ea typeface="Cambria Math" panose="02040503050406030204" pitchFamily="18" charset="0"/>
                             </a:rPr>
@@ -16883,7 +17213,7 @@
                         </m:dPr>
                         <m:e>
                           <m:r>
-                            <a:rPr lang="it-IT" sz="1800" i="1">
+                            <a:rPr lang="it-IT" sz="1600" i="1">
                               <a:latin typeface="Cambria Math" panose="02040503050406030204" pitchFamily="18" charset="0"/>
                               <a:ea typeface="Cambria Math" panose="02040503050406030204" pitchFamily="18" charset="0"/>
                             </a:rPr>
@@ -16894,7 +17224,7 @@
                       <m:func>
                         <m:funcPr>
                           <m:ctrlPr>
-                            <a:rPr lang="it-IT" sz="1800" i="1">
+                            <a:rPr lang="it-IT" sz="1600" i="1">
                               <a:latin typeface="Cambria Math" panose="02040503050406030204" pitchFamily="18" charset="0"/>
                               <a:ea typeface="Cambria Math" panose="02040503050406030204" pitchFamily="18" charset="0"/>
                             </a:rPr>
@@ -16905,7 +17235,7 @@
                             <m:rPr>
                               <m:sty m:val="p"/>
                             </m:rPr>
-                            <a:rPr lang="it-IT" sz="1800">
+                            <a:rPr lang="it-IT" sz="1600">
                               <a:latin typeface="Cambria Math" panose="02040503050406030204" pitchFamily="18" charset="0"/>
                               <a:ea typeface="Cambria Math" panose="02040503050406030204" pitchFamily="18" charset="0"/>
                             </a:rPr>
@@ -16916,7 +17246,7 @@
                           <m:f>
                             <m:fPr>
                               <m:ctrlPr>
-                                <a:rPr lang="it-IT" sz="1800" i="1">
+                                <a:rPr lang="it-IT" sz="1600" i="1">
                                   <a:latin typeface="Cambria Math" panose="02040503050406030204" pitchFamily="18" charset="0"/>
                                   <a:ea typeface="Cambria Math" panose="02040503050406030204" pitchFamily="18" charset="0"/>
                                 </a:rPr>
@@ -16924,7 +17254,7 @@
                             </m:fPr>
                             <m:num>
                               <m:r>
-                                <a:rPr lang="it-IT" sz="1800" i="1">
+                                <a:rPr lang="it-IT" sz="1600" i="1">
                                   <a:latin typeface="Cambria Math" panose="02040503050406030204" pitchFamily="18" charset="0"/>
                                   <a:ea typeface="Cambria Math" panose="02040503050406030204" pitchFamily="18" charset="0"/>
                                 </a:rPr>
@@ -16933,7 +17263,7 @@
                               <m:d>
                                 <m:dPr>
                                   <m:ctrlPr>
-                                    <a:rPr lang="it-IT" sz="1800" i="1">
+                                    <a:rPr lang="it-IT" sz="1600" i="1">
                                       <a:latin typeface="Cambria Math" panose="02040503050406030204" pitchFamily="18" charset="0"/>
                                       <a:ea typeface="Cambria Math" panose="02040503050406030204" pitchFamily="18" charset="0"/>
                                     </a:rPr>
@@ -16941,7 +17271,7 @@
                                 </m:dPr>
                                 <m:e>
                                   <m:r>
-                                    <a:rPr lang="it-IT" sz="1800" i="1">
+                                    <a:rPr lang="it-IT" sz="1600" i="1">
                                       <a:latin typeface="Cambria Math" panose="02040503050406030204" pitchFamily="18" charset="0"/>
                                       <a:ea typeface="Cambria Math" panose="02040503050406030204" pitchFamily="18" charset="0"/>
                                     </a:rPr>
@@ -16952,7 +17282,7 @@
                             </m:num>
                             <m:den>
                               <m:r>
-                                <a:rPr lang="it-IT" sz="1800" i="1">
+                                <a:rPr lang="it-IT" sz="1600" i="1">
                                   <a:latin typeface="Cambria Math" panose="02040503050406030204" pitchFamily="18" charset="0"/>
                                   <a:ea typeface="Cambria Math" panose="02040503050406030204" pitchFamily="18" charset="0"/>
                                 </a:rPr>
@@ -16961,7 +17291,7 @@
                               <m:d>
                                 <m:dPr>
                                   <m:ctrlPr>
-                                    <a:rPr lang="it-IT" sz="1800" i="1">
+                                    <a:rPr lang="it-IT" sz="1600" i="1">
                                       <a:latin typeface="Cambria Math" panose="02040503050406030204" pitchFamily="18" charset="0"/>
                                       <a:ea typeface="Cambria Math" panose="02040503050406030204" pitchFamily="18" charset="0"/>
                                     </a:rPr>
@@ -16969,7 +17299,7 @@
                                 </m:dPr>
                                 <m:e>
                                   <m:r>
-                                    <a:rPr lang="it-IT" sz="1800" i="1">
+                                    <a:rPr lang="it-IT" sz="1600" i="1">
                                       <a:latin typeface="Cambria Math" panose="02040503050406030204" pitchFamily="18" charset="0"/>
                                       <a:ea typeface="Cambria Math" panose="02040503050406030204" pitchFamily="18" charset="0"/>
                                     </a:rPr>
@@ -16982,7 +17312,7 @@
                         </m:e>
                       </m:func>
                       <m:r>
-                        <a:rPr lang="it-IT" sz="1800" i="1">
+                        <a:rPr lang="it-IT" sz="1600" i="1">
                           <a:latin typeface="Cambria Math" panose="02040503050406030204" pitchFamily="18" charset="0"/>
                           <a:ea typeface="Cambria Math" panose="02040503050406030204" pitchFamily="18" charset="0"/>
                         </a:rPr>
@@ -16991,7 +17321,7 @@
                       <m:d>
                         <m:dPr>
                           <m:ctrlPr>
-                            <a:rPr lang="it-IT" sz="1800" i="1">
+                            <a:rPr lang="it-IT" sz="1600" i="1">
                               <a:latin typeface="Cambria Math" panose="02040503050406030204" pitchFamily="18" charset="0"/>
                               <a:ea typeface="Cambria Math" panose="02040503050406030204" pitchFamily="18" charset="0"/>
                             </a:rPr>
@@ -16999,14 +17329,14 @@
                         </m:dPr>
                         <m:e>
                           <m:r>
-                            <a:rPr lang="it-IT" sz="1800" i="1">
+                            <a:rPr lang="it-IT" sz="1600" i="1">
                               <a:latin typeface="Cambria Math" panose="02040503050406030204" pitchFamily="18" charset="0"/>
                               <a:ea typeface="Cambria Math" panose="02040503050406030204" pitchFamily="18" charset="0"/>
                             </a:rPr>
                             <m:t>1−</m:t>
                           </m:r>
                           <m:r>
-                            <a:rPr lang="it-IT" sz="1800" i="1">
+                            <a:rPr lang="it-IT" sz="1600" i="1">
                               <a:latin typeface="Cambria Math" panose="02040503050406030204" pitchFamily="18" charset="0"/>
                               <a:ea typeface="Cambria Math" panose="02040503050406030204" pitchFamily="18" charset="0"/>
                             </a:rPr>
@@ -17015,7 +17345,7 @@
                           <m:d>
                             <m:dPr>
                               <m:ctrlPr>
-                                <a:rPr lang="it-IT" sz="1800" i="1">
+                                <a:rPr lang="it-IT" sz="1600" i="1">
                                   <a:latin typeface="Cambria Math" panose="02040503050406030204" pitchFamily="18" charset="0"/>
                                   <a:ea typeface="Cambria Math" panose="02040503050406030204" pitchFamily="18" charset="0"/>
                                 </a:rPr>
@@ -17023,7 +17353,7 @@
                             </m:dPr>
                             <m:e>
                               <m:r>
-                                <a:rPr lang="it-IT" sz="1800" i="1">
+                                <a:rPr lang="it-IT" sz="1600" i="1">
                                   <a:latin typeface="Cambria Math" panose="02040503050406030204" pitchFamily="18" charset="0"/>
                                   <a:ea typeface="Cambria Math" panose="02040503050406030204" pitchFamily="18" charset="0"/>
                                 </a:rPr>
@@ -17036,7 +17366,7 @@
                       <m:func>
                         <m:funcPr>
                           <m:ctrlPr>
-                            <a:rPr lang="it-IT" sz="1800" i="1">
+                            <a:rPr lang="it-IT" sz="1600" i="1">
                               <a:latin typeface="Cambria Math" panose="02040503050406030204" pitchFamily="18" charset="0"/>
                               <a:ea typeface="Cambria Math" panose="02040503050406030204" pitchFamily="18" charset="0"/>
                             </a:rPr>
@@ -17047,7 +17377,7 @@
                             <m:rPr>
                               <m:sty m:val="p"/>
                             </m:rPr>
-                            <a:rPr lang="it-IT" sz="1800">
+                            <a:rPr lang="it-IT" sz="1600">
                               <a:latin typeface="Cambria Math" panose="02040503050406030204" pitchFamily="18" charset="0"/>
                               <a:ea typeface="Cambria Math" panose="02040503050406030204" pitchFamily="18" charset="0"/>
                             </a:rPr>
@@ -17058,7 +17388,7 @@
                           <m:f>
                             <m:fPr>
                               <m:ctrlPr>
-                                <a:rPr lang="it-IT" sz="1800" i="1">
+                                <a:rPr lang="it-IT" sz="1600" i="1">
                                   <a:latin typeface="Cambria Math" panose="02040503050406030204" pitchFamily="18" charset="0"/>
                                   <a:ea typeface="Cambria Math" panose="02040503050406030204" pitchFamily="18" charset="0"/>
                                 </a:rPr>
@@ -17066,14 +17396,14 @@
                             </m:fPr>
                             <m:num>
                               <m:r>
-                                <a:rPr lang="it-IT" sz="1800" i="1">
+                                <a:rPr lang="it-IT" sz="1600" i="1">
                                   <a:latin typeface="Cambria Math" panose="02040503050406030204" pitchFamily="18" charset="0"/>
                                   <a:ea typeface="Cambria Math" panose="02040503050406030204" pitchFamily="18" charset="0"/>
                                 </a:rPr>
                                 <m:t>1−</m:t>
                               </m:r>
                               <m:r>
-                                <a:rPr lang="it-IT" sz="1800" i="1">
+                                <a:rPr lang="it-IT" sz="1600" i="1">
                                   <a:latin typeface="Cambria Math" panose="02040503050406030204" pitchFamily="18" charset="0"/>
                                   <a:ea typeface="Cambria Math" panose="02040503050406030204" pitchFamily="18" charset="0"/>
                                 </a:rPr>
@@ -17082,7 +17412,7 @@
                               <m:d>
                                 <m:dPr>
                                   <m:ctrlPr>
-                                    <a:rPr lang="it-IT" sz="1800" i="1">
+                                    <a:rPr lang="it-IT" sz="1600" i="1">
                                       <a:latin typeface="Cambria Math" panose="02040503050406030204" pitchFamily="18" charset="0"/>
                                       <a:ea typeface="Cambria Math" panose="02040503050406030204" pitchFamily="18" charset="0"/>
                                     </a:rPr>
@@ -17090,7 +17420,7 @@
                                 </m:dPr>
                                 <m:e>
                                   <m:r>
-                                    <a:rPr lang="it-IT" sz="1800" i="1">
+                                    <a:rPr lang="it-IT" sz="1600" i="1">
                                       <a:latin typeface="Cambria Math" panose="02040503050406030204" pitchFamily="18" charset="0"/>
                                       <a:ea typeface="Cambria Math" panose="02040503050406030204" pitchFamily="18" charset="0"/>
                                     </a:rPr>
@@ -17101,14 +17431,14 @@
                             </m:num>
                             <m:den>
                               <m:r>
-                                <a:rPr lang="it-IT" sz="1800" i="1">
+                                <a:rPr lang="it-IT" sz="1600" i="1">
                                   <a:latin typeface="Cambria Math" panose="02040503050406030204" pitchFamily="18" charset="0"/>
                                   <a:ea typeface="Cambria Math" panose="02040503050406030204" pitchFamily="18" charset="0"/>
                                 </a:rPr>
                                 <m:t>1−</m:t>
                               </m:r>
                               <m:r>
-                                <a:rPr lang="it-IT" sz="1800" i="1">
+                                <a:rPr lang="it-IT" sz="1600" i="1">
                                   <a:latin typeface="Cambria Math" panose="02040503050406030204" pitchFamily="18" charset="0"/>
                                   <a:ea typeface="Cambria Math" panose="02040503050406030204" pitchFamily="18" charset="0"/>
                                 </a:rPr>
@@ -17117,7 +17447,7 @@
                               <m:d>
                                 <m:dPr>
                                   <m:ctrlPr>
-                                    <a:rPr lang="it-IT" sz="1800" i="1">
+                                    <a:rPr lang="it-IT" sz="1600" i="1">
                                       <a:latin typeface="Cambria Math" panose="02040503050406030204" pitchFamily="18" charset="0"/>
                                       <a:ea typeface="Cambria Math" panose="02040503050406030204" pitchFamily="18" charset="0"/>
                                     </a:rPr>
@@ -17125,7 +17455,7 @@
                                 </m:dPr>
                                 <m:e>
                                   <m:r>
-                                    <a:rPr lang="it-IT" sz="1800" i="1">
+                                    <a:rPr lang="it-IT" sz="1600" i="1">
                                       <a:latin typeface="Cambria Math" panose="02040503050406030204" pitchFamily="18" charset="0"/>
                                       <a:ea typeface="Cambria Math" panose="02040503050406030204" pitchFamily="18" charset="0"/>
                                     </a:rPr>
@@ -17138,7 +17468,7 @@
                         </m:e>
                       </m:func>
                       <m:r>
-                        <a:rPr lang="it-IT" sz="1800" smtClean="0">
+                        <a:rPr lang="it-IT" sz="1600" smtClean="0">
                           <a:latin typeface="Cambria Math" panose="02040503050406030204" pitchFamily="18" charset="0"/>
                           <a:ea typeface="Cambria Math" panose="02040503050406030204" pitchFamily="18" charset="0"/>
                           <a:cs typeface="Times New Roman" panose="02020603050405020304" pitchFamily="18" charset="0"/>
@@ -17148,7 +17478,7 @@
                       <m:sSup>
                         <m:sSupPr>
                           <m:ctrlPr>
-                            <a:rPr lang="it-IT" sz="1800" i="1">
+                            <a:rPr lang="it-IT" sz="1600" i="1">
                               <a:latin typeface="Cambria Math" panose="02040503050406030204" pitchFamily="18" charset="0"/>
                               <a:ea typeface="Cambria Math" panose="02040503050406030204" pitchFamily="18" charset="0"/>
                             </a:rPr>
@@ -17156,7 +17486,7 @@
                         </m:sSupPr>
                         <m:e>
                           <m:r>
-                            <a:rPr lang="it-IT" sz="1800" i="1">
+                            <a:rPr lang="it-IT" sz="1600" i="1">
                               <a:latin typeface="Cambria Math" panose="02040503050406030204" pitchFamily="18" charset="0"/>
                               <a:ea typeface="Cambria Math" panose="02040503050406030204" pitchFamily="18" charset="0"/>
                             </a:rPr>
@@ -17165,7 +17495,7 @@
                         </m:e>
                         <m:sup>
                           <m:r>
-                            <a:rPr lang="it-IT" sz="1800" i="1">
+                            <a:rPr lang="it-IT" sz="1600" i="1">
                               <a:latin typeface="Cambria Math" panose="02040503050406030204" pitchFamily="18" charset="0"/>
                               <a:ea typeface="Cambria Math" panose="02040503050406030204" pitchFamily="18" charset="0"/>
                             </a:rPr>
@@ -17174,7 +17504,7 @@
                           <m:sSup>
                             <m:sSupPr>
                               <m:ctrlPr>
-                                <a:rPr lang="it-IT" sz="1800" i="1">
+                                <a:rPr lang="it-IT" sz="1600" i="1">
                                   <a:latin typeface="Cambria Math" panose="02040503050406030204" pitchFamily="18" charset="0"/>
                                   <a:ea typeface="Cambria Math" panose="02040503050406030204" pitchFamily="18" charset="0"/>
                                 </a:rPr>
@@ -17182,7 +17512,7 @@
                             </m:sSupPr>
                             <m:e>
                               <m:r>
-                                <a:rPr lang="it-IT" sz="1800" i="1">
+                                <a:rPr lang="it-IT" sz="1600" i="1">
                                   <a:latin typeface="Cambria Math" panose="02040503050406030204" pitchFamily="18" charset="0"/>
                                   <a:ea typeface="Cambria Math" panose="02040503050406030204" pitchFamily="18" charset="0"/>
                                 </a:rPr>
@@ -17191,7 +17521,7 @@
                             </m:e>
                             <m:sup>
                               <m:r>
-                                <a:rPr lang="it-IT" sz="1800" i="1">
+                                <a:rPr lang="it-IT" sz="1600" i="1">
                                   <a:latin typeface="Cambria Math" panose="02040503050406030204" pitchFamily="18" charset="0"/>
                                   <a:ea typeface="Cambria Math" panose="02040503050406030204" pitchFamily="18" charset="0"/>
                                 </a:rPr>
@@ -17204,7 +17534,7 @@
                       <m:func>
                         <m:funcPr>
                           <m:ctrlPr>
-                            <a:rPr lang="it-IT" sz="1800" i="1">
+                            <a:rPr lang="it-IT" sz="1600" i="1">
                               <a:latin typeface="Cambria Math" panose="02040503050406030204" pitchFamily="18" charset="0"/>
                               <a:ea typeface="Cambria Math" panose="02040503050406030204" pitchFamily="18" charset="0"/>
                             </a:rPr>
@@ -17215,7 +17545,7 @@
                             <m:rPr>
                               <m:sty m:val="p"/>
                             </m:rPr>
-                            <a:rPr lang="it-IT" sz="1800">
+                            <a:rPr lang="it-IT" sz="1600">
                               <a:latin typeface="Cambria Math" panose="02040503050406030204" pitchFamily="18" charset="0"/>
                               <a:ea typeface="Cambria Math" panose="02040503050406030204" pitchFamily="18" charset="0"/>
                             </a:rPr>
@@ -17226,7 +17556,7 @@
                           <m:d>
                             <m:dPr>
                               <m:ctrlPr>
-                                <a:rPr lang="it-IT" sz="1800" i="1">
+                                <a:rPr lang="it-IT" sz="1600" i="1">
                                   <a:latin typeface="Cambria Math" panose="02040503050406030204" pitchFamily="18" charset="0"/>
                                   <a:ea typeface="Cambria Math" panose="02040503050406030204" pitchFamily="18" charset="0"/>
                                 </a:rPr>
@@ -17234,7 +17564,7 @@
                             </m:dPr>
                             <m:e>
                               <m:r>
-                                <a:rPr lang="it-IT" sz="1800" i="1">
+                                <a:rPr lang="it-IT" sz="1600" i="1">
                                   <a:latin typeface="Cambria Math" panose="02040503050406030204" pitchFamily="18" charset="0"/>
                                   <a:ea typeface="Cambria Math" panose="02040503050406030204" pitchFamily="18" charset="0"/>
                                 </a:rPr>
@@ -17243,7 +17573,7 @@
                               <m:sSup>
                                 <m:sSupPr>
                                   <m:ctrlPr>
-                                    <a:rPr lang="it-IT" sz="1800" i="1">
+                                    <a:rPr lang="it-IT" sz="1600" i="1">
                                       <a:latin typeface="Cambria Math" panose="02040503050406030204" pitchFamily="18" charset="0"/>
                                       <a:ea typeface="Cambria Math" panose="02040503050406030204" pitchFamily="18" charset="0"/>
                                     </a:rPr>
@@ -17251,7 +17581,7 @@
                                 </m:sSupPr>
                                 <m:e>
                                   <m:r>
-                                    <a:rPr lang="it-IT" sz="1800" i="1">
+                                    <a:rPr lang="it-IT" sz="1600" i="1">
                                       <a:latin typeface="Cambria Math" panose="02040503050406030204" pitchFamily="18" charset="0"/>
                                       <a:ea typeface="Cambria Math" panose="02040503050406030204" pitchFamily="18" charset="0"/>
                                     </a:rPr>
@@ -17260,7 +17590,7 @@
                                 </m:e>
                                 <m:sup>
                                   <m:r>
-                                    <a:rPr lang="it-IT" sz="1800" i="1">
+                                    <a:rPr lang="it-IT" sz="1600" i="1">
                                       <a:latin typeface="Cambria Math" panose="02040503050406030204" pitchFamily="18" charset="0"/>
                                       <a:ea typeface="Cambria Math" panose="02040503050406030204" pitchFamily="18" charset="0"/>
                                     </a:rPr>
@@ -17273,7 +17603,7 @@
                         </m:e>
                       </m:func>
                       <m:r>
-                        <a:rPr lang="it-IT" sz="1800" i="1">
+                        <a:rPr lang="it-IT" sz="1600" i="1">
                           <a:latin typeface="Cambria Math" panose="02040503050406030204" pitchFamily="18" charset="0"/>
                           <a:ea typeface="Cambria Math" panose="02040503050406030204" pitchFamily="18" charset="0"/>
                         </a:rPr>
@@ -17282,7 +17612,7 @@
                       <m:d>
                         <m:dPr>
                           <m:ctrlPr>
-                            <a:rPr lang="it-IT" sz="1800" i="1">
+                            <a:rPr lang="it-IT" sz="1600" i="1">
                               <a:latin typeface="Cambria Math" panose="02040503050406030204" pitchFamily="18" charset="0"/>
                               <a:ea typeface="Cambria Math" panose="02040503050406030204" pitchFamily="18" charset="0"/>
                             </a:rPr>
@@ -17290,7 +17620,7 @@
                         </m:dPr>
                         <m:e>
                           <m:r>
-                            <a:rPr lang="it-IT" sz="1800" i="1">
+                            <a:rPr lang="it-IT" sz="1600" i="1">
                               <a:latin typeface="Cambria Math" panose="02040503050406030204" pitchFamily="18" charset="0"/>
                               <a:ea typeface="Cambria Math" panose="02040503050406030204" pitchFamily="18" charset="0"/>
                             </a:rPr>
@@ -17299,7 +17629,7 @@
                           <m:sSup>
                             <m:sSupPr>
                               <m:ctrlPr>
-                                <a:rPr lang="it-IT" sz="1800" i="1">
+                                <a:rPr lang="it-IT" sz="1600" i="1">
                                   <a:latin typeface="Cambria Math" panose="02040503050406030204" pitchFamily="18" charset="0"/>
                                   <a:ea typeface="Cambria Math" panose="02040503050406030204" pitchFamily="18" charset="0"/>
                                 </a:rPr>
@@ -17307,7 +17637,7 @@
                             </m:sSupPr>
                             <m:e>
                               <m:r>
-                                <a:rPr lang="it-IT" sz="1800" i="1">
+                                <a:rPr lang="it-IT" sz="1600" i="1">
                                   <a:latin typeface="Cambria Math" panose="02040503050406030204" pitchFamily="18" charset="0"/>
                                   <a:ea typeface="Cambria Math" panose="02040503050406030204" pitchFamily="18" charset="0"/>
                                 </a:rPr>
@@ -17316,7 +17646,7 @@
                             </m:e>
                             <m:sup>
                               <m:r>
-                                <a:rPr lang="it-IT" sz="1800" i="1">
+                                <a:rPr lang="it-IT" sz="1600" i="1">
                                   <a:latin typeface="Cambria Math" panose="02040503050406030204" pitchFamily="18" charset="0"/>
                                   <a:ea typeface="Cambria Math" panose="02040503050406030204" pitchFamily="18" charset="0"/>
                                 </a:rPr>
@@ -17325,7 +17655,7 @@
                               <m:sSup>
                                 <m:sSupPr>
                                   <m:ctrlPr>
-                                    <a:rPr lang="it-IT" sz="1800" i="1">
+                                    <a:rPr lang="it-IT" sz="1600" i="1">
                                       <a:latin typeface="Cambria Math" panose="02040503050406030204" pitchFamily="18" charset="0"/>
                                       <a:ea typeface="Cambria Math" panose="02040503050406030204" pitchFamily="18" charset="0"/>
                                     </a:rPr>
@@ -17333,7 +17663,7 @@
                                 </m:sSupPr>
                                 <m:e>
                                   <m:r>
-                                    <a:rPr lang="it-IT" sz="1800" i="1">
+                                    <a:rPr lang="it-IT" sz="1600" i="1">
                                       <a:latin typeface="Cambria Math" panose="02040503050406030204" pitchFamily="18" charset="0"/>
                                       <a:ea typeface="Cambria Math" panose="02040503050406030204" pitchFamily="18" charset="0"/>
                                     </a:rPr>
@@ -17342,7 +17672,7 @@
                                 </m:e>
                                 <m:sup>
                                   <m:r>
-                                    <a:rPr lang="it-IT" sz="1800" i="1">
+                                    <a:rPr lang="it-IT" sz="1600" i="1">
                                       <a:latin typeface="Cambria Math" panose="02040503050406030204" pitchFamily="18" charset="0"/>
                                       <a:ea typeface="Cambria Math" panose="02040503050406030204" pitchFamily="18" charset="0"/>
                                     </a:rPr>
@@ -17357,7 +17687,7 @@
                       <m:func>
                         <m:funcPr>
                           <m:ctrlPr>
-                            <a:rPr lang="it-IT" sz="1800" i="1">
+                            <a:rPr lang="it-IT" sz="1600" i="1">
                               <a:latin typeface="Cambria Math" panose="02040503050406030204" pitchFamily="18" charset="0"/>
                               <a:ea typeface="Cambria Math" panose="02040503050406030204" pitchFamily="18" charset="0"/>
                             </a:rPr>
@@ -17368,7 +17698,7 @@
                             <m:rPr>
                               <m:sty m:val="p"/>
                             </m:rPr>
-                            <a:rPr lang="it-IT" sz="1800">
+                            <a:rPr lang="it-IT" sz="1600">
                               <a:latin typeface="Cambria Math" panose="02040503050406030204" pitchFamily="18" charset="0"/>
                               <a:ea typeface="Cambria Math" panose="02040503050406030204" pitchFamily="18" charset="0"/>
                             </a:rPr>
@@ -17379,7 +17709,7 @@
                           <m:d>
                             <m:dPr>
                               <m:ctrlPr>
-                                <a:rPr lang="it-IT" sz="1800" i="1">
+                                <a:rPr lang="it-IT" sz="1600" i="1">
                                   <a:latin typeface="Cambria Math" panose="02040503050406030204" pitchFamily="18" charset="0"/>
                                   <a:ea typeface="Cambria Math" panose="02040503050406030204" pitchFamily="18" charset="0"/>
                                 </a:rPr>
@@ -17389,7 +17719,7 @@
                               <m:f>
                                 <m:fPr>
                                   <m:ctrlPr>
-                                    <a:rPr lang="it-IT" sz="1800" i="1">
+                                    <a:rPr lang="it-IT" sz="1600" i="1">
                                       <a:latin typeface="Cambria Math" panose="02040503050406030204" pitchFamily="18" charset="0"/>
                                       <a:ea typeface="Cambria Math" panose="02040503050406030204" pitchFamily="18" charset="0"/>
                                     </a:rPr>
@@ -17397,7 +17727,7 @@
                                 </m:fPr>
                                 <m:num>
                                   <m:r>
-                                    <a:rPr lang="it-IT" sz="1800" i="1">
+                                    <a:rPr lang="it-IT" sz="1600" i="1">
                                       <a:latin typeface="Cambria Math" panose="02040503050406030204" pitchFamily="18" charset="0"/>
                                       <a:ea typeface="Cambria Math" panose="02040503050406030204" pitchFamily="18" charset="0"/>
                                     </a:rPr>
@@ -17406,7 +17736,7 @@
                                   <m:sSup>
                                     <m:sSupPr>
                                       <m:ctrlPr>
-                                        <a:rPr lang="it-IT" sz="1800" i="1">
+                                        <a:rPr lang="it-IT" sz="1600" i="1">
                                           <a:latin typeface="Cambria Math" panose="02040503050406030204" pitchFamily="18" charset="0"/>
                                           <a:ea typeface="Cambria Math" panose="02040503050406030204" pitchFamily="18" charset="0"/>
                                         </a:rPr>
@@ -17414,7 +17744,7 @@
                                     </m:sSupPr>
                                     <m:e>
                                       <m:r>
-                                        <a:rPr lang="it-IT" sz="1800" i="1">
+                                        <a:rPr lang="it-IT" sz="1600" i="1">
                                           <a:latin typeface="Cambria Math" panose="02040503050406030204" pitchFamily="18" charset="0"/>
                                           <a:ea typeface="Cambria Math" panose="02040503050406030204" pitchFamily="18" charset="0"/>
                                         </a:rPr>
@@ -17423,7 +17753,7 @@
                                     </m:e>
                                     <m:sup>
                                       <m:r>
-                                        <a:rPr lang="it-IT" sz="1800" i="1">
+                                        <a:rPr lang="it-IT" sz="1600" i="1">
                                           <a:latin typeface="Cambria Math" panose="02040503050406030204" pitchFamily="18" charset="0"/>
                                           <a:ea typeface="Cambria Math" panose="02040503050406030204" pitchFamily="18" charset="0"/>
                                         </a:rPr>
@@ -17436,7 +17766,7 @@
                                   <m:sSup>
                                     <m:sSupPr>
                                       <m:ctrlPr>
-                                        <a:rPr lang="it-IT" sz="1800" i="1">
+                                        <a:rPr lang="it-IT" sz="1600" i="1">
                                           <a:latin typeface="Cambria Math" panose="02040503050406030204" pitchFamily="18" charset="0"/>
                                           <a:ea typeface="Cambria Math" panose="02040503050406030204" pitchFamily="18" charset="0"/>
                                         </a:rPr>
@@ -17444,7 +17774,7 @@
                                     </m:sSupPr>
                                     <m:e>
                                       <m:r>
-                                        <a:rPr lang="it-IT" sz="1800" i="1">
+                                        <a:rPr lang="it-IT" sz="1600" i="1">
                                           <a:latin typeface="Cambria Math" panose="02040503050406030204" pitchFamily="18" charset="0"/>
                                           <a:ea typeface="Cambria Math" panose="02040503050406030204" pitchFamily="18" charset="0"/>
                                         </a:rPr>
@@ -17453,7 +17783,7 @@
                                     </m:e>
                                     <m:sup>
                                       <m:r>
-                                        <a:rPr lang="it-IT" sz="1800" i="1">
+                                        <a:rPr lang="it-IT" sz="1600" i="1">
                                           <a:latin typeface="Cambria Math" panose="02040503050406030204" pitchFamily="18" charset="0"/>
                                           <a:ea typeface="Cambria Math" panose="02040503050406030204" pitchFamily="18" charset="0"/>
                                         </a:rPr>
@@ -17470,7 +17800,7 @@
                     </m:oMath>
                   </m:oMathPara>
                 </a14:m>
-                <a:endParaRPr lang="it-IT" sz="1800" dirty="0">
+                <a:endParaRPr lang="it-IT" sz="1600" dirty="0">
                   <a:latin typeface="Cambria Math" panose="02040503050406030204" pitchFamily="18" charset="0"/>
                   <a:ea typeface="Cambria Math" panose="02040503050406030204" pitchFamily="18" charset="0"/>
                   <a:cs typeface="Times New Roman" panose="02020603050405020304" pitchFamily="18" charset="0"/>
@@ -17494,7 +17824,7 @@
                     </m:oMathParaPr>
                     <m:oMath xmlns:m="http://schemas.openxmlformats.org/officeDocument/2006/math">
                       <m:r>
-                        <a:rPr lang="en-US" sz="1800" i="1" smtClean="0">
+                        <a:rPr lang="en-US" sz="1600" i="1" smtClean="0">
                           <a:latin typeface="Cambria Math" panose="02040503050406030204" pitchFamily="18" charset="0"/>
                           <a:ea typeface="Cambria Math" panose="02040503050406030204" pitchFamily="18" charset="0"/>
                           <a:cs typeface="Times New Roman" panose="02020603050405020304" pitchFamily="18" charset="0"/>
@@ -17502,7 +17832,7 @@
                         <m:t>𝑋</m:t>
                       </m:r>
                       <m:r>
-                        <a:rPr lang="en-US" sz="1800" i="1" smtClean="0">
+                        <a:rPr lang="en-US" sz="1600" i="1" smtClean="0">
                           <a:latin typeface="Cambria Math" panose="02040503050406030204" pitchFamily="18" charset="0"/>
                           <a:ea typeface="Cambria Math" panose="02040503050406030204" pitchFamily="18" charset="0"/>
                           <a:cs typeface="Times New Roman" panose="02020603050405020304" pitchFamily="18" charset="0"/>
@@ -17510,7 +17840,7 @@
                         <m:t>→0:</m:t>
                       </m:r>
                       <m:r>
-                        <a:rPr lang="en-US" sz="1800" b="0" i="1" smtClean="0">
+                        <a:rPr lang="en-US" sz="1600" b="0" i="1" smtClean="0">
                           <a:latin typeface="Cambria Math" panose="02040503050406030204" pitchFamily="18" charset="0"/>
                           <a:ea typeface="Cambria Math" panose="02040503050406030204" pitchFamily="18" charset="0"/>
                           <a:cs typeface="Times New Roman" panose="02020603050405020304" pitchFamily="18" charset="0"/>
@@ -17520,7 +17850,7 @@
                       <m:d>
                         <m:dPr>
                           <m:ctrlPr>
-                            <a:rPr lang="en-US" sz="1800" i="1" smtClean="0">
+                            <a:rPr lang="en-US" sz="1600" i="1" smtClean="0">
                               <a:latin typeface="Cambria Math" panose="02040503050406030204" pitchFamily="18" charset="0"/>
                               <a:ea typeface="Cambria Math" panose="02040503050406030204" pitchFamily="18" charset="0"/>
                               <a:cs typeface="Times New Roman" panose="02020603050405020304" pitchFamily="18" charset="0"/>
@@ -17529,7 +17859,7 @@
                         </m:dPr>
                         <m:e>
                           <m:r>
-                            <a:rPr lang="en-US" sz="1800" i="1" smtClean="0">
+                            <a:rPr lang="en-US" sz="1600" i="1" smtClean="0">
                               <a:latin typeface="Cambria Math" panose="02040503050406030204" pitchFamily="18" charset="0"/>
                               <a:ea typeface="Cambria Math" panose="02040503050406030204" pitchFamily="18" charset="0"/>
                               <a:cs typeface="Times New Roman" panose="02020603050405020304" pitchFamily="18" charset="0"/>
@@ -17537,7 +17867,7 @@
                             <m:t>𝑋</m:t>
                           </m:r>
                           <m:r>
-                            <a:rPr lang="en-US" sz="1800" i="1" smtClean="0">
+                            <a:rPr lang="en-US" sz="1600" i="1" smtClean="0">
                               <a:latin typeface="Cambria Math" panose="02040503050406030204" pitchFamily="18" charset="0"/>
                               <a:ea typeface="Cambria Math" panose="02040503050406030204" pitchFamily="18" charset="0"/>
                               <a:cs typeface="Times New Roman" panose="02020603050405020304" pitchFamily="18" charset="0"/>
@@ -17545,7 +17875,7 @@
                             <m:t>,</m:t>
                           </m:r>
                           <m:r>
-                            <a:rPr lang="en-US" sz="1800" i="1" smtClean="0">
+                            <a:rPr lang="en-US" sz="1600" i="1" smtClean="0">
                               <a:latin typeface="Cambria Math" panose="02040503050406030204" pitchFamily="18" charset="0"/>
                               <a:ea typeface="Cambria Math" panose="02040503050406030204" pitchFamily="18" charset="0"/>
                               <a:cs typeface="Times New Roman" panose="02020603050405020304" pitchFamily="18" charset="0"/>
@@ -17555,7 +17885,7 @@
                         </m:e>
                       </m:d>
                       <m:r>
-                        <a:rPr lang="en-US" sz="1800" i="1" smtClean="0">
+                        <a:rPr lang="en-US" sz="1600" i="1" smtClean="0">
                           <a:latin typeface="Cambria Math" panose="02040503050406030204" pitchFamily="18" charset="0"/>
                           <a:ea typeface="Cambria Math" panose="02040503050406030204" pitchFamily="18" charset="0"/>
                           <a:cs typeface="Times New Roman" panose="02020603050405020304" pitchFamily="18" charset="0"/>
@@ -17565,7 +17895,7 @@
                       <m:func>
                         <m:funcPr>
                           <m:ctrlPr>
-                            <a:rPr lang="it-IT" sz="1800" i="1">
+                            <a:rPr lang="it-IT" sz="1600" i="1">
                               <a:latin typeface="Cambria Math" panose="02040503050406030204" pitchFamily="18" charset="0"/>
                               <a:ea typeface="Cambria Math" panose="02040503050406030204" pitchFamily="18" charset="0"/>
                               <a:cs typeface="Times New Roman" panose="02020603050405020304" pitchFamily="18" charset="0"/>
@@ -17577,7 +17907,7 @@
                             <m:rPr>
                               <m:sty m:val="p"/>
                             </m:rPr>
-                            <a:rPr lang="it-IT" sz="1800">
+                            <a:rPr lang="it-IT" sz="1600">
                               <a:latin typeface="Cambria Math" panose="02040503050406030204" pitchFamily="18" charset="0"/>
                               <a:ea typeface="Cambria Math" panose="02040503050406030204" pitchFamily="18" charset="0"/>
                               <a:cs typeface="Times New Roman" panose="02020603050405020304" pitchFamily="18" charset="0"/>
@@ -17589,7 +17919,7 @@
                           <m:d>
                             <m:dPr>
                               <m:ctrlPr>
-                                <a:rPr lang="it-IT" sz="1800" i="1">
+                                <a:rPr lang="it-IT" sz="1600" i="1">
                                   <a:latin typeface="Cambria Math" panose="02040503050406030204" pitchFamily="18" charset="0"/>
                                   <a:ea typeface="Cambria Math" panose="02040503050406030204" pitchFamily="18" charset="0"/>
                                   <a:cs typeface="Times New Roman" panose="02020603050405020304" pitchFamily="18" charset="0"/>
@@ -17598,7 +17928,7 @@
                             </m:dPr>
                             <m:e>
                               <m:r>
-                                <a:rPr lang="it-IT" sz="1800" i="1">
+                                <a:rPr lang="it-IT" sz="1600" i="1">
                                   <a:latin typeface="Cambria Math" panose="02040503050406030204" pitchFamily="18" charset="0"/>
                                   <a:ea typeface="Cambria Math" panose="02040503050406030204" pitchFamily="18" charset="0"/>
                                   <a:cs typeface="Times New Roman" panose="02020603050405020304" pitchFamily="18" charset="0"/>
@@ -17608,7 +17938,7 @@
                               <m:sSup>
                                 <m:sSupPr>
                                   <m:ctrlPr>
-                                    <a:rPr lang="it-IT" sz="1800" i="1">
+                                    <a:rPr lang="it-IT" sz="1600" i="1">
                                       <a:latin typeface="Cambria Math" panose="02040503050406030204" pitchFamily="18" charset="0"/>
                                       <a:ea typeface="Cambria Math" panose="02040503050406030204" pitchFamily="18" charset="0"/>
                                       <a:cs typeface="Times New Roman" panose="02020603050405020304" pitchFamily="18" charset="0"/>
@@ -17617,7 +17947,7 @@
                                 </m:sSupPr>
                                 <m:e>
                                   <m:r>
-                                    <a:rPr lang="it-IT" sz="1800" i="1">
+                                    <a:rPr lang="it-IT" sz="1600" i="1">
                                       <a:latin typeface="Cambria Math" panose="02040503050406030204" pitchFamily="18" charset="0"/>
                                       <a:ea typeface="Cambria Math" panose="02040503050406030204" pitchFamily="18" charset="0"/>
                                       <a:cs typeface="Times New Roman" panose="02020603050405020304" pitchFamily="18" charset="0"/>
@@ -17627,7 +17957,7 @@
                                 </m:e>
                                 <m:sup>
                                   <m:r>
-                                    <a:rPr lang="it-IT" sz="1800" i="1">
+                                    <a:rPr lang="it-IT" sz="1600" i="1">
                                       <a:latin typeface="Cambria Math" panose="02040503050406030204" pitchFamily="18" charset="0"/>
                                       <a:ea typeface="Cambria Math" panose="02040503050406030204" pitchFamily="18" charset="0"/>
                                       <a:cs typeface="Times New Roman" panose="02020603050405020304" pitchFamily="18" charset="0"/>
@@ -17643,7 +17973,7 @@
                     </m:oMath>
                   </m:oMathPara>
                 </a14:m>
-                <a:endParaRPr lang="it-IT" sz="1800" dirty="0">
+                <a:endParaRPr lang="it-IT" sz="1600" dirty="0">
                   <a:latin typeface="Cambria Math" panose="02040503050406030204" pitchFamily="18" charset="0"/>
                   <a:ea typeface="Cambria Math" panose="02040503050406030204" pitchFamily="18" charset="0"/>
                   <a:cs typeface="Times New Roman" panose="02020603050405020304" pitchFamily="18" charset="0"/>
@@ -17661,7 +17991,7 @@
                   <a:buNone/>
                 </a:pPr>
                 <a:r>
-                  <a:rPr lang="en-US" sz="1800" dirty="0">
+                  <a:rPr lang="en-US" sz="1600" dirty="0">
                     <a:latin typeface="Cambria Math" panose="02040503050406030204" pitchFamily="18" charset="0"/>
                     <a:ea typeface="Cambria Math" panose="02040503050406030204" pitchFamily="18" charset="0"/>
                     <a:cs typeface="Times New Roman" panose="02020603050405020304" pitchFamily="18" charset="0"/>
@@ -17671,7 +18001,7 @@
                 <a14:m>
                   <m:oMath xmlns:m="http://schemas.openxmlformats.org/officeDocument/2006/math">
                     <m:r>
-                      <a:rPr lang="en-US" sz="1800" i="1" smtClean="0">
+                      <a:rPr lang="en-US" sz="1600" i="1" smtClean="0">
                         <a:latin typeface="Cambria Math" panose="02040503050406030204" pitchFamily="18" charset="0"/>
                         <a:ea typeface="Cambria Math" panose="02040503050406030204" pitchFamily="18" charset="0"/>
                         <a:cs typeface="Times New Roman" panose="02020603050405020304" pitchFamily="18" charset="0"/>
@@ -17679,7 +18009,7 @@
                       <m:t>𝑌</m:t>
                     </m:r>
                     <m:r>
-                      <a:rPr lang="en-US" sz="1800" i="1" smtClean="0">
+                      <a:rPr lang="en-US" sz="1600" i="1" smtClean="0">
                         <a:latin typeface="Cambria Math" panose="02040503050406030204" pitchFamily="18" charset="0"/>
                         <a:ea typeface="Cambria Math" panose="02040503050406030204" pitchFamily="18" charset="0"/>
                         <a:cs typeface="Times New Roman" panose="02020603050405020304" pitchFamily="18" charset="0"/>
@@ -17687,7 +18017,7 @@
                       <m:t> →0:</m:t>
                     </m:r>
                     <m:r>
-                      <a:rPr lang="en-US" sz="1800" b="0" i="1" smtClean="0">
+                      <a:rPr lang="en-US" sz="1600" b="0" i="1" smtClean="0">
                         <a:latin typeface="Cambria Math" panose="02040503050406030204" pitchFamily="18" charset="0"/>
                         <a:ea typeface="Cambria Math" panose="02040503050406030204" pitchFamily="18" charset="0"/>
                         <a:cs typeface="Times New Roman" panose="02020603050405020304" pitchFamily="18" charset="0"/>
@@ -17697,7 +18027,7 @@
                     <m:d>
                       <m:dPr>
                         <m:ctrlPr>
-                          <a:rPr lang="en-US" sz="1800" i="1" smtClean="0">
+                          <a:rPr lang="en-US" sz="1600" i="1" smtClean="0">
                             <a:latin typeface="Cambria Math" panose="02040503050406030204" pitchFamily="18" charset="0"/>
                             <a:ea typeface="Cambria Math" panose="02040503050406030204" pitchFamily="18" charset="0"/>
                             <a:cs typeface="Times New Roman" panose="02020603050405020304" pitchFamily="18" charset="0"/>
@@ -17706,7 +18036,7 @@
                       </m:dPr>
                       <m:e>
                         <m:r>
-                          <a:rPr lang="en-US" sz="1800" i="1" smtClean="0">
+                          <a:rPr lang="en-US" sz="1600" i="1" smtClean="0">
                             <a:latin typeface="Cambria Math" panose="02040503050406030204" pitchFamily="18" charset="0"/>
                             <a:ea typeface="Cambria Math" panose="02040503050406030204" pitchFamily="18" charset="0"/>
                             <a:cs typeface="Times New Roman" panose="02020603050405020304" pitchFamily="18" charset="0"/>
@@ -17714,7 +18044,7 @@
                           <m:t>𝑋</m:t>
                         </m:r>
                         <m:r>
-                          <a:rPr lang="en-US" sz="1800" i="1" smtClean="0">
+                          <a:rPr lang="en-US" sz="1600" i="1" smtClean="0">
                             <a:latin typeface="Cambria Math" panose="02040503050406030204" pitchFamily="18" charset="0"/>
                             <a:ea typeface="Cambria Math" panose="02040503050406030204" pitchFamily="18" charset="0"/>
                             <a:cs typeface="Times New Roman" panose="02020603050405020304" pitchFamily="18" charset="0"/>
@@ -17722,7 +18052,7 @@
                           <m:t>,</m:t>
                         </m:r>
                         <m:r>
-                          <a:rPr lang="en-US" sz="1800" i="1" smtClean="0">
+                          <a:rPr lang="en-US" sz="1600" i="1" smtClean="0">
                             <a:latin typeface="Cambria Math" panose="02040503050406030204" pitchFamily="18" charset="0"/>
                             <a:ea typeface="Cambria Math" panose="02040503050406030204" pitchFamily="18" charset="0"/>
                             <a:cs typeface="Times New Roman" panose="02020603050405020304" pitchFamily="18" charset="0"/>
@@ -17732,7 +18062,7 @@
                       </m:e>
                     </m:d>
                     <m:r>
-                      <a:rPr lang="en-US" sz="1800" i="1" smtClean="0">
+                      <a:rPr lang="en-US" sz="1600" i="1" smtClean="0">
                         <a:latin typeface="Cambria Math" panose="02040503050406030204" pitchFamily="18" charset="0"/>
                         <a:ea typeface="Cambria Math" panose="02040503050406030204" pitchFamily="18" charset="0"/>
                         <a:cs typeface="Times New Roman" panose="02020603050405020304" pitchFamily="18" charset="0"/>
@@ -17741,7 +18071,7 @@
                     </m:r>
                   </m:oMath>
                 </a14:m>
-                <a:endParaRPr lang="it-IT" sz="1800" dirty="0">
+                <a:endParaRPr lang="it-IT" sz="1600" dirty="0">
                   <a:latin typeface="Cambria Math" panose="02040503050406030204" pitchFamily="18" charset="0"/>
                   <a:ea typeface="Cambria Math" panose="02040503050406030204" pitchFamily="18" charset="0"/>
                   <a:cs typeface="Times New Roman" panose="02020603050405020304" pitchFamily="18" charset="0"/>
@@ -17759,7 +18089,7 @@
                   <a:buNone/>
                 </a:pPr>
                 <a:r>
-                  <a:rPr lang="en-US" sz="1800" dirty="0">
+                  <a:rPr lang="en-US" sz="1600" dirty="0">
                     <a:latin typeface="Cambria Math" panose="02040503050406030204" pitchFamily="18" charset="0"/>
                     <a:ea typeface="Cambria Math" panose="02040503050406030204" pitchFamily="18" charset="0"/>
                     <a:cs typeface="Times New Roman" panose="02020603050405020304" pitchFamily="18" charset="0"/>
@@ -17769,7 +18099,7 @@
                 <a14:m>
                   <m:oMath xmlns:m="http://schemas.openxmlformats.org/officeDocument/2006/math">
                     <m:r>
-                      <a:rPr lang="en-US" sz="1800" i="1">
+                      <a:rPr lang="en-US" sz="1600" i="1">
                         <a:latin typeface="Cambria Math" panose="02040503050406030204" pitchFamily="18" charset="0"/>
                         <a:ea typeface="Cambria Math" panose="02040503050406030204" pitchFamily="18" charset="0"/>
                         <a:cs typeface="Times New Roman" panose="02020603050405020304" pitchFamily="18" charset="0"/>
@@ -17777,7 +18107,7 @@
                       <m:t>𝑌</m:t>
                     </m:r>
                     <m:r>
-                      <a:rPr lang="en-US" sz="1800" i="1">
+                      <a:rPr lang="en-US" sz="1600" i="1">
                         <a:latin typeface="Cambria Math" panose="02040503050406030204" pitchFamily="18" charset="0"/>
                         <a:ea typeface="Cambria Math" panose="02040503050406030204" pitchFamily="18" charset="0"/>
                         <a:cs typeface="Times New Roman" panose="02020603050405020304" pitchFamily="18" charset="0"/>
@@ -17785,7 +18115,7 @@
                       <m:t> →±∞:</m:t>
                     </m:r>
                     <m:r>
-                      <a:rPr lang="en-US" sz="1800" b="0" i="1" smtClean="0">
+                      <a:rPr lang="en-US" sz="1600" b="0" i="1" smtClean="0">
                         <a:latin typeface="Cambria Math" panose="02040503050406030204" pitchFamily="18" charset="0"/>
                         <a:ea typeface="Cambria Math" panose="02040503050406030204" pitchFamily="18" charset="0"/>
                         <a:cs typeface="Times New Roman" panose="02020603050405020304" pitchFamily="18" charset="0"/>
@@ -17795,7 +18125,7 @@
                     <m:d>
                       <m:dPr>
                         <m:ctrlPr>
-                          <a:rPr lang="en-US" sz="1800" i="1">
+                          <a:rPr lang="en-US" sz="1600" i="1">
                             <a:latin typeface="Cambria Math" panose="02040503050406030204" pitchFamily="18" charset="0"/>
                             <a:ea typeface="Cambria Math" panose="02040503050406030204" pitchFamily="18" charset="0"/>
                             <a:cs typeface="Times New Roman" panose="02020603050405020304" pitchFamily="18" charset="0"/>
@@ -17804,7 +18134,7 @@
                       </m:dPr>
                       <m:e>
                         <m:r>
-                          <a:rPr lang="en-US" sz="1800" i="1">
+                          <a:rPr lang="en-US" sz="1600" i="1">
                             <a:latin typeface="Cambria Math" panose="02040503050406030204" pitchFamily="18" charset="0"/>
                             <a:ea typeface="Cambria Math" panose="02040503050406030204" pitchFamily="18" charset="0"/>
                             <a:cs typeface="Times New Roman" panose="02020603050405020304" pitchFamily="18" charset="0"/>
@@ -17812,7 +18142,7 @@
                           <m:t>𝑋</m:t>
                         </m:r>
                         <m:r>
-                          <a:rPr lang="en-US" sz="1800" i="1">
+                          <a:rPr lang="en-US" sz="1600" i="1">
                             <a:latin typeface="Cambria Math" panose="02040503050406030204" pitchFamily="18" charset="0"/>
                             <a:ea typeface="Cambria Math" panose="02040503050406030204" pitchFamily="18" charset="0"/>
                             <a:cs typeface="Times New Roman" panose="02020603050405020304" pitchFamily="18" charset="0"/>
@@ -17820,7 +18150,7 @@
                           <m:t>,</m:t>
                         </m:r>
                         <m:r>
-                          <a:rPr lang="en-US" sz="1800" i="1">
+                          <a:rPr lang="en-US" sz="1600" i="1">
                             <a:latin typeface="Cambria Math" panose="02040503050406030204" pitchFamily="18" charset="0"/>
                             <a:ea typeface="Cambria Math" panose="02040503050406030204" pitchFamily="18" charset="0"/>
                             <a:cs typeface="Times New Roman" panose="02020603050405020304" pitchFamily="18" charset="0"/>
@@ -17830,7 +18160,7 @@
                       </m:e>
                     </m:d>
                     <m:r>
-                      <a:rPr lang="en-US" sz="1800" i="1">
+                      <a:rPr lang="en-US" sz="1600" i="1">
                         <a:latin typeface="Cambria Math" panose="02040503050406030204" pitchFamily="18" charset="0"/>
                         <a:ea typeface="Cambria Math" panose="02040503050406030204" pitchFamily="18" charset="0"/>
                         <a:cs typeface="Times New Roman" panose="02020603050405020304" pitchFamily="18" charset="0"/>
@@ -17838,7 +18168,7 @@
                       <m:t>→</m:t>
                     </m:r>
                     <m:r>
-                      <a:rPr lang="en-US" sz="1800" i="1" smtClean="0">
+                      <a:rPr lang="en-US" sz="1600" i="1" smtClean="0">
                         <a:latin typeface="Cambria Math" panose="02040503050406030204" pitchFamily="18" charset="0"/>
                         <a:ea typeface="Cambria Math" panose="02040503050406030204" pitchFamily="18" charset="0"/>
                         <a:cs typeface="Times New Roman" panose="02020603050405020304" pitchFamily="18" charset="0"/>
@@ -17847,7 +18177,7 @@
                     </m:r>
                   </m:oMath>
                 </a14:m>
-                <a:endParaRPr lang="it-IT" sz="1800" dirty="0">
+                <a:endParaRPr lang="it-IT" sz="1600" dirty="0">
                   <a:latin typeface="Cambria Math" panose="02040503050406030204" pitchFamily="18" charset="0"/>
                   <a:ea typeface="Cambria Math" panose="02040503050406030204" pitchFamily="18" charset="0"/>
                   <a:cs typeface="Times New Roman" panose="02020603050405020304" pitchFamily="18" charset="0"/>
@@ -17864,7 +18194,7 @@
                   <a:buNone/>
                 </a:pPr>
                 <a:r>
-                  <a:rPr lang="it-IT" sz="1800" dirty="0">
+                  <a:rPr lang="it-IT" sz="1600" dirty="0">
                     <a:latin typeface="Cambria Math" panose="02040503050406030204" pitchFamily="18" charset="0"/>
                     <a:ea typeface="Cambria Math" panose="02040503050406030204" pitchFamily="18" charset="0"/>
                     <a:cs typeface="Times New Roman" panose="02020603050405020304" pitchFamily="18" charset="0"/>
@@ -17874,7 +18204,7 @@
                 <a14:m>
                   <m:oMath xmlns:m="http://schemas.openxmlformats.org/officeDocument/2006/math">
                     <m:r>
-                      <a:rPr lang="en-US" sz="1800" i="1">
+                      <a:rPr lang="en-US" sz="1600" i="1">
                         <a:latin typeface="Cambria Math" panose="02040503050406030204" pitchFamily="18" charset="0"/>
                         <a:ea typeface="Cambria Math" panose="02040503050406030204" pitchFamily="18" charset="0"/>
                         <a:cs typeface="Times New Roman" panose="02020603050405020304" pitchFamily="18" charset="0"/>
@@ -17882,7 +18212,7 @@
                       <m:t>𝑋</m:t>
                     </m:r>
                     <m:r>
-                      <a:rPr lang="en-US" sz="1800" i="1">
+                      <a:rPr lang="en-US" sz="1600" i="1">
                         <a:latin typeface="Cambria Math" panose="02040503050406030204" pitchFamily="18" charset="0"/>
                         <a:ea typeface="Cambria Math" panose="02040503050406030204" pitchFamily="18" charset="0"/>
                         <a:cs typeface="Times New Roman" panose="02020603050405020304" pitchFamily="18" charset="0"/>
@@ -17890,7 +18220,7 @@
                       <m:t>→±∞:</m:t>
                     </m:r>
                     <m:r>
-                      <a:rPr lang="en-US" sz="1800" i="1">
+                      <a:rPr lang="en-US" sz="1600" i="1">
                         <a:latin typeface="Cambria Math" panose="02040503050406030204" pitchFamily="18" charset="0"/>
                         <a:ea typeface="Cambria Math" panose="02040503050406030204" pitchFamily="18" charset="0"/>
                         <a:cs typeface="Times New Roman" panose="02020603050405020304" pitchFamily="18" charset="0"/>
@@ -17900,7 +18230,7 @@
                     <m:d>
                       <m:dPr>
                         <m:ctrlPr>
-                          <a:rPr lang="en-US" sz="1800" i="1">
+                          <a:rPr lang="en-US" sz="1600" i="1">
                             <a:latin typeface="Cambria Math" panose="02040503050406030204" pitchFamily="18" charset="0"/>
                             <a:ea typeface="Cambria Math" panose="02040503050406030204" pitchFamily="18" charset="0"/>
                             <a:cs typeface="Times New Roman" panose="02020603050405020304" pitchFamily="18" charset="0"/>
@@ -17909,7 +18239,7 @@
                       </m:dPr>
                       <m:e>
                         <m:r>
-                          <a:rPr lang="en-US" sz="1800" i="1">
+                          <a:rPr lang="en-US" sz="1600" i="1">
                             <a:latin typeface="Cambria Math" panose="02040503050406030204" pitchFamily="18" charset="0"/>
                             <a:ea typeface="Cambria Math" panose="02040503050406030204" pitchFamily="18" charset="0"/>
                             <a:cs typeface="Times New Roman" panose="02020603050405020304" pitchFamily="18" charset="0"/>
@@ -17917,7 +18247,7 @@
                           <m:t>𝑋</m:t>
                         </m:r>
                         <m:r>
-                          <a:rPr lang="en-US" sz="1800" i="1">
+                          <a:rPr lang="en-US" sz="1600" i="1">
                             <a:latin typeface="Cambria Math" panose="02040503050406030204" pitchFamily="18" charset="0"/>
                             <a:ea typeface="Cambria Math" panose="02040503050406030204" pitchFamily="18" charset="0"/>
                             <a:cs typeface="Times New Roman" panose="02020603050405020304" pitchFamily="18" charset="0"/>
@@ -17925,7 +18255,7 @@
                           <m:t>,</m:t>
                         </m:r>
                         <m:r>
-                          <a:rPr lang="en-US" sz="1800" i="1">
+                          <a:rPr lang="en-US" sz="1600" i="1">
                             <a:latin typeface="Cambria Math" panose="02040503050406030204" pitchFamily="18" charset="0"/>
                             <a:ea typeface="Cambria Math" panose="02040503050406030204" pitchFamily="18" charset="0"/>
                             <a:cs typeface="Times New Roman" panose="02020603050405020304" pitchFamily="18" charset="0"/>
@@ -17935,7 +18265,7 @@
                       </m:e>
                     </m:d>
                     <m:r>
-                      <a:rPr lang="en-US" sz="1800" i="1">
+                      <a:rPr lang="en-US" sz="1600" i="1">
                         <a:latin typeface="Cambria Math" panose="02040503050406030204" pitchFamily="18" charset="0"/>
                         <a:ea typeface="Cambria Math" panose="02040503050406030204" pitchFamily="18" charset="0"/>
                         <a:cs typeface="Times New Roman" panose="02020603050405020304" pitchFamily="18" charset="0"/>
@@ -17945,7 +18275,7 @@
                     <m:func>
                       <m:funcPr>
                         <m:ctrlPr>
-                          <a:rPr lang="it-IT" sz="1800" i="1">
+                          <a:rPr lang="it-IT" sz="1600" i="1">
                             <a:latin typeface="Cambria Math" panose="02040503050406030204" pitchFamily="18" charset="0"/>
                             <a:ea typeface="Cambria Math" panose="02040503050406030204" pitchFamily="18" charset="0"/>
                           </a:rPr>
@@ -17956,7 +18286,7 @@
                           <m:rPr>
                             <m:sty m:val="p"/>
                           </m:rPr>
-                          <a:rPr lang="it-IT" sz="1800">
+                          <a:rPr lang="it-IT" sz="1600">
                             <a:latin typeface="Cambria Math" panose="02040503050406030204" pitchFamily="18" charset="0"/>
                             <a:ea typeface="Cambria Math" panose="02040503050406030204" pitchFamily="18" charset="0"/>
                           </a:rPr>
@@ -17967,7 +18297,7 @@
                         <m:d>
                           <m:dPr>
                             <m:ctrlPr>
-                              <a:rPr lang="it-IT" sz="1800" i="1">
+                              <a:rPr lang="it-IT" sz="1600" i="1">
                                 <a:latin typeface="Cambria Math" panose="02040503050406030204" pitchFamily="18" charset="0"/>
                                 <a:ea typeface="Cambria Math" panose="02040503050406030204" pitchFamily="18" charset="0"/>
                               </a:rPr>
@@ -17977,7 +18307,7 @@
                             <m:f>
                               <m:fPr>
                                 <m:ctrlPr>
-                                  <a:rPr lang="it-IT" sz="1800" i="1">
+                                  <a:rPr lang="it-IT" sz="1600" i="1">
                                     <a:latin typeface="Cambria Math" panose="02040503050406030204" pitchFamily="18" charset="0"/>
                                     <a:ea typeface="Cambria Math" panose="02040503050406030204" pitchFamily="18" charset="0"/>
                                   </a:rPr>
@@ -17985,7 +18315,7 @@
                               </m:fPr>
                               <m:num>
                                 <m:r>
-                                  <a:rPr lang="it-IT" sz="1800" i="1">
+                                  <a:rPr lang="it-IT" sz="1600" i="1">
                                     <a:latin typeface="Cambria Math" panose="02040503050406030204" pitchFamily="18" charset="0"/>
                                     <a:ea typeface="Cambria Math" panose="02040503050406030204" pitchFamily="18" charset="0"/>
                                   </a:rPr>
@@ -17994,7 +18324,7 @@
                                 <m:sSup>
                                   <m:sSupPr>
                                     <m:ctrlPr>
-                                      <a:rPr lang="it-IT" sz="1800" i="1">
+                                      <a:rPr lang="it-IT" sz="1600" i="1">
                                         <a:latin typeface="Cambria Math" panose="02040503050406030204" pitchFamily="18" charset="0"/>
                                         <a:ea typeface="Cambria Math" panose="02040503050406030204" pitchFamily="18" charset="0"/>
                                       </a:rPr>
@@ -18002,7 +18332,7 @@
                                   </m:sSupPr>
                                   <m:e>
                                     <m:r>
-                                      <a:rPr lang="it-IT" sz="1800" i="1">
+                                      <a:rPr lang="it-IT" sz="1600" i="1">
                                         <a:latin typeface="Cambria Math" panose="02040503050406030204" pitchFamily="18" charset="0"/>
                                         <a:ea typeface="Cambria Math" panose="02040503050406030204" pitchFamily="18" charset="0"/>
                                       </a:rPr>
@@ -18011,7 +18341,7 @@
                                   </m:e>
                                   <m:sup>
                                     <m:r>
-                                      <a:rPr lang="it-IT" sz="1800" i="1">
+                                      <a:rPr lang="it-IT" sz="1600" i="1">
                                         <a:latin typeface="Cambria Math" panose="02040503050406030204" pitchFamily="18" charset="0"/>
                                         <a:ea typeface="Cambria Math" panose="02040503050406030204" pitchFamily="18" charset="0"/>
                                       </a:rPr>
@@ -18024,7 +18354,7 @@
                                 <m:sSup>
                                   <m:sSupPr>
                                     <m:ctrlPr>
-                                      <a:rPr lang="it-IT" sz="1800" i="1">
+                                      <a:rPr lang="it-IT" sz="1600" i="1">
                                         <a:latin typeface="Cambria Math" panose="02040503050406030204" pitchFamily="18" charset="0"/>
                                         <a:ea typeface="Cambria Math" panose="02040503050406030204" pitchFamily="18" charset="0"/>
                                       </a:rPr>
@@ -18032,7 +18362,7 @@
                                   </m:sSupPr>
                                   <m:e>
                                     <m:r>
-                                      <a:rPr lang="it-IT" sz="1800" i="1">
+                                      <a:rPr lang="it-IT" sz="1600" i="1">
                                         <a:latin typeface="Cambria Math" panose="02040503050406030204" pitchFamily="18" charset="0"/>
                                         <a:ea typeface="Cambria Math" panose="02040503050406030204" pitchFamily="18" charset="0"/>
                                       </a:rPr>
@@ -18041,7 +18371,7 @@
                                   </m:e>
                                   <m:sup>
                                     <m:r>
-                                      <a:rPr lang="it-IT" sz="1800" i="1">
+                                      <a:rPr lang="it-IT" sz="1600" i="1">
                                         <a:latin typeface="Cambria Math" panose="02040503050406030204" pitchFamily="18" charset="0"/>
                                         <a:ea typeface="Cambria Math" panose="02040503050406030204" pitchFamily="18" charset="0"/>
                                       </a:rPr>
@@ -18057,7 +18387,7 @@
                     </m:func>
                   </m:oMath>
                 </a14:m>
-                <a:endParaRPr lang="it-IT" sz="1800" dirty="0">
+                <a:endParaRPr lang="it-IT" sz="1600" dirty="0">
                   <a:latin typeface="Cambria Math" panose="02040503050406030204" pitchFamily="18" charset="0"/>
                   <a:ea typeface="Cambria Math" panose="02040503050406030204" pitchFamily="18" charset="0"/>
                   <a:cs typeface="Times New Roman" panose="02020603050405020304" pitchFamily="18" charset="0"/>
@@ -18074,7 +18404,7 @@
                   <a:buNone/>
                 </a:pPr>
                 <a:r>
-                  <a:rPr lang="en-US" sz="1800" dirty="0">
+                  <a:rPr lang="en-US" sz="1600" dirty="0">
                     <a:ea typeface="Cambria Math" panose="02040503050406030204" pitchFamily="18" charset="0"/>
                     <a:cs typeface="Times New Roman" panose="02020603050405020304" pitchFamily="18" charset="0"/>
                   </a:rPr>
@@ -18083,7 +18413,7 @@
                 <a14:m>
                   <m:oMath xmlns:m="http://schemas.openxmlformats.org/officeDocument/2006/math">
                     <m:r>
-                      <a:rPr lang="en-US" sz="1800" i="1" smtClean="0">
+                      <a:rPr lang="en-US" sz="1600" i="1" smtClean="0">
                         <a:latin typeface="Cambria Math" panose="02040503050406030204" pitchFamily="18" charset="0"/>
                         <a:ea typeface="Cambria Math" panose="02040503050406030204" pitchFamily="18" charset="0"/>
                         <a:cs typeface="Times New Roman" panose="02020603050405020304" pitchFamily="18" charset="0"/>
@@ -18091,7 +18421,7 @@
                       <m:t>𝑌</m:t>
                     </m:r>
                     <m:r>
-                      <a:rPr lang="en-US" sz="1800" i="1" smtClean="0">
+                      <a:rPr lang="en-US" sz="1600" i="1" smtClean="0">
                         <a:latin typeface="Cambria Math" panose="02040503050406030204" pitchFamily="18" charset="0"/>
                         <a:ea typeface="Cambria Math" panose="02040503050406030204" pitchFamily="18" charset="0"/>
                         <a:cs typeface="Times New Roman" panose="02020603050405020304" pitchFamily="18" charset="0"/>
@@ -18099,7 +18429,7 @@
                       <m:t> →0:</m:t>
                     </m:r>
                     <m:r>
-                      <a:rPr lang="en-US" sz="1800" b="0" i="1" smtClean="0">
+                      <a:rPr lang="en-US" sz="1600" b="0" i="1" smtClean="0">
                         <a:latin typeface="Cambria Math" panose="02040503050406030204" pitchFamily="18" charset="0"/>
                         <a:ea typeface="Cambria Math" panose="02040503050406030204" pitchFamily="18" charset="0"/>
                         <a:cs typeface="Times New Roman" panose="02020603050405020304" pitchFamily="18" charset="0"/>
@@ -18109,7 +18439,7 @@
                     <m:d>
                       <m:dPr>
                         <m:ctrlPr>
-                          <a:rPr lang="en-US" sz="1800" i="1" smtClean="0">
+                          <a:rPr lang="en-US" sz="1600" i="1" smtClean="0">
                             <a:latin typeface="Cambria Math" panose="02040503050406030204" pitchFamily="18" charset="0"/>
                             <a:ea typeface="Cambria Math" panose="02040503050406030204" pitchFamily="18" charset="0"/>
                             <a:cs typeface="Times New Roman" panose="02020603050405020304" pitchFamily="18" charset="0"/>
@@ -18118,7 +18448,7 @@
                       </m:dPr>
                       <m:e>
                         <m:r>
-                          <a:rPr lang="en-US" sz="1800" i="1" smtClean="0">
+                          <a:rPr lang="en-US" sz="1600" i="1" smtClean="0">
                             <a:latin typeface="Cambria Math" panose="02040503050406030204" pitchFamily="18" charset="0"/>
                             <a:ea typeface="Cambria Math" panose="02040503050406030204" pitchFamily="18" charset="0"/>
                             <a:cs typeface="Times New Roman" panose="02020603050405020304" pitchFamily="18" charset="0"/>
@@ -18126,7 +18456,7 @@
                           <m:t>𝑋</m:t>
                         </m:r>
                         <m:r>
-                          <a:rPr lang="en-US" sz="1800" i="1" smtClean="0">
+                          <a:rPr lang="en-US" sz="1600" i="1" smtClean="0">
                             <a:latin typeface="Cambria Math" panose="02040503050406030204" pitchFamily="18" charset="0"/>
                             <a:ea typeface="Cambria Math" panose="02040503050406030204" pitchFamily="18" charset="0"/>
                             <a:cs typeface="Times New Roman" panose="02020603050405020304" pitchFamily="18" charset="0"/>
@@ -18134,7 +18464,7 @@
                           <m:t>,</m:t>
                         </m:r>
                         <m:r>
-                          <a:rPr lang="en-US" sz="1800" i="1" smtClean="0">
+                          <a:rPr lang="en-US" sz="1600" i="1" smtClean="0">
                             <a:latin typeface="Cambria Math" panose="02040503050406030204" pitchFamily="18" charset="0"/>
                             <a:ea typeface="Cambria Math" panose="02040503050406030204" pitchFamily="18" charset="0"/>
                             <a:cs typeface="Times New Roman" panose="02020603050405020304" pitchFamily="18" charset="0"/>
@@ -18144,7 +18474,7 @@
                       </m:e>
                     </m:d>
                     <m:r>
-                      <a:rPr lang="en-US" sz="1800" i="1" smtClean="0">
+                      <a:rPr lang="en-US" sz="1600" i="1" smtClean="0">
                         <a:latin typeface="Cambria Math" panose="02040503050406030204" pitchFamily="18" charset="0"/>
                         <a:ea typeface="Cambria Math" panose="02040503050406030204" pitchFamily="18" charset="0"/>
                         <a:cs typeface="Times New Roman" panose="02020603050405020304" pitchFamily="18" charset="0"/>
@@ -18152,7 +18482,7 @@
                       <m:t>→</m:t>
                     </m:r>
                     <m:r>
-                      <a:rPr lang="en-US" sz="1800" b="0" i="1" smtClean="0">
+                      <a:rPr lang="en-US" sz="1600" b="0" i="1" smtClean="0">
                         <a:latin typeface="Cambria Math" panose="02040503050406030204" pitchFamily="18" charset="0"/>
                         <a:ea typeface="Cambria Math" panose="02040503050406030204" pitchFamily="18" charset="0"/>
                         <a:cs typeface="Times New Roman" panose="02020603050405020304" pitchFamily="18" charset="0"/>
@@ -18160,7 +18490,7 @@
                       <m:t>+</m:t>
                     </m:r>
                     <m:r>
-                      <a:rPr lang="en-US" sz="1800" i="1" smtClean="0">
+                      <a:rPr lang="en-US" sz="1600" i="1" smtClean="0">
                         <a:latin typeface="Cambria Math" panose="02040503050406030204" pitchFamily="18" charset="0"/>
                         <a:ea typeface="Cambria Math" panose="02040503050406030204" pitchFamily="18" charset="0"/>
                         <a:cs typeface="Times New Roman" panose="02020603050405020304" pitchFamily="18" charset="0"/>
@@ -18169,7 +18499,7 @@
                     </m:r>
                   </m:oMath>
                 </a14:m>
-                <a:endParaRPr lang="en-US" sz="1800" dirty="0">
+                <a:endParaRPr lang="en-US" sz="1600" dirty="0">
                   <a:ea typeface="Cambria Math" panose="02040503050406030204" pitchFamily="18" charset="0"/>
                   <a:cs typeface="Times New Roman" panose="02020603050405020304" pitchFamily="18" charset="0"/>
                 </a:endParaRPr>
@@ -18185,7 +18515,7 @@
                   <a:buNone/>
                 </a:pPr>
                 <a:r>
-                  <a:rPr lang="en-US" sz="1800" dirty="0">
+                  <a:rPr lang="en-US" sz="1600" dirty="0">
                     <a:ea typeface="Cambria Math" panose="02040503050406030204" pitchFamily="18" charset="0"/>
                     <a:cs typeface="Times New Roman" panose="02020603050405020304" pitchFamily="18" charset="0"/>
                   </a:rPr>
@@ -18194,7 +18524,7 @@
                 <a14:m>
                   <m:oMath xmlns:m="http://schemas.openxmlformats.org/officeDocument/2006/math">
                     <m:r>
-                      <a:rPr lang="en-US" sz="1800" i="1" smtClean="0">
+                      <a:rPr lang="en-US" sz="1600" i="1" smtClean="0">
                         <a:latin typeface="Cambria Math" panose="02040503050406030204" pitchFamily="18" charset="0"/>
                         <a:ea typeface="Cambria Math" panose="02040503050406030204" pitchFamily="18" charset="0"/>
                         <a:cs typeface="Times New Roman" panose="02020603050405020304" pitchFamily="18" charset="0"/>
@@ -18202,7 +18532,7 @@
                       <m:t>𝑌</m:t>
                     </m:r>
                     <m:r>
-                      <a:rPr lang="en-US" sz="1800" i="1" smtClean="0">
+                      <a:rPr lang="en-US" sz="1600" i="1" smtClean="0">
                         <a:latin typeface="Cambria Math" panose="02040503050406030204" pitchFamily="18" charset="0"/>
                         <a:ea typeface="Cambria Math" panose="02040503050406030204" pitchFamily="18" charset="0"/>
                         <a:cs typeface="Times New Roman" panose="02020603050405020304" pitchFamily="18" charset="0"/>
@@ -18210,7 +18540,7 @@
                       <m:t> →±∞: </m:t>
                     </m:r>
                     <m:r>
-                      <a:rPr lang="en-US" sz="1800" b="0" i="1" smtClean="0">
+                      <a:rPr lang="en-US" sz="1600" b="0" i="1" smtClean="0">
                         <a:latin typeface="Cambria Math" panose="02040503050406030204" pitchFamily="18" charset="0"/>
                         <a:ea typeface="Cambria Math" panose="02040503050406030204" pitchFamily="18" charset="0"/>
                         <a:cs typeface="Times New Roman" panose="02020603050405020304" pitchFamily="18" charset="0"/>
@@ -18220,7 +18550,7 @@
                     <m:d>
                       <m:dPr>
                         <m:ctrlPr>
-                          <a:rPr lang="en-US" sz="1800" i="1" smtClean="0">
+                          <a:rPr lang="en-US" sz="1600" i="1" smtClean="0">
                             <a:latin typeface="Cambria Math" panose="02040503050406030204" pitchFamily="18" charset="0"/>
                             <a:ea typeface="Cambria Math" panose="02040503050406030204" pitchFamily="18" charset="0"/>
                             <a:cs typeface="Times New Roman" panose="02020603050405020304" pitchFamily="18" charset="0"/>
@@ -18229,7 +18559,7 @@
                       </m:dPr>
                       <m:e>
                         <m:r>
-                          <a:rPr lang="en-US" sz="1800" i="1" smtClean="0">
+                          <a:rPr lang="en-US" sz="1600" i="1" smtClean="0">
                             <a:latin typeface="Cambria Math" panose="02040503050406030204" pitchFamily="18" charset="0"/>
                             <a:ea typeface="Cambria Math" panose="02040503050406030204" pitchFamily="18" charset="0"/>
                             <a:cs typeface="Times New Roman" panose="02020603050405020304" pitchFamily="18" charset="0"/>
@@ -18237,7 +18567,7 @@
                           <m:t>𝑋</m:t>
                         </m:r>
                         <m:r>
-                          <a:rPr lang="en-US" sz="1800" i="1" smtClean="0">
+                          <a:rPr lang="en-US" sz="1600" i="1" smtClean="0">
                             <a:latin typeface="Cambria Math" panose="02040503050406030204" pitchFamily="18" charset="0"/>
                             <a:ea typeface="Cambria Math" panose="02040503050406030204" pitchFamily="18" charset="0"/>
                             <a:cs typeface="Times New Roman" panose="02020603050405020304" pitchFamily="18" charset="0"/>
@@ -18245,7 +18575,7 @@
                           <m:t>,</m:t>
                         </m:r>
                         <m:r>
-                          <a:rPr lang="en-US" sz="1800" i="1" smtClean="0">
+                          <a:rPr lang="en-US" sz="1600" i="1" smtClean="0">
                             <a:latin typeface="Cambria Math" panose="02040503050406030204" pitchFamily="18" charset="0"/>
                             <a:ea typeface="Cambria Math" panose="02040503050406030204" pitchFamily="18" charset="0"/>
                             <a:cs typeface="Times New Roman" panose="02020603050405020304" pitchFamily="18" charset="0"/>
@@ -18255,7 +18585,7 @@
                       </m:e>
                     </m:d>
                     <m:r>
-                      <a:rPr lang="en-US" sz="1800" i="1" smtClean="0">
+                      <a:rPr lang="en-US" sz="1600" i="1" smtClean="0">
                         <a:latin typeface="Cambria Math" panose="02040503050406030204" pitchFamily="18" charset="0"/>
                         <a:ea typeface="Cambria Math" panose="02040503050406030204" pitchFamily="18" charset="0"/>
                         <a:cs typeface="Times New Roman" panose="02020603050405020304" pitchFamily="18" charset="0"/>
@@ -18263,7 +18593,7 @@
                       <m:t>→</m:t>
                     </m:r>
                     <m:r>
-                      <a:rPr lang="en-US" sz="1800" b="0" i="1" smtClean="0">
+                      <a:rPr lang="en-US" sz="1600" b="0" i="1" smtClean="0">
                         <a:latin typeface="Cambria Math" panose="02040503050406030204" pitchFamily="18" charset="0"/>
                         <a:ea typeface="Cambria Math" panose="02040503050406030204" pitchFamily="18" charset="0"/>
                         <a:cs typeface="Times New Roman" panose="02020603050405020304" pitchFamily="18" charset="0"/>
@@ -18272,7 +18602,7 @@
                     </m:r>
                   </m:oMath>
                 </a14:m>
-                <a:endParaRPr lang="en-US" sz="1800" dirty="0">
+                <a:endParaRPr lang="en-US" sz="1600" dirty="0">
                   <a:ea typeface="Cambria Math" panose="02040503050406030204" pitchFamily="18" charset="0"/>
                   <a:cs typeface="Times New Roman" panose="02020603050405020304" pitchFamily="18" charset="0"/>
                 </a:endParaRPr>
@@ -18287,7 +18617,7 @@
                   </a:spcAft>
                   <a:buNone/>
                 </a:pPr>
-                <a:endParaRPr lang="it-IT" sz="1800" dirty="0">
+                <a:endParaRPr lang="it-IT" sz="1600" dirty="0">
                   <a:latin typeface="Cambria Math" panose="02040503050406030204" pitchFamily="18" charset="0"/>
                   <a:ea typeface="Cambria Math" panose="02040503050406030204" pitchFamily="18" charset="0"/>
                   <a:cs typeface="Times New Roman" panose="02020603050405020304" pitchFamily="18" charset="0"/>
@@ -18303,7 +18633,7 @@
                   </a:spcAft>
                   <a:buNone/>
                 </a:pPr>
-                <a:endParaRPr lang="it-IT" sz="1800" dirty="0">
+                <a:endParaRPr lang="it-IT" sz="1600" dirty="0">
                   <a:latin typeface="Cambria Math" panose="02040503050406030204" pitchFamily="18" charset="0"/>
                   <a:ea typeface="Cambria Math" panose="02040503050406030204" pitchFamily="18" charset="0"/>
                   <a:cs typeface="Times New Roman" panose="02020603050405020304" pitchFamily="18" charset="0"/>
@@ -18320,7 +18650,7 @@
                   <a:buFont typeface="Arial" panose="020B0604020202020204" pitchFamily="34" charset="0"/>
                   <a:buNone/>
                 </a:pPr>
-                <a:endParaRPr lang="it-IT" sz="1800" dirty="0">
+                <a:endParaRPr lang="it-IT" sz="1600" dirty="0">
                   <a:latin typeface="Cambria Math" panose="02040503050406030204" pitchFamily="18" charset="0"/>
                   <a:ea typeface="Cambria Math" panose="02040503050406030204" pitchFamily="18" charset="0"/>
                   <a:cs typeface="Times New Roman" panose="02020603050405020304" pitchFamily="18" charset="0"/>
@@ -18337,7 +18667,7 @@
                   <a:buFont typeface="Arial" panose="020B0604020202020204" pitchFamily="34" charset="0"/>
                   <a:buNone/>
                 </a:pPr>
-                <a:endParaRPr lang="it-IT" sz="1800" dirty="0">
+                <a:endParaRPr lang="it-IT" sz="1600" dirty="0">
                   <a:latin typeface="Cambria Math" panose="02040503050406030204" pitchFamily="18" charset="0"/>
                   <a:ea typeface="Cambria Math" panose="02040503050406030204" pitchFamily="18" charset="0"/>
                   <a:cs typeface="Times New Roman" panose="02020603050405020304" pitchFamily="18" charset="0"/>
@@ -18352,7 +18682,7 @@
                     <a:spcPts val="800"/>
                   </a:spcAft>
                 </a:pPr>
-                <a:endParaRPr lang="it-IT" sz="1800" dirty="0">
+                <a:endParaRPr lang="it-IT" sz="1600" dirty="0">
                   <a:latin typeface="Cambria Math" panose="02040503050406030204" pitchFamily="18" charset="0"/>
                   <a:ea typeface="Cambria Math" panose="02040503050406030204" pitchFamily="18" charset="0"/>
                   <a:cs typeface="Times New Roman" panose="02020603050405020304" pitchFamily="18" charset="0"/>
@@ -18363,7 +18693,7 @@
                   <a:buFont typeface="Arial" panose="020B0604020202020204" pitchFamily="34" charset="0"/>
                   <a:buNone/>
                 </a:pPr>
-                <a:endParaRPr lang="it-IT" sz="1800" dirty="0">
+                <a:endParaRPr lang="it-IT" sz="1600" dirty="0">
                   <a:latin typeface="Cambria Math" panose="02040503050406030204" pitchFamily="18" charset="0"/>
                   <a:ea typeface="Cambria Math" panose="02040503050406030204" pitchFamily="18" charset="0"/>
                 </a:endParaRPr>
@@ -18388,8 +18718,8 @@
             </p:nvSpPr>
             <p:spPr>
               <a:xfrm>
-                <a:off x="6149417" y="1586263"/>
-                <a:ext cx="5383491" cy="4274720"/>
+                <a:off x="6211563" y="1803850"/>
+                <a:ext cx="5556315" cy="4198887"/>
               </a:xfrm>
               <a:prstGeom prst="rect">
                 <a:avLst/>
@@ -18425,13 +18755,15 @@
               </a:ext>
             </a:extLst>
           </p:cNvPr>
-          <p:cNvCxnSpPr/>
+          <p:cNvCxnSpPr>
+            <a:cxnSpLocks/>
+          </p:cNvCxnSpPr>
           <p:nvPr/>
         </p:nvCxnSpPr>
         <p:spPr>
           <a:xfrm>
-            <a:off x="5891753" y="1641544"/>
-            <a:ext cx="0" cy="4247541"/>
+            <a:off x="6095998" y="1803850"/>
+            <a:ext cx="0" cy="4223213"/>
           </a:xfrm>
           <a:prstGeom prst="line">
             <a:avLst/>
@@ -20471,7 +20803,7 @@
         </p:blipFill>
         <p:spPr>
           <a:xfrm>
-            <a:off x="540000" y="1980000"/>
+            <a:off x="405653" y="1976676"/>
             <a:ext cx="6030769" cy="3528000"/>
           </a:xfrm>
           <a:prstGeom prst="rect">
@@ -20500,7 +20832,7 @@
         </p:blipFill>
         <p:spPr>
           <a:xfrm>
-            <a:off x="6660000" y="1980000"/>
+            <a:off x="6439005" y="1976676"/>
             <a:ext cx="5347342" cy="3528000"/>
           </a:xfrm>
           <a:prstGeom prst="rect">
@@ -23813,6 +24145,15 @@
 </file>
 
 <file path=customXml/item1.xml><?xml version="1.0" encoding="utf-8"?>
+<p:properties xmlns:p="http://schemas.microsoft.com/office/2006/metadata/properties" xmlns:xsi="http://www.w3.org/2001/XMLSchema-instance" xmlns:pc="http://schemas.microsoft.com/office/infopath/2007/PartnerControls">
+  <documentManagement>
+    <Status xmlns="71af3243-3dd4-4a8d-8c0d-dd76da1f02a5">Not started</Status>
+    <MediaServiceKeyPoints xmlns="71af3243-3dd4-4a8d-8c0d-dd76da1f02a5" xsi:nil="true"/>
+  </documentManagement>
+</p:properties>
+</file>
+
+<file path=customXml/item2.xml><?xml version="1.0" encoding="utf-8"?>
 <ct:contentTypeSchema xmlns:ct="http://schemas.microsoft.com/office/2006/metadata/contentType" xmlns:ma="http://schemas.microsoft.com/office/2006/metadata/properties/metaAttributes" ct:_="" ma:_="" ma:contentTypeName="Document" ma:contentTypeID="0x01010079F111ED35F8CC479449609E8A0923A6" ma:contentTypeVersion="12" ma:contentTypeDescription="Create a new document." ma:contentTypeScope="" ma:versionID="a410dd7f93c95333ffa1b60ed6adedd1">
   <xsd:schema xmlns:xsd="http://www.w3.org/2001/XMLSchema" xmlns:xs="http://www.w3.org/2001/XMLSchema" xmlns:p="http://schemas.microsoft.com/office/2006/metadata/properties" xmlns:ns2="71af3243-3dd4-4a8d-8c0d-dd76da1f02a5" xmlns:ns3="16c05727-aa75-4e4a-9b5f-8a80a1165891" targetNamespace="http://schemas.microsoft.com/office/2006/metadata/properties" ma:root="true" ma:fieldsID="a936d9baba76aa3866493feff160faab" ns2:_="" ns3:_="">
     <xsd:import namespace="71af3243-3dd4-4a8d-8c0d-dd76da1f02a5"/>
@@ -24033,15 +24374,6 @@
 </ct:contentTypeSchema>
 </file>
 
-<file path=customXml/item2.xml><?xml version="1.0" encoding="utf-8"?>
-<p:properties xmlns:p="http://schemas.microsoft.com/office/2006/metadata/properties" xmlns:xsi="http://www.w3.org/2001/XMLSchema-instance" xmlns:pc="http://schemas.microsoft.com/office/infopath/2007/PartnerControls">
-  <documentManagement>
-    <Status xmlns="71af3243-3dd4-4a8d-8c0d-dd76da1f02a5">Not started</Status>
-    <MediaServiceKeyPoints xmlns="71af3243-3dd4-4a8d-8c0d-dd76da1f02a5" xsi:nil="true"/>
-  </documentManagement>
-</p:properties>
-</file>
-
 <file path=customXml/item3.xml><?xml version="1.0" encoding="utf-8"?>
 <?mso-contentType ?>
 <FormTemplates xmlns="http://schemas.microsoft.com/sharepoint/v3/contenttype/forms">
@@ -24052,6 +24384,16 @@
 </file>
 
 <file path=customXml/itemProps1.xml><?xml version="1.0" encoding="utf-8"?>
+<ds:datastoreItem xmlns:ds="http://schemas.openxmlformats.org/officeDocument/2006/customXml" ds:itemID="{2C4C00F4-06E9-43E3-AD97-88A857CEFA82}">
+  <ds:schemaRefs>
+    <ds:schemaRef ds:uri="http://schemas.microsoft.com/office/2006/metadata/properties"/>
+    <ds:schemaRef ds:uri="http://schemas.microsoft.com/office/infopath/2007/PartnerControls"/>
+    <ds:schemaRef ds:uri="71af3243-3dd4-4a8d-8c0d-dd76da1f02a5"/>
+  </ds:schemaRefs>
+</ds:datastoreItem>
+</file>
+
+<file path=customXml/itemProps2.xml><?xml version="1.0" encoding="utf-8"?>
 <ds:datastoreItem xmlns:ds="http://schemas.openxmlformats.org/officeDocument/2006/customXml" ds:itemID="{0585E981-8C91-4205-A0C3-C991F42B4C9E}">
   <ds:schemaRefs>
     <ds:schemaRef ds:uri="http://schemas.microsoft.com/office/2006/metadata/contentType"/>
@@ -24070,16 +24412,6 @@
 </ds:datastoreItem>
 </file>
 
-<file path=customXml/itemProps2.xml><?xml version="1.0" encoding="utf-8"?>
-<ds:datastoreItem xmlns:ds="http://schemas.openxmlformats.org/officeDocument/2006/customXml" ds:itemID="{2C4C00F4-06E9-43E3-AD97-88A857CEFA82}">
-  <ds:schemaRefs>
-    <ds:schemaRef ds:uri="http://schemas.microsoft.com/office/2006/metadata/properties"/>
-    <ds:schemaRef ds:uri="http://schemas.microsoft.com/office/infopath/2007/PartnerControls"/>
-    <ds:schemaRef ds:uri="71af3243-3dd4-4a8d-8c0d-dd76da1f02a5"/>
-  </ds:schemaRefs>
-</ds:datastoreItem>
-</file>
-
 <file path=customXml/itemProps3.xml><?xml version="1.0" encoding="utf-8"?>
 <ds:datastoreItem xmlns:ds="http://schemas.openxmlformats.org/officeDocument/2006/customXml" ds:itemID="{64B270AB-C138-415C-897E-3C24487DECF1}">
   <ds:schemaRefs>

</xml_diff>

<commit_message>
changed main font color
</commit_message>
<xml_diff>
--- a/umap/UMAP.pptx
+++ b/umap/UMAP.pptx
@@ -14690,8 +14690,8 @@
           </a:p>
         </p:txBody>
       </p:sp>
-      <mc:AlternateContent xmlns:mc="http://schemas.openxmlformats.org/markup-compatibility/2006">
-        <mc:Choice xmlns:a14="http://schemas.microsoft.com/office/drawing/2010/main" Requires="a14">
+      <mc:AlternateContent xmlns:mc="http://schemas.openxmlformats.org/markup-compatibility/2006" xmlns:a14="http://schemas.microsoft.com/office/drawing/2010/main">
+        <mc:Choice Requires="a14">
           <p:sp>
             <p:nvSpPr>
               <p:cNvPr id="3" name="Content Placeholder 2">
@@ -16011,7 +16011,7 @@
             </p:txBody>
           </p:sp>
         </mc:Choice>
-        <mc:Fallback>
+        <mc:Fallback xmlns="">
           <p:sp>
             <p:nvSpPr>
               <p:cNvPr id="3" name="Content Placeholder 2">
@@ -16080,8 +16080,8 @@
           </a:p>
         </p:txBody>
       </p:sp>
-      <mc:AlternateContent xmlns:mc="http://schemas.openxmlformats.org/markup-compatibility/2006">
-        <mc:Choice xmlns:a14="http://schemas.microsoft.com/office/drawing/2010/main" Requires="a14">
+      <mc:AlternateContent xmlns:mc="http://schemas.openxmlformats.org/markup-compatibility/2006" xmlns:a14="http://schemas.microsoft.com/office/drawing/2010/main">
+        <mc:Choice Requires="a14">
           <p:sp>
             <p:nvSpPr>
               <p:cNvPr id="8" name="TextBox 7">
@@ -16658,7 +16658,7 @@
             </p:txBody>
           </p:sp>
         </mc:Choice>
-        <mc:Fallback>
+        <mc:Fallback xmlns="">
           <p:sp>
             <p:nvSpPr>
               <p:cNvPr id="8" name="TextBox 7">
@@ -16744,8 +16744,8 @@
           </a:fontRef>
         </p:style>
       </p:cxnSp>
-      <mc:AlternateContent xmlns:mc="http://schemas.openxmlformats.org/markup-compatibility/2006">
-        <mc:Choice xmlns:a14="http://schemas.microsoft.com/office/drawing/2010/main" Requires="a14">
+      <mc:AlternateContent xmlns:mc="http://schemas.openxmlformats.org/markup-compatibility/2006" xmlns:a14="http://schemas.microsoft.com/office/drawing/2010/main">
+        <mc:Choice Requires="a14">
           <p:sp>
             <p:nvSpPr>
               <p:cNvPr id="13" name="TextBox 12">
@@ -16847,7 +16847,7 @@
             </p:txBody>
           </p:sp>
         </mc:Choice>
-        <mc:Fallback>
+        <mc:Fallback xmlns="">
           <p:sp>
             <p:nvSpPr>
               <p:cNvPr id="13" name="TextBox 12">
@@ -16928,8 +16928,8 @@
           </a:p>
         </p:txBody>
       </p:sp>
-      <mc:AlternateContent xmlns:mc="http://schemas.openxmlformats.org/markup-compatibility/2006">
-        <mc:Choice xmlns:a14="http://schemas.microsoft.com/office/drawing/2010/main" Requires="a14">
+      <mc:AlternateContent xmlns:mc="http://schemas.openxmlformats.org/markup-compatibility/2006" xmlns:a14="http://schemas.microsoft.com/office/drawing/2010/main">
+        <mc:Choice Requires="a14">
           <p:sp>
             <p:nvSpPr>
               <p:cNvPr id="15" name="Content Placeholder 2">
@@ -17142,14 +17142,7 @@
                           <a:latin typeface="Cambria Math" panose="02040503050406030204" pitchFamily="18" charset="0"/>
                           <a:ea typeface="Cambria Math" panose="02040503050406030204" pitchFamily="18" charset="0"/>
                         </a:rPr>
-                        <m:t>𝐶</m:t>
-                      </m:r>
-                      <m:r>
-                        <a:rPr lang="en-US" sz="1600" b="0" i="1" smtClean="0">
-                          <a:latin typeface="Cambria Math" panose="02040503050406030204" pitchFamily="18" charset="0"/>
-                          <a:ea typeface="Cambria Math" panose="02040503050406030204" pitchFamily="18" charset="0"/>
-                        </a:rPr>
-                        <m:t>𝐸</m:t>
+                        <m:t>𝐶𝐸</m:t>
                       </m:r>
                       <m:d>
                         <m:dPr>
@@ -18701,7 +18694,7 @@
             </p:txBody>
           </p:sp>
         </mc:Choice>
-        <mc:Fallback>
+        <mc:Fallback xmlns="">
           <p:sp>
             <p:nvSpPr>
               <p:cNvPr id="15" name="Content Placeholder 2">
@@ -20536,7 +20529,14 @@
           <a:lstStyle/>
           <a:p>
             <a:r>
-              <a:rPr lang="en-US" dirty="0"/>
+              <a:rPr lang="en-US" dirty="0">
+                <a:solidFill>
+                  <a:schemeClr val="tx1">
+                    <a:lumMod val="65000"/>
+                    <a:lumOff val="35000"/>
+                  </a:schemeClr>
+                </a:solidFill>
+              </a:rPr>
               <a:t>Uniform Manifold Approximation and Projection for Dimension Reduction</a:t>
             </a:r>
           </a:p>
@@ -23377,9 +23377,9 @@
 <file path=ppt/theme/theme1.xml><?xml version="1.0" encoding="utf-8"?>
 <a:theme xmlns:a="http://schemas.openxmlformats.org/drawingml/2006/main" name="Office Theme">
   <a:themeElements>
-    <a:clrScheme name="Office">
+    <a:clrScheme name="Custom 1">
       <a:dk1>
-        <a:sysClr val="windowText" lastClr="000000"/>
+        <a:srgbClr val="595959"/>
       </a:dk1>
       <a:lt1>
         <a:sysClr val="window" lastClr="FFFFFF"/>
@@ -24145,15 +24145,6 @@
 </file>
 
 <file path=customXml/item1.xml><?xml version="1.0" encoding="utf-8"?>
-<p:properties xmlns:p="http://schemas.microsoft.com/office/2006/metadata/properties" xmlns:xsi="http://www.w3.org/2001/XMLSchema-instance" xmlns:pc="http://schemas.microsoft.com/office/infopath/2007/PartnerControls">
-  <documentManagement>
-    <Status xmlns="71af3243-3dd4-4a8d-8c0d-dd76da1f02a5">Not started</Status>
-    <MediaServiceKeyPoints xmlns="71af3243-3dd4-4a8d-8c0d-dd76da1f02a5" xsi:nil="true"/>
-  </documentManagement>
-</p:properties>
-</file>
-
-<file path=customXml/item2.xml><?xml version="1.0" encoding="utf-8"?>
 <ct:contentTypeSchema xmlns:ct="http://schemas.microsoft.com/office/2006/metadata/contentType" xmlns:ma="http://schemas.microsoft.com/office/2006/metadata/properties/metaAttributes" ct:_="" ma:_="" ma:contentTypeName="Document" ma:contentTypeID="0x01010079F111ED35F8CC479449609E8A0923A6" ma:contentTypeVersion="12" ma:contentTypeDescription="Create a new document." ma:contentTypeScope="" ma:versionID="a410dd7f93c95333ffa1b60ed6adedd1">
   <xsd:schema xmlns:xsd="http://www.w3.org/2001/XMLSchema" xmlns:xs="http://www.w3.org/2001/XMLSchema" xmlns:p="http://schemas.microsoft.com/office/2006/metadata/properties" xmlns:ns2="71af3243-3dd4-4a8d-8c0d-dd76da1f02a5" xmlns:ns3="16c05727-aa75-4e4a-9b5f-8a80a1165891" targetNamespace="http://schemas.microsoft.com/office/2006/metadata/properties" ma:root="true" ma:fieldsID="a936d9baba76aa3866493feff160faab" ns2:_="" ns3:_="">
     <xsd:import namespace="71af3243-3dd4-4a8d-8c0d-dd76da1f02a5"/>
@@ -24374,6 +24365,15 @@
 </ct:contentTypeSchema>
 </file>
 
+<file path=customXml/item2.xml><?xml version="1.0" encoding="utf-8"?>
+<p:properties xmlns:p="http://schemas.microsoft.com/office/2006/metadata/properties" xmlns:xsi="http://www.w3.org/2001/XMLSchema-instance" xmlns:pc="http://schemas.microsoft.com/office/infopath/2007/PartnerControls">
+  <documentManagement>
+    <Status xmlns="71af3243-3dd4-4a8d-8c0d-dd76da1f02a5">Not started</Status>
+    <MediaServiceKeyPoints xmlns="71af3243-3dd4-4a8d-8c0d-dd76da1f02a5" xsi:nil="true"/>
+  </documentManagement>
+</p:properties>
+</file>
+
 <file path=customXml/item3.xml><?xml version="1.0" encoding="utf-8"?>
 <?mso-contentType ?>
 <FormTemplates xmlns="http://schemas.microsoft.com/sharepoint/v3/contenttype/forms">
@@ -24384,16 +24384,6 @@
 </file>
 
 <file path=customXml/itemProps1.xml><?xml version="1.0" encoding="utf-8"?>
-<ds:datastoreItem xmlns:ds="http://schemas.openxmlformats.org/officeDocument/2006/customXml" ds:itemID="{2C4C00F4-06E9-43E3-AD97-88A857CEFA82}">
-  <ds:schemaRefs>
-    <ds:schemaRef ds:uri="http://schemas.microsoft.com/office/2006/metadata/properties"/>
-    <ds:schemaRef ds:uri="http://schemas.microsoft.com/office/infopath/2007/PartnerControls"/>
-    <ds:schemaRef ds:uri="71af3243-3dd4-4a8d-8c0d-dd76da1f02a5"/>
-  </ds:schemaRefs>
-</ds:datastoreItem>
-</file>
-
-<file path=customXml/itemProps2.xml><?xml version="1.0" encoding="utf-8"?>
 <ds:datastoreItem xmlns:ds="http://schemas.openxmlformats.org/officeDocument/2006/customXml" ds:itemID="{0585E981-8C91-4205-A0C3-C991F42B4C9E}">
   <ds:schemaRefs>
     <ds:schemaRef ds:uri="http://schemas.microsoft.com/office/2006/metadata/contentType"/>
@@ -24412,6 +24402,16 @@
 </ds:datastoreItem>
 </file>
 
+<file path=customXml/itemProps2.xml><?xml version="1.0" encoding="utf-8"?>
+<ds:datastoreItem xmlns:ds="http://schemas.openxmlformats.org/officeDocument/2006/customXml" ds:itemID="{2C4C00F4-06E9-43E3-AD97-88A857CEFA82}">
+  <ds:schemaRefs>
+    <ds:schemaRef ds:uri="http://schemas.microsoft.com/office/2006/metadata/properties"/>
+    <ds:schemaRef ds:uri="http://schemas.microsoft.com/office/infopath/2007/PartnerControls"/>
+    <ds:schemaRef ds:uri="71af3243-3dd4-4a8d-8c0d-dd76da1f02a5"/>
+  </ds:schemaRefs>
+</ds:datastoreItem>
+</file>
+
 <file path=customXml/itemProps3.xml><?xml version="1.0" encoding="utf-8"?>
 <ds:datastoreItem xmlns:ds="http://schemas.openxmlformats.org/officeDocument/2006/customXml" ds:itemID="{64B270AB-C138-415C-897E-3C24487DECF1}">
   <ds:schemaRefs>

</xml_diff>

<commit_message>
fixed a slide title
</commit_message>
<xml_diff>
--- a/umap/UMAP.pptx
+++ b/umap/UMAP.pptx
@@ -3216,7 +3216,7 @@
           <a:p>
             <a:fld id="{AFD01546-198A-4195-BCF8-F0FF54C90E5E}" type="datetimeFigureOut">
               <a:rPr lang="en-US" smtClean="0"/>
-              <a:t>5/14/2021</a:t>
+              <a:t>5/19/2021</a:t>
             </a:fld>
             <a:endParaRPr lang="en-US" dirty="0"/>
           </a:p>
@@ -3527,7 +3527,75 @@
           <a:bodyPr/>
           <a:lstStyle/>
           <a:p>
-            <a:endParaRPr lang="it-IT" dirty="0"/>
+            <a:r>
+              <a:rPr lang="it-IT" u="none" dirty="0" err="1"/>
+              <a:t>Umap</a:t>
+            </a:r>
+            <a:r>
+              <a:rPr lang="it-IT" u="none" dirty="0"/>
+              <a:t> è un metodo di riduzione della dimensionalità. Ci sono 2 tipi principali di metodi</a:t>
+            </a:r>
+            <a:r>
+              <a:rPr lang="en-US" u="none" dirty="0"/>
+              <a:t>: </a:t>
+            </a:r>
+            <a:r>
+              <a:rPr lang="en-US" u="none" dirty="0" err="1"/>
+              <a:t>fattorizzazione</a:t>
+            </a:r>
+            <a:r>
+              <a:rPr lang="en-US" u="none" dirty="0"/>
+              <a:t> </a:t>
+            </a:r>
+            <a:r>
+              <a:rPr lang="en-US" u="none" dirty="0" err="1"/>
+              <a:t>delle</a:t>
+            </a:r>
+            <a:r>
+              <a:rPr lang="en-US" u="none" dirty="0"/>
+              <a:t> </a:t>
+            </a:r>
+            <a:r>
+              <a:rPr lang="en-US" u="none" dirty="0" err="1"/>
+              <a:t>matrici</a:t>
+            </a:r>
+            <a:r>
+              <a:rPr lang="en-US" u="none" dirty="0"/>
+              <a:t>(PCA) e </a:t>
+            </a:r>
+            <a:r>
+              <a:rPr lang="en-US" u="none" dirty="0" err="1"/>
+              <a:t>grafi</a:t>
+            </a:r>
+            <a:r>
+              <a:rPr lang="en-US" u="none" dirty="0"/>
+              <a:t> </a:t>
+            </a:r>
+            <a:r>
+              <a:rPr lang="en-US" u="none" dirty="0" err="1"/>
+              <a:t>dei</a:t>
+            </a:r>
+            <a:r>
+              <a:rPr lang="en-US" u="none" dirty="0"/>
+              <a:t> </a:t>
+            </a:r>
+            <a:r>
+              <a:rPr lang="en-US" u="none" dirty="0" err="1"/>
+              <a:t>vicini</a:t>
+            </a:r>
+            <a:r>
+              <a:rPr lang="en-US" u="none" dirty="0"/>
+              <a:t> (</a:t>
+            </a:r>
+            <a:r>
+              <a:rPr lang="en-US" u="none" dirty="0" err="1"/>
+              <a:t>tSNE</a:t>
+            </a:r>
+            <a:r>
+              <a:rPr lang="en-US" u="none" dirty="0"/>
+              <a:t>, UMAP)</a:t>
+            </a:r>
+            <a:endParaRPr lang="it-IT" u="none" dirty="0"/>
           </a:p>
         </p:txBody>
       </p:sp>
@@ -3548,7 +3616,7 @@
           <a:p>
             <a:fld id="{2E6DE88F-1F85-4A27-9D34-D74A50E7B0DA}" type="slidenum">
               <a:rPr lang="en-US" smtClean="0"/>
-              <a:t>3</a:t>
+              <a:t>2</a:t>
             </a:fld>
             <a:endParaRPr lang="en-US" dirty="0"/>
           </a:p>
@@ -3557,7 +3625,7 @@
     </p:spTree>
     <p:extLst>
       <p:ext uri="{BB962C8B-B14F-4D97-AF65-F5344CB8AC3E}">
-        <p14:creationId xmlns:p14="http://schemas.microsoft.com/office/powerpoint/2010/main" val="4236069999"/>
+        <p14:creationId xmlns:p14="http://schemas.microsoft.com/office/powerpoint/2010/main" val="2512666686"/>
       </p:ext>
     </p:extLst>
   </p:cSld>
@@ -3612,58 +3680,59 @@
           <a:lstStyle/>
           <a:p>
             <a:r>
-              <a:rPr lang="it-IT" b="0" i="0" dirty="0">
-                <a:solidFill>
-                  <a:srgbClr val="000000"/>
-                </a:solidFill>
-                <a:effectLst/>
-                <a:latin typeface="Helvetica Neue"/>
-              </a:rPr>
-              <a:t>Possiamo notare che la maggior parte della struttura della topologia è rappresentata dai simplessi-0 e -1, che costituiscono il </a:t>
-            </a:r>
-            <a:r>
-              <a:rPr lang="it-IT" b="0" i="0" u="none" dirty="0">
-                <a:solidFill>
-                  <a:srgbClr val="296EAA"/>
-                </a:solidFill>
-                <a:effectLst/>
-                <a:latin typeface="Helvetica Neue"/>
-              </a:rPr>
-              <a:t>complesso di </a:t>
-            </a:r>
-            <a:r>
-              <a:rPr lang="it-IT" b="0" i="0" u="none" dirty="0" err="1">
-                <a:solidFill>
-                  <a:srgbClr val="296EAA"/>
-                </a:solidFill>
-                <a:effectLst/>
-                <a:latin typeface="Helvetica Neue"/>
-              </a:rPr>
-              <a:t>vietoris-rips</a:t>
-            </a:r>
-            <a:r>
-              <a:rPr lang="it-IT" b="0" i="0" dirty="0">
-                <a:solidFill>
-                  <a:srgbClr val="000000"/>
-                </a:solidFill>
-                <a:effectLst/>
-                <a:latin typeface="Helvetica Neue"/>
-              </a:rPr>
-              <a:t>. Poter lavorare solo con questi due tipi di simplessi rende l'algoritmo molto più efficiente, specialmente su grossi dataset.</a:t>
-            </a:r>
-          </a:p>
-          <a:p>
-            <a:r>
-              <a:rPr lang="it-IT" b="0" i="0" dirty="0">
-                <a:solidFill>
-                  <a:srgbClr val="000000"/>
-                </a:solidFill>
-                <a:effectLst/>
-                <a:latin typeface="Helvetica Neue"/>
-              </a:rPr>
-              <a:t>Considerando solamente i simplessi-0 e -1 abbiamo praticamente costruito il grafo ad alta dimensionalità e siamo pronti per trovare la sua controparte a bassa dimensionalità.</a:t>
-            </a:r>
-            <a:endParaRPr lang="it-IT" dirty="0"/>
+              <a:rPr lang="en-US" dirty="0" err="1"/>
+              <a:t>Arrivati</a:t>
+            </a:r>
+            <a:r>
+              <a:rPr lang="en-US" dirty="0"/>
+              <a:t> a </a:t>
+            </a:r>
+            <a:r>
+              <a:rPr lang="en-US" dirty="0" err="1"/>
+              <a:t>questo</a:t>
+            </a:r>
+            <a:r>
+              <a:rPr lang="en-US" dirty="0"/>
+              <a:t> punto </a:t>
+            </a:r>
+            <a:r>
+              <a:rPr lang="en-US" dirty="0" err="1"/>
+              <a:t>abbiamo</a:t>
+            </a:r>
+            <a:r>
+              <a:rPr lang="en-US" dirty="0"/>
+              <a:t> un </a:t>
+            </a:r>
+            <a:r>
+              <a:rPr lang="en-US" dirty="0" err="1"/>
+              <a:t>grafo</a:t>
+            </a:r>
+            <a:r>
+              <a:rPr lang="en-US" dirty="0"/>
+              <a:t> ad </a:t>
+            </a:r>
+            <a:r>
+              <a:rPr lang="en-US" dirty="0" err="1"/>
+              <a:t>alta</a:t>
+            </a:r>
+            <a:r>
+              <a:rPr lang="en-US" dirty="0"/>
+              <a:t> </a:t>
+            </a:r>
+            <a:r>
+              <a:rPr lang="en-US" dirty="0" err="1"/>
+              <a:t>dimensionalit</a:t>
+            </a:r>
+            <a:r>
+              <a:rPr lang="it-IT" dirty="0"/>
+              <a:t>à, che grazie alle garanzie della teoria sottostante, ci garantisce di essere sicuri sia una buona approssimazione della topologia.</a:t>
+            </a:r>
+          </a:p>
+          <a:p>
+            <a:r>
+              <a:rPr lang="it-IT" dirty="0"/>
+              <a:t>Come si può notare qui non abbiamo più i simplessi di grado maggiore al primo </a:t>
+            </a:r>
           </a:p>
         </p:txBody>
       </p:sp>
@@ -3684,7 +3753,7 @@
           <a:p>
             <a:fld id="{2E6DE88F-1F85-4A27-9D34-D74A50E7B0DA}" type="slidenum">
               <a:rPr lang="en-US" smtClean="0"/>
-              <a:t>12</a:t>
+              <a:t>11</a:t>
             </a:fld>
             <a:endParaRPr lang="en-US" dirty="0"/>
           </a:p>
@@ -3693,7 +3762,7 @@
     </p:spTree>
     <p:extLst>
       <p:ext uri="{BB962C8B-B14F-4D97-AF65-F5344CB8AC3E}">
-        <p14:creationId xmlns:p14="http://schemas.microsoft.com/office/powerpoint/2010/main" val="3731363159"/>
+        <p14:creationId xmlns:p14="http://schemas.microsoft.com/office/powerpoint/2010/main" val="1686818726"/>
       </p:ext>
     </p:extLst>
   </p:cSld>
@@ -3747,23 +3816,6 @@
           <a:bodyPr/>
           <a:lstStyle/>
           <a:p>
-            <a:pPr marL="0" marR="0" lvl="0" indent="0" algn="l" defTabSz="914400" rtl="0" eaLnBrk="1" fontAlgn="auto" latinLnBrk="0" hangingPunct="1">
-              <a:lnSpc>
-                <a:spcPct val="100000"/>
-              </a:lnSpc>
-              <a:spcBef>
-                <a:spcPts val="0"/>
-              </a:spcBef>
-              <a:spcAft>
-                <a:spcPts val="0"/>
-              </a:spcAft>
-              <a:buClrTx/>
-              <a:buSzTx/>
-              <a:buFontTx/>
-              <a:buNone/>
-              <a:tabLst/>
-              <a:defRPr/>
-            </a:pPr>
             <a:r>
               <a:rPr lang="it-IT" b="0" i="0" dirty="0">
                 <a:solidFill>
@@ -3772,107 +3824,27 @@
                 <a:effectLst/>
                 <a:latin typeface="Helvetica Neue"/>
               </a:rPr>
-              <a:t>Una volta ottenuto il grafo ad alta dimensionalità precedente, dobbiamo riuscire a trovarne uno a bassa dimensionalità corrispondente. Abbiamo ancora 2 problemi da risolvere</a:t>
-            </a:r>
-            <a:r>
-              <a:rPr lang="en-US" b="0" i="0" dirty="0">
+              <a:t>Possiamo notare che la maggior parte della struttura della topologia è rappresentata dai simplessi-0 e -1, che costituiscono il </a:t>
+            </a:r>
+            <a:r>
+              <a:rPr lang="it-IT" b="0" i="0" u="none" dirty="0">
                 <a:solidFill>
-                  <a:srgbClr val="000000"/>
+                  <a:srgbClr val="296EAA"/>
                 </a:solidFill>
                 <a:effectLst/>
                 <a:latin typeface="Helvetica Neue"/>
               </a:rPr>
-              <a:t>: </a:t>
-            </a:r>
-            <a:r>
-              <a:rPr lang="en-US" b="0" i="0" dirty="0" err="1">
+              <a:t>complesso di </a:t>
+            </a:r>
+            <a:r>
+              <a:rPr lang="it-IT" b="0" i="0" u="none" dirty="0" err="1">
                 <a:solidFill>
-                  <a:srgbClr val="000000"/>
+                  <a:srgbClr val="296EAA"/>
                 </a:solidFill>
                 <a:effectLst/>
                 <a:latin typeface="Helvetica Neue"/>
               </a:rPr>
-              <a:t>capire</a:t>
-            </a:r>
-            <a:r>
-              <a:rPr lang="en-US" b="0" i="0" dirty="0">
-                <a:solidFill>
-                  <a:srgbClr val="000000"/>
-                </a:solidFill>
-                <a:effectLst/>
-                <a:latin typeface="Helvetica Neue"/>
-              </a:rPr>
-              <a:t> come </a:t>
-            </a:r>
-            <a:r>
-              <a:rPr lang="en-US" b="0" i="0" dirty="0" err="1">
-                <a:solidFill>
-                  <a:srgbClr val="000000"/>
-                </a:solidFill>
-                <a:effectLst/>
-                <a:latin typeface="Helvetica Neue"/>
-              </a:rPr>
-              <a:t>costruire</a:t>
-            </a:r>
-            <a:r>
-              <a:rPr lang="en-US" b="0" i="0" dirty="0">
-                <a:solidFill>
-                  <a:srgbClr val="000000"/>
-                </a:solidFill>
-                <a:effectLst/>
-                <a:latin typeface="Helvetica Neue"/>
-              </a:rPr>
-              <a:t> la </a:t>
-            </a:r>
-            <a:r>
-              <a:rPr lang="en-US" b="0" i="0" dirty="0" err="1">
-                <a:solidFill>
-                  <a:srgbClr val="000000"/>
-                </a:solidFill>
-                <a:effectLst/>
-                <a:latin typeface="Helvetica Neue"/>
-              </a:rPr>
-              <a:t>struttura</a:t>
-            </a:r>
-            <a:r>
-              <a:rPr lang="en-US" b="0" i="0" dirty="0">
-                <a:solidFill>
-                  <a:srgbClr val="000000"/>
-                </a:solidFill>
-                <a:effectLst/>
-                <a:latin typeface="Helvetica Neue"/>
-              </a:rPr>
-              <a:t> in uno </a:t>
-            </a:r>
-            <a:r>
-              <a:rPr lang="en-US" b="0" i="0" dirty="0" err="1">
-                <a:solidFill>
-                  <a:srgbClr val="000000"/>
-                </a:solidFill>
-                <a:effectLst/>
-                <a:latin typeface="Helvetica Neue"/>
-              </a:rPr>
-              <a:t>spazio</a:t>
-            </a:r>
-            <a:r>
-              <a:rPr lang="en-US" b="0" i="0" dirty="0">
-                <a:solidFill>
-                  <a:srgbClr val="000000"/>
-                </a:solidFill>
-                <a:effectLst/>
-                <a:latin typeface="Helvetica Neue"/>
-              </a:rPr>
-              <a:t> a </a:t>
-            </a:r>
-            <a:r>
-              <a:rPr lang="en-US" b="0" i="0" dirty="0" err="1">
-                <a:solidFill>
-                  <a:srgbClr val="000000"/>
-                </a:solidFill>
-                <a:effectLst/>
-                <a:latin typeface="Helvetica Neue"/>
-              </a:rPr>
-              <a:t>dimensionalit</a:t>
+              <a:t>vietoris-rips</a:t>
             </a:r>
             <a:r>
               <a:rPr lang="it-IT" b="0" i="0" dirty="0">
@@ -3882,7 +3854,19 @@
                 <a:effectLst/>
                 <a:latin typeface="Helvetica Neue"/>
               </a:rPr>
-              <a:t>à ridotta e capire quanto sono simili le 2 strutture.</a:t>
+              <a:t>. Poter lavorare solo con questi due tipi di simplessi rende l'algoritmo molto più efficiente, specialmente su grossi dataset.</a:t>
+            </a:r>
+          </a:p>
+          <a:p>
+            <a:r>
+              <a:rPr lang="it-IT" b="0" i="0" dirty="0">
+                <a:solidFill>
+                  <a:srgbClr val="000000"/>
+                </a:solidFill>
+                <a:effectLst/>
+                <a:latin typeface="Helvetica Neue"/>
+              </a:rPr>
+              <a:t>Considerando solamente i simplessi-0 e -1 abbiamo praticamente costruito il grafo ad alta dimensionalità e siamo pronti per trovare la sua controparte a bassa dimensionalità.</a:t>
             </a:r>
             <a:endParaRPr lang="it-IT" dirty="0"/>
           </a:p>
@@ -3905,7 +3889,7 @@
           <a:p>
             <a:fld id="{2E6DE88F-1F85-4A27-9D34-D74A50E7B0DA}" type="slidenum">
               <a:rPr lang="en-US" smtClean="0"/>
-              <a:t>13</a:t>
+              <a:t>12</a:t>
             </a:fld>
             <a:endParaRPr lang="en-US" dirty="0"/>
           </a:p>
@@ -3914,7 +3898,7 @@
     </p:spTree>
     <p:extLst>
       <p:ext uri="{BB962C8B-B14F-4D97-AF65-F5344CB8AC3E}">
-        <p14:creationId xmlns:p14="http://schemas.microsoft.com/office/powerpoint/2010/main" val="1907729732"/>
+        <p14:creationId xmlns:p14="http://schemas.microsoft.com/office/powerpoint/2010/main" val="3731363159"/>
       </p:ext>
     </p:extLst>
   </p:cSld>
@@ -3968,118 +3952,144 @@
           <a:bodyPr/>
           <a:lstStyle/>
           <a:p>
-            <a:r>
-              <a:rPr lang="it-IT" dirty="0"/>
-              <a:t>Possiamo seguire il processo che abbiamo fatto per la costruzione del grafo ad alta dimensionalità con una modifica principale</a:t>
-            </a:r>
-            <a:r>
-              <a:rPr lang="en-US" dirty="0"/>
-              <a:t>, </a:t>
-            </a:r>
-            <a:r>
-              <a:rPr lang="en-US" dirty="0" err="1"/>
-              <a:t>dato</a:t>
-            </a:r>
-            <a:r>
-              <a:rPr lang="en-US" dirty="0"/>
-              <a:t> </a:t>
-            </a:r>
-            <a:r>
-              <a:rPr lang="en-US" dirty="0" err="1"/>
-              <a:t>che</a:t>
-            </a:r>
-            <a:r>
-              <a:rPr lang="en-US" dirty="0"/>
-              <a:t> </a:t>
-            </a:r>
-            <a:r>
-              <a:rPr lang="en-US" dirty="0" err="1"/>
-              <a:t>sappiamo</a:t>
-            </a:r>
-            <a:r>
-              <a:rPr lang="en-US" dirty="0"/>
-              <a:t> lo </a:t>
-            </a:r>
-            <a:r>
-              <a:rPr lang="en-US" dirty="0" err="1"/>
+            <a:pPr marL="0" marR="0" lvl="0" indent="0" algn="l" defTabSz="914400" rtl="0" eaLnBrk="1" fontAlgn="auto" latinLnBrk="0" hangingPunct="1">
+              <a:lnSpc>
+                <a:spcPct val="100000"/>
+              </a:lnSpc>
+              <a:spcBef>
+                <a:spcPts val="0"/>
+              </a:spcBef>
+              <a:spcAft>
+                <a:spcPts val="0"/>
+              </a:spcAft>
+              <a:buClrTx/>
+              <a:buSzTx/>
+              <a:buFontTx/>
+              <a:buNone/>
+              <a:tabLst/>
+              <a:defRPr/>
+            </a:pPr>
+            <a:r>
+              <a:rPr lang="it-IT" b="0" i="0" dirty="0">
+                <a:solidFill>
+                  <a:srgbClr val="000000"/>
+                </a:solidFill>
+                <a:effectLst/>
+                <a:latin typeface="Helvetica Neue"/>
+              </a:rPr>
+              <a:t>Una volta ottenuto il grafo ad alta dimensionalità precedente, dobbiamo riuscire a trovarne uno a bassa dimensionalità corrispondente. Abbiamo ancora 2 problemi da risolvere</a:t>
+            </a:r>
+            <a:r>
+              <a:rPr lang="en-US" b="0" i="0" dirty="0">
+                <a:solidFill>
+                  <a:srgbClr val="000000"/>
+                </a:solidFill>
+                <a:effectLst/>
+                <a:latin typeface="Helvetica Neue"/>
+              </a:rPr>
+              <a:t>: </a:t>
+            </a:r>
+            <a:r>
+              <a:rPr lang="en-US" b="0" i="0" dirty="0" err="1">
+                <a:solidFill>
+                  <a:srgbClr val="000000"/>
+                </a:solidFill>
+                <a:effectLst/>
+                <a:latin typeface="Helvetica Neue"/>
+              </a:rPr>
+              <a:t>capire</a:t>
+            </a:r>
+            <a:r>
+              <a:rPr lang="en-US" b="0" i="0" dirty="0">
+                <a:solidFill>
+                  <a:srgbClr val="000000"/>
+                </a:solidFill>
+                <a:effectLst/>
+                <a:latin typeface="Helvetica Neue"/>
+              </a:rPr>
+              <a:t> come </a:t>
+            </a:r>
+            <a:r>
+              <a:rPr lang="en-US" b="0" i="0" dirty="0" err="1">
+                <a:solidFill>
+                  <a:srgbClr val="000000"/>
+                </a:solidFill>
+                <a:effectLst/>
+                <a:latin typeface="Helvetica Neue"/>
+              </a:rPr>
+              <a:t>costruire</a:t>
+            </a:r>
+            <a:r>
+              <a:rPr lang="en-US" b="0" i="0" dirty="0">
+                <a:solidFill>
+                  <a:srgbClr val="000000"/>
+                </a:solidFill>
+                <a:effectLst/>
+                <a:latin typeface="Helvetica Neue"/>
+              </a:rPr>
+              <a:t> la </a:t>
+            </a:r>
+            <a:r>
+              <a:rPr lang="en-US" b="0" i="0" dirty="0" err="1">
+                <a:solidFill>
+                  <a:srgbClr val="000000"/>
+                </a:solidFill>
+                <a:effectLst/>
+                <a:latin typeface="Helvetica Neue"/>
+              </a:rPr>
+              <a:t>struttura</a:t>
+            </a:r>
+            <a:r>
+              <a:rPr lang="en-US" b="0" i="0" dirty="0">
+                <a:solidFill>
+                  <a:srgbClr val="000000"/>
+                </a:solidFill>
+                <a:effectLst/>
+                <a:latin typeface="Helvetica Neue"/>
+              </a:rPr>
+              <a:t> in uno </a:t>
+            </a:r>
+            <a:r>
+              <a:rPr lang="en-US" b="0" i="0" dirty="0" err="1">
+                <a:solidFill>
+                  <a:srgbClr val="000000"/>
+                </a:solidFill>
+                <a:effectLst/>
+                <a:latin typeface="Helvetica Neue"/>
+              </a:rPr>
               <a:t>spazio</a:t>
             </a:r>
             <a:r>
-              <a:rPr lang="en-US" dirty="0"/>
-              <a:t> in cui </a:t>
-            </a:r>
-            <a:r>
-              <a:rPr lang="en-US" dirty="0" err="1"/>
-              <a:t>vogliamo</a:t>
-            </a:r>
-            <a:r>
-              <a:rPr lang="en-US" dirty="0"/>
-              <a:t> </a:t>
-            </a:r>
-            <a:r>
-              <a:rPr lang="en-US" dirty="0" err="1"/>
-              <a:t>finire</a:t>
-            </a:r>
-            <a:r>
-              <a:rPr lang="en-US" dirty="0"/>
+              <a:rPr lang="en-US" b="0" i="0" dirty="0">
+                <a:solidFill>
+                  <a:srgbClr val="000000"/>
+                </a:solidFill>
+                <a:effectLst/>
+                <a:latin typeface="Helvetica Neue"/>
+              </a:rPr>
               <a:t> a </a:t>
             </a:r>
             <a:r>
-              <a:rPr lang="en-US" dirty="0" err="1"/>
-              <a:t>lavorare</a:t>
-            </a:r>
-            <a:r>
-              <a:rPr lang="en-US" dirty="0"/>
-              <a:t> (uno </a:t>
-            </a:r>
-            <a:r>
-              <a:rPr lang="en-US" dirty="0" err="1"/>
-              <a:t>spazio</a:t>
-            </a:r>
-            <a:r>
-              <a:rPr lang="en-US" dirty="0"/>
-              <a:t> </a:t>
-            </a:r>
-            <a:r>
-              <a:rPr lang="en-US" dirty="0" err="1"/>
-              <a:t>euclideo</a:t>
-            </a:r>
-            <a:r>
-              <a:rPr lang="en-US" dirty="0"/>
-              <a:t> a </a:t>
-            </a:r>
-            <a:r>
-              <a:rPr lang="en-US" dirty="0" err="1"/>
-              <a:t>bassa</a:t>
-            </a:r>
-            <a:r>
-              <a:rPr lang="en-US" dirty="0"/>
-              <a:t> </a:t>
-            </a:r>
-            <a:r>
-              <a:rPr lang="en-US" dirty="0" err="1"/>
+              <a:rPr lang="en-US" b="0" i="0" dirty="0" err="1">
+                <a:solidFill>
+                  <a:srgbClr val="000000"/>
+                </a:solidFill>
+                <a:effectLst/>
+                <a:latin typeface="Helvetica Neue"/>
+              </a:rPr>
               <a:t>dimensionalit</a:t>
             </a:r>
             <a:r>
-              <a:rPr lang="it-IT" dirty="0"/>
-              <a:t>à</a:t>
-            </a:r>
-            <a:r>
-              <a:rPr lang="en-US" dirty="0"/>
-              <a:t>) non ci serve pi</a:t>
-            </a:r>
-            <a:r>
-              <a:rPr lang="it-IT" dirty="0"/>
-              <a:t>ù avere nozioni diverse da punto a punto di distanza ma </a:t>
-            </a:r>
-            <a:r>
-              <a:rPr lang="it-IT" dirty="0" err="1"/>
-              <a:t>useremò</a:t>
-            </a:r>
-            <a:r>
-              <a:rPr lang="it-IT" dirty="0"/>
-              <a:t> globalmente la distanza euclidea. Anche in questo caso useremo come parametro il numero di vicini in modo da avere una proprietà mantenuta fra le rappresentazioni.</a:t>
-            </a:r>
+              <a:rPr lang="it-IT" b="0" i="0" dirty="0">
+                <a:solidFill>
+                  <a:srgbClr val="000000"/>
+                </a:solidFill>
+                <a:effectLst/>
+                <a:latin typeface="Helvetica Neue"/>
+              </a:rPr>
+              <a:t>à ridotta e capire quanto sono simili le 2 strutture.</a:t>
+            </a:r>
+            <a:endParaRPr lang="it-IT" dirty="0"/>
           </a:p>
         </p:txBody>
       </p:sp>
@@ -4100,7 +4110,7 @@
           <a:p>
             <a:fld id="{2E6DE88F-1F85-4A27-9D34-D74A50E7B0DA}" type="slidenum">
               <a:rPr lang="en-US" smtClean="0"/>
-              <a:t>14</a:t>
+              <a:t>13</a:t>
             </a:fld>
             <a:endParaRPr lang="en-US" dirty="0"/>
           </a:p>
@@ -4109,7 +4119,7 @@
     </p:spTree>
     <p:extLst>
       <p:ext uri="{BB962C8B-B14F-4D97-AF65-F5344CB8AC3E}">
-        <p14:creationId xmlns:p14="http://schemas.microsoft.com/office/powerpoint/2010/main" val="2866659616"/>
+        <p14:creationId xmlns:p14="http://schemas.microsoft.com/office/powerpoint/2010/main" val="1907729732"/>
       </p:ext>
     </p:extLst>
   </p:cSld>
@@ -4163,50 +4173,17 @@
           <a:bodyPr/>
           <a:lstStyle/>
           <a:p>
-            <a:pPr marL="0" marR="0" lvl="0" indent="0" algn="l" defTabSz="914400" rtl="0" eaLnBrk="1" fontAlgn="auto" latinLnBrk="0" hangingPunct="1">
-              <a:lnSpc>
-                <a:spcPct val="100000"/>
-              </a:lnSpc>
-              <a:spcBef>
-                <a:spcPts val="0"/>
-              </a:spcBef>
-              <a:spcAft>
-                <a:spcPts val="0"/>
-              </a:spcAft>
-              <a:buClrTx/>
-              <a:buSzTx/>
-              <a:buFontTx/>
-              <a:buNone/>
-              <a:tabLst/>
-              <a:defRPr/>
-            </a:pPr>
             <a:r>
               <a:rPr lang="it-IT" dirty="0"/>
-              <a:t>Ci serve una metrica per misurare quanto </a:t>
+              <a:t>Possiamo seguire il processo che abbiamo fatto per la costruzione del grafo ad alta dimensionalità con una modifica principale</a:t>
             </a:r>
             <a:r>
               <a:rPr lang="en-US" dirty="0"/>
-              <a:t>“vicine” </a:t>
-            </a:r>
-            <a:r>
-              <a:rPr lang="it-IT" noProof="0" dirty="0"/>
-              <a:t>sono</a:t>
-            </a:r>
-            <a:r>
-              <a:rPr lang="en-US" dirty="0"/>
-              <a:t> le due </a:t>
+              <a:t>, </a:t>
             </a:r>
             <a:r>
               <a:rPr lang="en-US" dirty="0" err="1"/>
-              <a:t>strutture</a:t>
-            </a:r>
-            <a:r>
-              <a:rPr lang="en-US" dirty="0"/>
-              <a:t> per </a:t>
-            </a:r>
-            <a:r>
-              <a:rPr lang="en-US" dirty="0" err="1"/>
-              <a:t>poter</a:t>
+              <a:t>dato</a:t>
             </a:r>
             <a:r>
               <a:rPr lang="en-US" dirty="0"/>
@@ -4214,7 +4191,7 @@
             </a:r>
             <a:r>
               <a:rPr lang="en-US" dirty="0" err="1"/>
-              <a:t>trasformare</a:t>
+              <a:t>che</a:t>
             </a:r>
             <a:r>
               <a:rPr lang="en-US" dirty="0"/>
@@ -4222,7 +4199,23 @@
             </a:r>
             <a:r>
               <a:rPr lang="en-US" dirty="0" err="1"/>
-              <a:t>questo</a:t>
+              <a:t>sappiamo</a:t>
+            </a:r>
+            <a:r>
+              <a:rPr lang="en-US" dirty="0"/>
+              <a:t> lo </a:t>
+            </a:r>
+            <a:r>
+              <a:rPr lang="en-US" dirty="0" err="1"/>
+              <a:t>spazio</a:t>
+            </a:r>
+            <a:r>
+              <a:rPr lang="en-US" dirty="0"/>
+              <a:t> in cui </a:t>
+            </a:r>
+            <a:r>
+              <a:rPr lang="en-US" dirty="0" err="1"/>
+              <a:t>vogliamo</a:t>
             </a:r>
             <a:r>
               <a:rPr lang="en-US" dirty="0"/>
@@ -4230,50 +4223,23 @@
             </a:r>
             <a:r>
               <a:rPr lang="en-US" dirty="0" err="1"/>
-              <a:t>problema</a:t>
+              <a:t>finire</a:t>
             </a:r>
             <a:r>
               <a:rPr lang="en-US" dirty="0"/>
-              <a:t> in un </a:t>
+              <a:t> a </a:t>
             </a:r>
             <a:r>
               <a:rPr lang="en-US" dirty="0" err="1"/>
-              <a:t>problema</a:t>
+              <a:t>lavorare</a:t>
             </a:r>
             <a:r>
               <a:rPr lang="en-US" dirty="0"/>
-              <a:t> di </a:t>
+              <a:t> (uno </a:t>
             </a:r>
             <a:r>
               <a:rPr lang="en-US" dirty="0" err="1"/>
-              <a:t>ottimizzazione</a:t>
-            </a:r>
-            <a:r>
-              <a:rPr lang="en-US" dirty="0"/>
-              <a:t>. </a:t>
-            </a:r>
-          </a:p>
-          <a:p>
-            <a:pPr marL="0" marR="0" lvl="0" indent="0" algn="l" defTabSz="914400" rtl="0" eaLnBrk="1" fontAlgn="auto" latinLnBrk="0" hangingPunct="1">
-              <a:lnSpc>
-                <a:spcPct val="100000"/>
-              </a:lnSpc>
-              <a:spcBef>
-                <a:spcPts val="0"/>
-              </a:spcBef>
-              <a:spcAft>
-                <a:spcPts val="0"/>
-              </a:spcAft>
-              <a:buClrTx/>
-              <a:buSzTx/>
-              <a:buFontTx/>
-              <a:buNone/>
-              <a:tabLst/>
-              <a:defRPr/>
-            </a:pPr>
-            <a:r>
-              <a:rPr lang="en-US" dirty="0" err="1"/>
-              <a:t>Quando</a:t>
+              <a:t>spazio</a:t>
             </a:r>
             <a:r>
               <a:rPr lang="en-US" dirty="0"/>
@@ -4281,7 +4247,15 @@
             </a:r>
             <a:r>
               <a:rPr lang="en-US" dirty="0" err="1"/>
-              <a:t>abbiamo</a:t>
+              <a:t>euclideo</a:t>
+            </a:r>
+            <a:r>
+              <a:rPr lang="en-US" dirty="0"/>
+              <a:t> a </a:t>
+            </a:r>
+            <a:r>
+              <a:rPr lang="en-US" dirty="0" err="1"/>
+              <a:t>bassa</a:t>
             </a:r>
             <a:r>
               <a:rPr lang="en-US" dirty="0"/>
@@ -4289,487 +4263,28 @@
             </a:r>
             <a:r>
               <a:rPr lang="en-US" dirty="0" err="1"/>
-              <a:t>unito</a:t>
+              <a:t>dimensionalit</a:t>
+            </a:r>
+            <a:r>
+              <a:rPr lang="it-IT" dirty="0"/>
+              <a:t>à</a:t>
             </a:r>
             <a:r>
               <a:rPr lang="en-US" dirty="0"/>
-              <a:t> le due </a:t>
-            </a:r>
-            <a:r>
-              <a:rPr lang="en-US" dirty="0" err="1"/>
-              <a:t>nozioni</a:t>
-            </a:r>
-            <a:r>
-              <a:rPr lang="en-US" dirty="0"/>
-              <a:t> di </a:t>
-            </a:r>
-            <a:r>
-              <a:rPr lang="en-US" dirty="0" err="1"/>
-              <a:t>distanza</a:t>
-            </a:r>
-            <a:r>
-              <a:rPr lang="en-US" dirty="0"/>
-              <a:t> diverse le </a:t>
-            </a:r>
-            <a:r>
-              <a:rPr lang="en-US" dirty="0" err="1"/>
-              <a:t>abbiamo</a:t>
-            </a:r>
-            <a:r>
-              <a:rPr lang="en-US" dirty="0"/>
-              <a:t> considerate come le </a:t>
-            </a:r>
-            <a:r>
-              <a:rPr lang="en-US" dirty="0" err="1"/>
-              <a:t>probabilità</a:t>
-            </a:r>
-            <a:r>
-              <a:rPr lang="en-US" dirty="0"/>
-              <a:t> </a:t>
-            </a:r>
-            <a:r>
-              <a:rPr lang="en-US" dirty="0" err="1"/>
-              <a:t>che</a:t>
-            </a:r>
-            <a:r>
-              <a:rPr lang="en-US" dirty="0"/>
-              <a:t> </a:t>
-            </a:r>
-            <a:r>
-              <a:rPr lang="en-US" dirty="0" err="1"/>
-              <a:t>quell’arco</a:t>
-            </a:r>
-            <a:r>
-              <a:rPr lang="en-US" dirty="0"/>
-              <a:t> </a:t>
-            </a:r>
-            <a:r>
-              <a:rPr lang="en-US" dirty="0" err="1"/>
-              <a:t>esistesse</a:t>
-            </a:r>
-            <a:r>
-              <a:rPr lang="en-US" dirty="0"/>
-              <a:t>. Dato </a:t>
-            </a:r>
-            <a:r>
-              <a:rPr lang="en-US" dirty="0" err="1"/>
-              <a:t>che</a:t>
-            </a:r>
-            <a:r>
-              <a:rPr lang="en-US" dirty="0"/>
-              <a:t> </a:t>
-            </a:r>
-            <a:r>
-              <a:rPr lang="en-US" dirty="0" err="1"/>
-              <a:t>entrambe</a:t>
-            </a:r>
-            <a:r>
-              <a:rPr lang="en-US" dirty="0"/>
-              <a:t> le </a:t>
-            </a:r>
-            <a:r>
-              <a:rPr lang="en-US" dirty="0" err="1"/>
-              <a:t>strutture</a:t>
-            </a:r>
-            <a:r>
-              <a:rPr lang="en-US" dirty="0"/>
-              <a:t> </a:t>
-            </a:r>
-            <a:r>
-              <a:rPr lang="en-US" dirty="0" err="1"/>
-              <a:t>hanno</a:t>
-            </a:r>
-            <a:r>
-              <a:rPr lang="en-US" dirty="0"/>
-              <a:t> </a:t>
-            </a:r>
-            <a:r>
-              <a:rPr lang="en-US" dirty="0" err="1"/>
-              <a:t>gli</a:t>
-            </a:r>
-            <a:r>
-              <a:rPr lang="en-US" dirty="0"/>
-              <a:t> </a:t>
-            </a:r>
-            <a:r>
-              <a:rPr lang="en-US" dirty="0" err="1"/>
-              <a:t>stessi</a:t>
-            </a:r>
-            <a:r>
-              <a:rPr lang="en-US" dirty="0"/>
-              <a:t> simplessi-0 (</a:t>
-            </a:r>
-            <a:r>
-              <a:rPr lang="en-US" dirty="0" err="1"/>
-              <a:t>punti</a:t>
-            </a:r>
-            <a:r>
-              <a:rPr lang="en-US" dirty="0"/>
-              <a:t>), </a:t>
-            </a:r>
-            <a:r>
-              <a:rPr lang="en-US" dirty="0" err="1"/>
-              <a:t>possiamo</a:t>
-            </a:r>
-            <a:r>
-              <a:rPr lang="en-US" dirty="0"/>
-              <a:t> </a:t>
-            </a:r>
-            <a:r>
-              <a:rPr lang="en-US" dirty="0" err="1"/>
-              <a:t>immaginare</a:t>
-            </a:r>
-            <a:r>
-              <a:rPr lang="en-US" dirty="0"/>
-              <a:t> di </a:t>
-            </a:r>
-            <a:r>
-              <a:rPr lang="en-US" dirty="0" err="1"/>
-              <a:t>confrontare</a:t>
-            </a:r>
-            <a:r>
-              <a:rPr lang="en-US" dirty="0"/>
-              <a:t> due </a:t>
-            </a:r>
-            <a:r>
-              <a:rPr lang="en-US" dirty="0" err="1"/>
-              <a:t>vettori</a:t>
-            </a:r>
-            <a:r>
-              <a:rPr lang="en-US" dirty="0"/>
-              <a:t> di </a:t>
-            </a:r>
-            <a:r>
-              <a:rPr lang="en-US" dirty="0" err="1"/>
-              <a:t>probabilità</a:t>
-            </a:r>
-            <a:r>
-              <a:rPr lang="en-US" dirty="0"/>
-              <a:t> </a:t>
-            </a:r>
-            <a:r>
-              <a:rPr lang="en-US" dirty="0" err="1"/>
-              <a:t>indicizzati</a:t>
-            </a:r>
-            <a:r>
-              <a:rPr lang="en-US" dirty="0"/>
-              <a:t> da un simplesso-0(arco). </a:t>
-            </a:r>
-            <a:r>
-              <a:rPr lang="en-US" dirty="0" err="1"/>
-              <a:t>Possiamo</a:t>
-            </a:r>
-            <a:r>
-              <a:rPr lang="en-US" dirty="0"/>
-              <a:t> </a:t>
-            </a:r>
-            <a:r>
-              <a:rPr lang="en-US" dirty="0" err="1"/>
-              <a:t>considerarli</a:t>
-            </a:r>
-            <a:r>
-              <a:rPr lang="en-US" dirty="0"/>
-              <a:t> come </a:t>
-            </a:r>
-            <a:r>
-              <a:rPr lang="en-US" dirty="0" err="1"/>
-              <a:t>variabili</a:t>
-            </a:r>
-            <a:r>
-              <a:rPr lang="en-US" dirty="0"/>
-              <a:t> di Bernoulli e </a:t>
-            </a:r>
-            <a:r>
-              <a:rPr lang="en-US" dirty="0" err="1"/>
-              <a:t>quindi</a:t>
-            </a:r>
-            <a:r>
-              <a:rPr lang="en-US" dirty="0"/>
-              <a:t> </a:t>
-            </a:r>
-            <a:r>
-              <a:rPr lang="en-US" dirty="0" err="1"/>
-              <a:t>usare</a:t>
-            </a:r>
-            <a:r>
-              <a:rPr lang="en-US" dirty="0"/>
-              <a:t> </a:t>
-            </a:r>
-            <a:r>
-              <a:rPr lang="en-US" dirty="0" err="1"/>
-              <a:t>l’entropia</a:t>
-            </a:r>
-            <a:r>
-              <a:rPr lang="en-US" dirty="0"/>
-              <a:t> </a:t>
-            </a:r>
-            <a:r>
-              <a:rPr lang="en-US" dirty="0" err="1"/>
-              <a:t>incrociata</a:t>
-            </a:r>
-            <a:r>
-              <a:rPr lang="en-US" dirty="0"/>
-              <a:t> per </a:t>
-            </a:r>
-            <a:r>
-              <a:rPr lang="en-US" dirty="0" err="1"/>
-              <a:t>confrontarli</a:t>
-            </a:r>
-            <a:r>
-              <a:rPr lang="en-US" dirty="0"/>
-              <a:t>.</a:t>
-            </a:r>
-          </a:p>
-          <a:p>
-            <a:pPr marL="0" marR="0" lvl="0" indent="0" algn="l" defTabSz="914400" rtl="0" eaLnBrk="1" fontAlgn="auto" latinLnBrk="0" hangingPunct="1">
-              <a:lnSpc>
-                <a:spcPct val="100000"/>
-              </a:lnSpc>
-              <a:spcBef>
-                <a:spcPts val="0"/>
-              </a:spcBef>
-              <a:spcAft>
-                <a:spcPts val="0"/>
-              </a:spcAft>
-              <a:buClrTx/>
-              <a:buSzTx/>
-              <a:buFontTx/>
-              <a:buNone/>
-              <a:tabLst/>
-              <a:defRPr/>
-            </a:pPr>
-            <a:r>
-              <a:rPr lang="en-US" dirty="0"/>
-              <a:t>Il primo </a:t>
-            </a:r>
-            <a:r>
-              <a:rPr lang="en-US" dirty="0" err="1"/>
-              <a:t>termine</a:t>
-            </a:r>
-            <a:r>
-              <a:rPr lang="en-US" dirty="0"/>
-              <a:t> </a:t>
-            </a:r>
-            <a:r>
-              <a:rPr lang="en-US" dirty="0" err="1"/>
-              <a:t>rappresenta</a:t>
-            </a:r>
-            <a:r>
-              <a:rPr lang="en-US" dirty="0"/>
-              <a:t> la forza </a:t>
-            </a:r>
-            <a:r>
-              <a:rPr lang="en-US" dirty="0" err="1"/>
-              <a:t>attrattiva</a:t>
-            </a:r>
-            <a:r>
-              <a:rPr lang="en-US" dirty="0"/>
-              <a:t> </a:t>
-            </a:r>
-            <a:r>
-              <a:rPr lang="en-US" dirty="0" err="1"/>
-              <a:t>fra</a:t>
-            </a:r>
-            <a:r>
-              <a:rPr lang="en-US" dirty="0"/>
-              <a:t> I </a:t>
-            </a:r>
-            <a:r>
-              <a:rPr lang="en-US" dirty="0" err="1"/>
-              <a:t>punti</a:t>
-            </a:r>
-            <a:r>
-              <a:rPr lang="en-US" dirty="0"/>
-              <a:t> </a:t>
-            </a:r>
-            <a:r>
-              <a:rPr lang="en-US" dirty="0" err="1"/>
-              <a:t>appartenenti</a:t>
-            </a:r>
-            <a:r>
-              <a:rPr lang="en-US" dirty="0"/>
-              <a:t> </a:t>
-            </a:r>
-            <a:r>
-              <a:rPr lang="en-US" dirty="0" err="1"/>
-              <a:t>all’arco</a:t>
-            </a:r>
-            <a:r>
-              <a:rPr lang="en-US" dirty="0"/>
-              <a:t> e </a:t>
-            </a:r>
-            <a:r>
-              <a:rPr lang="en-US" dirty="0" err="1"/>
-              <a:t>quando</a:t>
-            </a:r>
-            <a:r>
-              <a:rPr lang="en-US" dirty="0"/>
-              <a:t> vi è </a:t>
-            </a:r>
-            <a:r>
-              <a:rPr lang="en-US" dirty="0" err="1"/>
-              <a:t>associato</a:t>
-            </a:r>
-            <a:r>
-              <a:rPr lang="en-US" dirty="0"/>
-              <a:t> un alto peso </a:t>
-            </a:r>
-            <a:r>
-              <a:rPr lang="en-US" dirty="0" err="1"/>
-              <a:t>nella</a:t>
-            </a:r>
-            <a:r>
-              <a:rPr lang="en-US" dirty="0"/>
-              <a:t> </a:t>
-            </a:r>
-            <a:r>
-              <a:rPr lang="en-US" dirty="0" err="1"/>
-              <a:t>rappresentazione</a:t>
-            </a:r>
-            <a:r>
-              <a:rPr lang="en-US" dirty="0"/>
-              <a:t> ad </a:t>
-            </a:r>
-            <a:r>
-              <a:rPr lang="en-US" dirty="0" err="1"/>
-              <a:t>alta</a:t>
-            </a:r>
-            <a:r>
-              <a:rPr lang="en-US" dirty="0"/>
-              <a:t> dimensionalità. </a:t>
-            </a:r>
-            <a:r>
-              <a:rPr lang="en-US" dirty="0" err="1"/>
-              <a:t>Questo</a:t>
-            </a:r>
-            <a:r>
-              <a:rPr lang="en-US" dirty="0"/>
-              <a:t> </a:t>
-            </a:r>
-            <a:r>
-              <a:rPr lang="en-US" dirty="0" err="1"/>
-              <a:t>termine</a:t>
-            </a:r>
-            <a:r>
-              <a:rPr lang="en-US" dirty="0"/>
-              <a:t> </a:t>
-            </a:r>
-            <a:r>
-              <a:rPr lang="en-US" dirty="0" err="1"/>
-              <a:t>verrà</a:t>
-            </a:r>
-            <a:r>
-              <a:rPr lang="en-US" dirty="0"/>
-              <a:t> </a:t>
-            </a:r>
-            <a:r>
-              <a:rPr lang="en-US" dirty="0" err="1"/>
-              <a:t>minimizzato</a:t>
-            </a:r>
-            <a:r>
-              <a:rPr lang="en-US" dirty="0"/>
-              <a:t> </a:t>
-            </a:r>
-            <a:r>
-              <a:rPr lang="en-US" dirty="0" err="1"/>
-              <a:t>quando</a:t>
-            </a:r>
-            <a:r>
-              <a:rPr lang="en-US" dirty="0"/>
-              <a:t> </a:t>
-            </a:r>
-            <a:r>
-              <a:rPr lang="en-US" dirty="0" err="1"/>
-              <a:t>anche</a:t>
-            </a:r>
-            <a:r>
-              <a:rPr lang="en-US" dirty="0"/>
-              <a:t> </a:t>
-            </a:r>
-            <a:r>
-              <a:rPr lang="en-US" dirty="0" err="1"/>
-              <a:t>nella</a:t>
-            </a:r>
-            <a:r>
-              <a:rPr lang="en-US" dirty="0"/>
-              <a:t> </a:t>
-            </a:r>
-            <a:r>
-              <a:rPr lang="en-US" dirty="0" err="1"/>
-              <a:t>struttura</a:t>
-            </a:r>
-            <a:r>
-              <a:rPr lang="en-US" dirty="0"/>
-              <a:t> a </a:t>
-            </a:r>
-            <a:r>
-              <a:rPr lang="en-US" dirty="0" err="1"/>
-              <a:t>bassa</a:t>
-            </a:r>
-            <a:r>
-              <a:rPr lang="en-US" dirty="0"/>
-              <a:t> dimensionalità </a:t>
-            </a:r>
-            <a:r>
-              <a:rPr lang="en-US" dirty="0" err="1"/>
-              <a:t>avrò</a:t>
-            </a:r>
-            <a:r>
-              <a:rPr lang="en-US" dirty="0"/>
-              <a:t> un alto peso per lo </a:t>
-            </a:r>
-            <a:r>
-              <a:rPr lang="en-US" dirty="0" err="1"/>
-              <a:t>stesso</a:t>
-            </a:r>
-            <a:r>
-              <a:rPr lang="en-US" dirty="0"/>
-              <a:t> arco.</a:t>
-            </a:r>
-          </a:p>
-          <a:p>
-            <a:pPr marL="0" marR="0" lvl="0" indent="0" algn="l" defTabSz="914400" rtl="0" eaLnBrk="1" fontAlgn="auto" latinLnBrk="0" hangingPunct="1">
-              <a:lnSpc>
-                <a:spcPct val="100000"/>
-              </a:lnSpc>
-              <a:spcBef>
-                <a:spcPts val="0"/>
-              </a:spcBef>
-              <a:spcAft>
-                <a:spcPts val="0"/>
-              </a:spcAft>
-              <a:buClrTx/>
-              <a:buSzTx/>
-              <a:buFontTx/>
-              <a:buNone/>
-              <a:tabLst/>
-              <a:defRPr/>
-            </a:pPr>
-            <a:r>
-              <a:rPr lang="en-US" dirty="0"/>
-              <a:t>Il secondo </a:t>
-            </a:r>
-            <a:r>
-              <a:rPr lang="en-US" dirty="0" err="1"/>
-              <a:t>termine</a:t>
-            </a:r>
-            <a:r>
-              <a:rPr lang="en-US" dirty="0"/>
-              <a:t> </a:t>
-            </a:r>
-            <a:r>
-              <a:rPr lang="en-US" dirty="0" err="1"/>
-              <a:t>rappresenta</a:t>
-            </a:r>
-            <a:r>
-              <a:rPr lang="en-US" dirty="0"/>
-              <a:t> la forza </a:t>
-            </a:r>
-            <a:r>
-              <a:rPr lang="en-US" noProof="1"/>
-              <a:t>repulsiva quando il peso ad alta dimensionalità è basso. Questo termine verrà minimizzato quando il peso nella struttura a bassa dimensionalità sarà anche lui basso.</a:t>
-            </a:r>
-            <a:endParaRPr lang="it-IT" dirty="0"/>
+              <a:t>) non ci serve pi</a:t>
+            </a:r>
+            <a:r>
+              <a:rPr lang="it-IT" dirty="0"/>
+              <a:t>ù avere nozioni diverse da punto a punto di distanza ma </a:t>
+            </a:r>
+            <a:r>
+              <a:rPr lang="it-IT" dirty="0" err="1"/>
+              <a:t>useremò</a:t>
+            </a:r>
+            <a:r>
+              <a:rPr lang="it-IT" dirty="0"/>
+              <a:t> globalmente la distanza euclidea. Anche in questo caso useremo come parametro il numero di vicini in modo da avere una proprietà mantenuta fra le rappresentazioni.</a:t>
+            </a:r>
           </a:p>
         </p:txBody>
       </p:sp>
@@ -4790,7 +4305,7 @@
           <a:p>
             <a:fld id="{2E6DE88F-1F85-4A27-9D34-D74A50E7B0DA}" type="slidenum">
               <a:rPr lang="en-US" smtClean="0"/>
-              <a:t>15</a:t>
+              <a:t>14</a:t>
             </a:fld>
             <a:endParaRPr lang="en-US" dirty="0"/>
           </a:p>
@@ -4799,7 +4314,7 @@
     </p:spTree>
     <p:extLst>
       <p:ext uri="{BB962C8B-B14F-4D97-AF65-F5344CB8AC3E}">
-        <p14:creationId xmlns:p14="http://schemas.microsoft.com/office/powerpoint/2010/main" val="2279403576"/>
+        <p14:creationId xmlns:p14="http://schemas.microsoft.com/office/powerpoint/2010/main" val="2866659616"/>
       </p:ext>
     </p:extLst>
   </p:cSld>
@@ -4853,46 +4368,612 @@
           <a:bodyPr/>
           <a:lstStyle/>
           <a:p>
+            <a:pPr marL="0" marR="0" lvl="0" indent="0" algn="l" defTabSz="914400" rtl="0" eaLnBrk="1" fontAlgn="auto" latinLnBrk="0" hangingPunct="1">
+              <a:lnSpc>
+                <a:spcPct val="100000"/>
+              </a:lnSpc>
+              <a:spcBef>
+                <a:spcPts val="0"/>
+              </a:spcBef>
+              <a:spcAft>
+                <a:spcPts val="0"/>
+              </a:spcAft>
+              <a:buClrTx/>
+              <a:buSzTx/>
+              <a:buFontTx/>
+              <a:buNone/>
+              <a:tabLst/>
+              <a:defRPr/>
+            </a:pPr>
             <a:r>
               <a:rPr lang="it-IT" dirty="0"/>
-              <a:t>Consideriamo $X$ sia la distanza fra i punti ad alta dimensionalità e $Y$ sia la distanza fra i punti a bassa dimensionalità.</a:t>
-            </a:r>
-          </a:p>
-          <a:p>
-            <a:r>
-              <a:rPr lang="it-IT" dirty="0"/>
-              <a:t>Il primo termine è vicino a zero sia per valori alti che bassi </a:t>
-            </a:r>
-            <a:r>
-              <a:rPr lang="it-IT" dirty="0" err="1"/>
-              <a:t>di$X</a:t>
-            </a:r>
-            <a:r>
-              <a:rPr lang="it-IT" dirty="0"/>
-              <a:t>. Va a 0 per X piccole dato che l'esponente si avvicina a 1 e log(1)=0. Per X grandi va comunque a 0 dato che P(X) = e^-X^2 va a 0 più velocemente di quanto il logaritmo va verso -infinito.</a:t>
-            </a:r>
-          </a:p>
-          <a:p>
-            <a:r>
-              <a:rPr lang="it-IT" dirty="0"/>
-              <a:t>Secondo termine: se la distanza fra i punti ad alta dimensionalità è piccola, l'esponenziale va a 1, quindi con valori grandi di Y ci sarà una grossa penalità quindi </a:t>
-            </a:r>
-            <a:r>
-              <a:rPr lang="it-IT" dirty="0" err="1"/>
-              <a:t>tSNE</a:t>
-            </a:r>
-            <a:r>
-              <a:rPr lang="it-IT" dirty="0"/>
-              <a:t> cerca di ridurre Y se X è piccola per ridurre la penalità.</a:t>
-            </a:r>
-          </a:p>
-          <a:p>
-            <a:r>
-              <a:rPr lang="it-IT" dirty="0"/>
-              <a:t>Con valori grandi di X, Y può essere qualsiasi valore fra 0 e infinito dato che l'esponenziale va a zero e vince sempre sul logaritmo. Per colpa di questo, punti lontani nel grafo ad alta dimensionalità possono finire vicini nella rappresentazione a bassa dimensionalità senza che vi sia una penalità come nel caso contrario.</a:t>
-            </a:r>
-          </a:p>
-          <a:p>
+              <a:t>Ci serve una metrica per misurare quanto </a:t>
+            </a:r>
+            <a:r>
+              <a:rPr lang="en-US" dirty="0"/>
+              <a:t>“vicine” </a:t>
+            </a:r>
+            <a:r>
+              <a:rPr lang="it-IT" noProof="0" dirty="0"/>
+              <a:t>sono</a:t>
+            </a:r>
+            <a:r>
+              <a:rPr lang="en-US" dirty="0"/>
+              <a:t> le due </a:t>
+            </a:r>
+            <a:r>
+              <a:rPr lang="en-US" dirty="0" err="1"/>
+              <a:t>strutture</a:t>
+            </a:r>
+            <a:r>
+              <a:rPr lang="en-US" dirty="0"/>
+              <a:t> per </a:t>
+            </a:r>
+            <a:r>
+              <a:rPr lang="en-US" dirty="0" err="1"/>
+              <a:t>poter</a:t>
+            </a:r>
+            <a:r>
+              <a:rPr lang="en-US" dirty="0"/>
+              <a:t> </a:t>
+            </a:r>
+            <a:r>
+              <a:rPr lang="en-US" dirty="0" err="1"/>
+              <a:t>trasformare</a:t>
+            </a:r>
+            <a:r>
+              <a:rPr lang="en-US" dirty="0"/>
+              <a:t> </a:t>
+            </a:r>
+            <a:r>
+              <a:rPr lang="en-US" dirty="0" err="1"/>
+              <a:t>questo</a:t>
+            </a:r>
+            <a:r>
+              <a:rPr lang="en-US" dirty="0"/>
+              <a:t> </a:t>
+            </a:r>
+            <a:r>
+              <a:rPr lang="en-US" dirty="0" err="1"/>
+              <a:t>problema</a:t>
+            </a:r>
+            <a:r>
+              <a:rPr lang="en-US" dirty="0"/>
+              <a:t> in un </a:t>
+            </a:r>
+            <a:r>
+              <a:rPr lang="en-US" dirty="0" err="1"/>
+              <a:t>problema</a:t>
+            </a:r>
+            <a:r>
+              <a:rPr lang="en-US" dirty="0"/>
+              <a:t> di </a:t>
+            </a:r>
+            <a:r>
+              <a:rPr lang="en-US" dirty="0" err="1"/>
+              <a:t>ottimizzazione</a:t>
+            </a:r>
+            <a:r>
+              <a:rPr lang="en-US" dirty="0"/>
+              <a:t>. </a:t>
+            </a:r>
+          </a:p>
+          <a:p>
+            <a:pPr marL="0" marR="0" lvl="0" indent="0" algn="l" defTabSz="914400" rtl="0" eaLnBrk="1" fontAlgn="auto" latinLnBrk="0" hangingPunct="1">
+              <a:lnSpc>
+                <a:spcPct val="100000"/>
+              </a:lnSpc>
+              <a:spcBef>
+                <a:spcPts val="0"/>
+              </a:spcBef>
+              <a:spcAft>
+                <a:spcPts val="0"/>
+              </a:spcAft>
+              <a:buClrTx/>
+              <a:buSzTx/>
+              <a:buFontTx/>
+              <a:buNone/>
+              <a:tabLst/>
+              <a:defRPr/>
+            </a:pPr>
+            <a:r>
+              <a:rPr lang="en-US" dirty="0" err="1"/>
+              <a:t>Quando</a:t>
+            </a:r>
+            <a:r>
+              <a:rPr lang="en-US" dirty="0"/>
+              <a:t> </a:t>
+            </a:r>
+            <a:r>
+              <a:rPr lang="en-US" dirty="0" err="1"/>
+              <a:t>abbiamo</a:t>
+            </a:r>
+            <a:r>
+              <a:rPr lang="en-US" dirty="0"/>
+              <a:t> </a:t>
+            </a:r>
+            <a:r>
+              <a:rPr lang="en-US" dirty="0" err="1"/>
+              <a:t>unito</a:t>
+            </a:r>
+            <a:r>
+              <a:rPr lang="en-US" dirty="0"/>
+              <a:t> le due </a:t>
+            </a:r>
+            <a:r>
+              <a:rPr lang="en-US" dirty="0" err="1"/>
+              <a:t>nozioni</a:t>
+            </a:r>
+            <a:r>
+              <a:rPr lang="en-US" dirty="0"/>
+              <a:t> di </a:t>
+            </a:r>
+            <a:r>
+              <a:rPr lang="en-US" dirty="0" err="1"/>
+              <a:t>distanza</a:t>
+            </a:r>
+            <a:r>
+              <a:rPr lang="en-US" dirty="0"/>
+              <a:t> diverse le </a:t>
+            </a:r>
+            <a:r>
+              <a:rPr lang="en-US" dirty="0" err="1"/>
+              <a:t>abbiamo</a:t>
+            </a:r>
+            <a:r>
+              <a:rPr lang="en-US" dirty="0"/>
+              <a:t> considerate come le </a:t>
+            </a:r>
+            <a:r>
+              <a:rPr lang="en-US" dirty="0" err="1"/>
+              <a:t>probabilità</a:t>
+            </a:r>
+            <a:r>
+              <a:rPr lang="en-US" dirty="0"/>
+              <a:t> </a:t>
+            </a:r>
+            <a:r>
+              <a:rPr lang="en-US" dirty="0" err="1"/>
+              <a:t>che</a:t>
+            </a:r>
+            <a:r>
+              <a:rPr lang="en-US" dirty="0"/>
+              <a:t> </a:t>
+            </a:r>
+            <a:r>
+              <a:rPr lang="en-US" dirty="0" err="1"/>
+              <a:t>quell’arco</a:t>
+            </a:r>
+            <a:r>
+              <a:rPr lang="en-US" dirty="0"/>
+              <a:t> </a:t>
+            </a:r>
+            <a:r>
+              <a:rPr lang="en-US" dirty="0" err="1"/>
+              <a:t>esistesse</a:t>
+            </a:r>
+            <a:r>
+              <a:rPr lang="en-US" dirty="0"/>
+              <a:t>. Dato </a:t>
+            </a:r>
+            <a:r>
+              <a:rPr lang="en-US" dirty="0" err="1"/>
+              <a:t>che</a:t>
+            </a:r>
+            <a:r>
+              <a:rPr lang="en-US" dirty="0"/>
+              <a:t> </a:t>
+            </a:r>
+            <a:r>
+              <a:rPr lang="en-US" dirty="0" err="1"/>
+              <a:t>entrambe</a:t>
+            </a:r>
+            <a:r>
+              <a:rPr lang="en-US" dirty="0"/>
+              <a:t> le </a:t>
+            </a:r>
+            <a:r>
+              <a:rPr lang="en-US" dirty="0" err="1"/>
+              <a:t>strutture</a:t>
+            </a:r>
+            <a:r>
+              <a:rPr lang="en-US" dirty="0"/>
+              <a:t> </a:t>
+            </a:r>
+            <a:r>
+              <a:rPr lang="en-US" dirty="0" err="1"/>
+              <a:t>hanno</a:t>
+            </a:r>
+            <a:r>
+              <a:rPr lang="en-US" dirty="0"/>
+              <a:t> </a:t>
+            </a:r>
+            <a:r>
+              <a:rPr lang="en-US" dirty="0" err="1"/>
+              <a:t>gli</a:t>
+            </a:r>
+            <a:r>
+              <a:rPr lang="en-US" dirty="0"/>
+              <a:t> </a:t>
+            </a:r>
+            <a:r>
+              <a:rPr lang="en-US" dirty="0" err="1"/>
+              <a:t>stessi</a:t>
+            </a:r>
+            <a:r>
+              <a:rPr lang="en-US" dirty="0"/>
+              <a:t> simplessi-0 (</a:t>
+            </a:r>
+            <a:r>
+              <a:rPr lang="en-US" dirty="0" err="1"/>
+              <a:t>punti</a:t>
+            </a:r>
+            <a:r>
+              <a:rPr lang="en-US" dirty="0"/>
+              <a:t>), </a:t>
+            </a:r>
+            <a:r>
+              <a:rPr lang="en-US" dirty="0" err="1"/>
+              <a:t>possiamo</a:t>
+            </a:r>
+            <a:r>
+              <a:rPr lang="en-US" dirty="0"/>
+              <a:t> </a:t>
+            </a:r>
+            <a:r>
+              <a:rPr lang="en-US" dirty="0" err="1"/>
+              <a:t>immaginare</a:t>
+            </a:r>
+            <a:r>
+              <a:rPr lang="en-US" dirty="0"/>
+              <a:t> di </a:t>
+            </a:r>
+            <a:r>
+              <a:rPr lang="en-US" dirty="0" err="1"/>
+              <a:t>confrontare</a:t>
+            </a:r>
+            <a:r>
+              <a:rPr lang="en-US" dirty="0"/>
+              <a:t> due </a:t>
+            </a:r>
+            <a:r>
+              <a:rPr lang="en-US" dirty="0" err="1"/>
+              <a:t>vettori</a:t>
+            </a:r>
+            <a:r>
+              <a:rPr lang="en-US" dirty="0"/>
+              <a:t> di </a:t>
+            </a:r>
+            <a:r>
+              <a:rPr lang="en-US" dirty="0" err="1"/>
+              <a:t>probabilità</a:t>
+            </a:r>
+            <a:r>
+              <a:rPr lang="en-US" dirty="0"/>
+              <a:t> </a:t>
+            </a:r>
+            <a:r>
+              <a:rPr lang="en-US" dirty="0" err="1"/>
+              <a:t>indicizzati</a:t>
+            </a:r>
+            <a:r>
+              <a:rPr lang="en-US" dirty="0"/>
+              <a:t> da un simplesso-0(arco). </a:t>
+            </a:r>
+            <a:r>
+              <a:rPr lang="en-US" dirty="0" err="1"/>
+              <a:t>Possiamo</a:t>
+            </a:r>
+            <a:r>
+              <a:rPr lang="en-US" dirty="0"/>
+              <a:t> </a:t>
+            </a:r>
+            <a:r>
+              <a:rPr lang="en-US" dirty="0" err="1"/>
+              <a:t>considerarli</a:t>
+            </a:r>
+            <a:r>
+              <a:rPr lang="en-US" dirty="0"/>
+              <a:t> come </a:t>
+            </a:r>
+            <a:r>
+              <a:rPr lang="en-US" dirty="0" err="1"/>
+              <a:t>variabili</a:t>
+            </a:r>
+            <a:r>
+              <a:rPr lang="en-US" dirty="0"/>
+              <a:t> di Bernoulli e </a:t>
+            </a:r>
+            <a:r>
+              <a:rPr lang="en-US" dirty="0" err="1"/>
+              <a:t>quindi</a:t>
+            </a:r>
+            <a:r>
+              <a:rPr lang="en-US" dirty="0"/>
+              <a:t> </a:t>
+            </a:r>
+            <a:r>
+              <a:rPr lang="en-US" dirty="0" err="1"/>
+              <a:t>usare</a:t>
+            </a:r>
+            <a:r>
+              <a:rPr lang="en-US" dirty="0"/>
+              <a:t> </a:t>
+            </a:r>
+            <a:r>
+              <a:rPr lang="en-US" dirty="0" err="1"/>
+              <a:t>l’entropia</a:t>
+            </a:r>
+            <a:r>
+              <a:rPr lang="en-US" dirty="0"/>
+              <a:t> </a:t>
+            </a:r>
+            <a:r>
+              <a:rPr lang="en-US" dirty="0" err="1"/>
+              <a:t>incrociata</a:t>
+            </a:r>
+            <a:r>
+              <a:rPr lang="en-US" dirty="0"/>
+              <a:t> per </a:t>
+            </a:r>
+            <a:r>
+              <a:rPr lang="en-US" dirty="0" err="1"/>
+              <a:t>confrontarli</a:t>
+            </a:r>
+            <a:r>
+              <a:rPr lang="en-US" dirty="0"/>
+              <a:t>.</a:t>
+            </a:r>
+          </a:p>
+          <a:p>
+            <a:pPr marL="0" marR="0" lvl="0" indent="0" algn="l" defTabSz="914400" rtl="0" eaLnBrk="1" fontAlgn="auto" latinLnBrk="0" hangingPunct="1">
+              <a:lnSpc>
+                <a:spcPct val="100000"/>
+              </a:lnSpc>
+              <a:spcBef>
+                <a:spcPts val="0"/>
+              </a:spcBef>
+              <a:spcAft>
+                <a:spcPts val="0"/>
+              </a:spcAft>
+              <a:buClrTx/>
+              <a:buSzTx/>
+              <a:buFontTx/>
+              <a:buNone/>
+              <a:tabLst/>
+              <a:defRPr/>
+            </a:pPr>
+            <a:r>
+              <a:rPr lang="en-US" dirty="0"/>
+              <a:t>Il primo </a:t>
+            </a:r>
+            <a:r>
+              <a:rPr lang="en-US" dirty="0" err="1"/>
+              <a:t>termine</a:t>
+            </a:r>
+            <a:r>
+              <a:rPr lang="en-US" dirty="0"/>
+              <a:t> </a:t>
+            </a:r>
+            <a:r>
+              <a:rPr lang="en-US" dirty="0" err="1"/>
+              <a:t>rappresenta</a:t>
+            </a:r>
+            <a:r>
+              <a:rPr lang="en-US" dirty="0"/>
+              <a:t> la forza </a:t>
+            </a:r>
+            <a:r>
+              <a:rPr lang="en-US" dirty="0" err="1"/>
+              <a:t>attrattiva</a:t>
+            </a:r>
+            <a:r>
+              <a:rPr lang="en-US" dirty="0"/>
+              <a:t> </a:t>
+            </a:r>
+            <a:r>
+              <a:rPr lang="en-US" dirty="0" err="1"/>
+              <a:t>fra</a:t>
+            </a:r>
+            <a:r>
+              <a:rPr lang="en-US" dirty="0"/>
+              <a:t> I </a:t>
+            </a:r>
+            <a:r>
+              <a:rPr lang="en-US" dirty="0" err="1"/>
+              <a:t>punti</a:t>
+            </a:r>
+            <a:r>
+              <a:rPr lang="en-US" dirty="0"/>
+              <a:t> </a:t>
+            </a:r>
+            <a:r>
+              <a:rPr lang="en-US" dirty="0" err="1"/>
+              <a:t>appartenenti</a:t>
+            </a:r>
+            <a:r>
+              <a:rPr lang="en-US" dirty="0"/>
+              <a:t> </a:t>
+            </a:r>
+            <a:r>
+              <a:rPr lang="en-US" dirty="0" err="1"/>
+              <a:t>all’arco</a:t>
+            </a:r>
+            <a:r>
+              <a:rPr lang="en-US" dirty="0"/>
+              <a:t> e </a:t>
+            </a:r>
+            <a:r>
+              <a:rPr lang="en-US" dirty="0" err="1"/>
+              <a:t>quando</a:t>
+            </a:r>
+            <a:r>
+              <a:rPr lang="en-US" dirty="0"/>
+              <a:t> vi è </a:t>
+            </a:r>
+            <a:r>
+              <a:rPr lang="en-US" dirty="0" err="1"/>
+              <a:t>associato</a:t>
+            </a:r>
+            <a:r>
+              <a:rPr lang="en-US" dirty="0"/>
+              <a:t> un alto peso </a:t>
+            </a:r>
+            <a:r>
+              <a:rPr lang="en-US" dirty="0" err="1"/>
+              <a:t>nella</a:t>
+            </a:r>
+            <a:r>
+              <a:rPr lang="en-US" dirty="0"/>
+              <a:t> </a:t>
+            </a:r>
+            <a:r>
+              <a:rPr lang="en-US" dirty="0" err="1"/>
+              <a:t>rappresentazione</a:t>
+            </a:r>
+            <a:r>
+              <a:rPr lang="en-US" dirty="0"/>
+              <a:t> ad </a:t>
+            </a:r>
+            <a:r>
+              <a:rPr lang="en-US" dirty="0" err="1"/>
+              <a:t>alta</a:t>
+            </a:r>
+            <a:r>
+              <a:rPr lang="en-US" dirty="0"/>
+              <a:t> dimensionalità. </a:t>
+            </a:r>
+            <a:r>
+              <a:rPr lang="en-US" dirty="0" err="1"/>
+              <a:t>Questo</a:t>
+            </a:r>
+            <a:r>
+              <a:rPr lang="en-US" dirty="0"/>
+              <a:t> </a:t>
+            </a:r>
+            <a:r>
+              <a:rPr lang="en-US" dirty="0" err="1"/>
+              <a:t>termine</a:t>
+            </a:r>
+            <a:r>
+              <a:rPr lang="en-US" dirty="0"/>
+              <a:t> </a:t>
+            </a:r>
+            <a:r>
+              <a:rPr lang="en-US" dirty="0" err="1"/>
+              <a:t>verrà</a:t>
+            </a:r>
+            <a:r>
+              <a:rPr lang="en-US" dirty="0"/>
+              <a:t> </a:t>
+            </a:r>
+            <a:r>
+              <a:rPr lang="en-US" dirty="0" err="1"/>
+              <a:t>minimizzato</a:t>
+            </a:r>
+            <a:r>
+              <a:rPr lang="en-US" dirty="0"/>
+              <a:t> </a:t>
+            </a:r>
+            <a:r>
+              <a:rPr lang="en-US" dirty="0" err="1"/>
+              <a:t>quando</a:t>
+            </a:r>
+            <a:r>
+              <a:rPr lang="en-US" dirty="0"/>
+              <a:t> </a:t>
+            </a:r>
+            <a:r>
+              <a:rPr lang="en-US" dirty="0" err="1"/>
+              <a:t>anche</a:t>
+            </a:r>
+            <a:r>
+              <a:rPr lang="en-US" dirty="0"/>
+              <a:t> </a:t>
+            </a:r>
+            <a:r>
+              <a:rPr lang="en-US" dirty="0" err="1"/>
+              <a:t>nella</a:t>
+            </a:r>
+            <a:r>
+              <a:rPr lang="en-US" dirty="0"/>
+              <a:t> </a:t>
+            </a:r>
+            <a:r>
+              <a:rPr lang="en-US" dirty="0" err="1"/>
+              <a:t>struttura</a:t>
+            </a:r>
+            <a:r>
+              <a:rPr lang="en-US" dirty="0"/>
+              <a:t> a </a:t>
+            </a:r>
+            <a:r>
+              <a:rPr lang="en-US" dirty="0" err="1"/>
+              <a:t>bassa</a:t>
+            </a:r>
+            <a:r>
+              <a:rPr lang="en-US" dirty="0"/>
+              <a:t> dimensionalità </a:t>
+            </a:r>
+            <a:r>
+              <a:rPr lang="en-US" dirty="0" err="1"/>
+              <a:t>avrò</a:t>
+            </a:r>
+            <a:r>
+              <a:rPr lang="en-US" dirty="0"/>
+              <a:t> un alto peso per lo </a:t>
+            </a:r>
+            <a:r>
+              <a:rPr lang="en-US" dirty="0" err="1"/>
+              <a:t>stesso</a:t>
+            </a:r>
+            <a:r>
+              <a:rPr lang="en-US" dirty="0"/>
+              <a:t> arco.</a:t>
+            </a:r>
+          </a:p>
+          <a:p>
+            <a:pPr marL="0" marR="0" lvl="0" indent="0" algn="l" defTabSz="914400" rtl="0" eaLnBrk="1" fontAlgn="auto" latinLnBrk="0" hangingPunct="1">
+              <a:lnSpc>
+                <a:spcPct val="100000"/>
+              </a:lnSpc>
+              <a:spcBef>
+                <a:spcPts val="0"/>
+              </a:spcBef>
+              <a:spcAft>
+                <a:spcPts val="0"/>
+              </a:spcAft>
+              <a:buClrTx/>
+              <a:buSzTx/>
+              <a:buFontTx/>
+              <a:buNone/>
+              <a:tabLst/>
+              <a:defRPr/>
+            </a:pPr>
+            <a:r>
+              <a:rPr lang="en-US" dirty="0"/>
+              <a:t>Il secondo </a:t>
+            </a:r>
+            <a:r>
+              <a:rPr lang="en-US" dirty="0" err="1"/>
+              <a:t>termine</a:t>
+            </a:r>
+            <a:r>
+              <a:rPr lang="en-US" dirty="0"/>
+              <a:t> </a:t>
+            </a:r>
+            <a:r>
+              <a:rPr lang="en-US" dirty="0" err="1"/>
+              <a:t>rappresenta</a:t>
+            </a:r>
+            <a:r>
+              <a:rPr lang="en-US" dirty="0"/>
+              <a:t> la forza </a:t>
+            </a:r>
+            <a:r>
+              <a:rPr lang="en-US" noProof="1"/>
+              <a:t>repulsiva quando il peso ad alta dimensionalità è basso. Questo termine verrà minimizzato quando il peso nella struttura a bassa dimensionalità sarà anche lui basso.</a:t>
+            </a:r>
             <a:endParaRPr lang="it-IT" dirty="0"/>
           </a:p>
         </p:txBody>
@@ -4914,7 +4995,7 @@
           <a:p>
             <a:fld id="{2E6DE88F-1F85-4A27-9D34-D74A50E7B0DA}" type="slidenum">
               <a:rPr lang="en-US" smtClean="0"/>
-              <a:t>16</a:t>
+              <a:t>15</a:t>
             </a:fld>
             <a:endParaRPr lang="en-US" dirty="0"/>
           </a:p>
@@ -4923,7 +5004,7 @@
     </p:spTree>
     <p:extLst>
       <p:ext uri="{BB962C8B-B14F-4D97-AF65-F5344CB8AC3E}">
-        <p14:creationId xmlns:p14="http://schemas.microsoft.com/office/powerpoint/2010/main" val="558795199"/>
+        <p14:creationId xmlns:p14="http://schemas.microsoft.com/office/powerpoint/2010/main" val="2279403576"/>
       </p:ext>
     </p:extLst>
   </p:cSld>
@@ -4977,6 +5058,38 @@
           <a:bodyPr/>
           <a:lstStyle/>
           <a:p>
+            <a:r>
+              <a:rPr lang="it-IT" dirty="0"/>
+              <a:t>Consideriamo X sia la distanza fra i punti ad alta dimensionalità e Y sia la distanza fra i punti a bassa dimensionalità.</a:t>
+            </a:r>
+          </a:p>
+          <a:p>
+            <a:r>
+              <a:rPr lang="it-IT" dirty="0"/>
+              <a:t>Il primo termine è vicino a zero sia per valori alti che bassi di X. Va a 0 per X piccole dato che l'esponente si avvicina a 1 e log(1)=0. Per X grandi va comunque a 0 dato che P(X) = e^-X^2 va a 0 più velocemente di quanto il logaritmo va verso -infinito.</a:t>
+            </a:r>
+          </a:p>
+          <a:p>
+            <a:r>
+              <a:rPr lang="it-IT" dirty="0"/>
+              <a:t>Secondo termine: se la distanza fra i punti ad alta dimensionalità è piccola, l'esponenziale va a 1, quindi con valori grandi di Y ci sarà una grossa penalità quindi </a:t>
+            </a:r>
+            <a:r>
+              <a:rPr lang="it-IT" dirty="0" err="1"/>
+              <a:t>tSNE</a:t>
+            </a:r>
+            <a:r>
+              <a:rPr lang="it-IT" dirty="0"/>
+              <a:t> cerca di ridurre Y se X è piccola per ridurre la penalità.</a:t>
+            </a:r>
+          </a:p>
+          <a:p>
+            <a:r>
+              <a:rPr lang="it-IT" dirty="0"/>
+              <a:t>Con valori grandi di X, Y può essere qualsiasi valore fra 0 e infinito dato che l'esponenziale va a zero e vince sempre sul logaritmo. Per colpa di questo, punti lontani nel grafo ad alta dimensionalità possono finire vicini nella rappresentazione a bassa dimensionalità senza che vi sia una penalità come nel caso contrario.</a:t>
+            </a:r>
+          </a:p>
+          <a:p>
             <a:endParaRPr lang="it-IT" dirty="0"/>
           </a:p>
         </p:txBody>
@@ -4998,6 +5111,90 @@
           <a:p>
             <a:fld id="{2E6DE88F-1F85-4A27-9D34-D74A50E7B0DA}" type="slidenum">
               <a:rPr lang="en-US" smtClean="0"/>
+              <a:t>16</a:t>
+            </a:fld>
+            <a:endParaRPr lang="en-US" dirty="0"/>
+          </a:p>
+        </p:txBody>
+      </p:sp>
+    </p:spTree>
+    <p:extLst>
+      <p:ext uri="{BB962C8B-B14F-4D97-AF65-F5344CB8AC3E}">
+        <p14:creationId xmlns:p14="http://schemas.microsoft.com/office/powerpoint/2010/main" val="558795199"/>
+      </p:ext>
+    </p:extLst>
+  </p:cSld>
+  <p:clrMapOvr>
+    <a:masterClrMapping/>
+  </p:clrMapOvr>
+</p:notes>
+</file>
+
+<file path=ppt/notesSlides/notesSlide16.xml><?xml version="1.0" encoding="utf-8"?>
+<p:notes xmlns:a="http://schemas.openxmlformats.org/drawingml/2006/main" xmlns:r="http://schemas.openxmlformats.org/officeDocument/2006/relationships" xmlns:p="http://schemas.openxmlformats.org/presentationml/2006/main">
+  <p:cSld>
+    <p:spTree>
+      <p:nvGrpSpPr>
+        <p:cNvPr id="1" name=""/>
+        <p:cNvGrpSpPr/>
+        <p:nvPr/>
+      </p:nvGrpSpPr>
+      <p:grpSpPr>
+        <a:xfrm>
+          <a:off x="0" y="0"/>
+          <a:ext cx="0" cy="0"/>
+          <a:chOff x="0" y="0"/>
+          <a:chExt cx="0" cy="0"/>
+        </a:xfrm>
+      </p:grpSpPr>
+      <p:sp>
+        <p:nvSpPr>
+          <p:cNvPr id="2" name="Slide Image Placeholder 1"/>
+          <p:cNvSpPr>
+            <a:spLocks noGrp="1" noRot="1" noChangeAspect="1"/>
+          </p:cNvSpPr>
+          <p:nvPr>
+            <p:ph type="sldImg"/>
+          </p:nvPr>
+        </p:nvSpPr>
+        <p:spPr/>
+      </p:sp>
+      <p:sp>
+        <p:nvSpPr>
+          <p:cNvPr id="3" name="Notes Placeholder 2"/>
+          <p:cNvSpPr>
+            <a:spLocks noGrp="1"/>
+          </p:cNvSpPr>
+          <p:nvPr>
+            <p:ph type="body" idx="1"/>
+          </p:nvPr>
+        </p:nvSpPr>
+        <p:spPr/>
+        <p:txBody>
+          <a:bodyPr/>
+          <a:lstStyle/>
+          <a:p>
+            <a:endParaRPr lang="it-IT" dirty="0"/>
+          </a:p>
+        </p:txBody>
+      </p:sp>
+      <p:sp>
+        <p:nvSpPr>
+          <p:cNvPr id="4" name="Slide Number Placeholder 3"/>
+          <p:cNvSpPr>
+            <a:spLocks noGrp="1"/>
+          </p:cNvSpPr>
+          <p:nvPr>
+            <p:ph type="sldNum" sz="quarter" idx="5"/>
+          </p:nvPr>
+        </p:nvSpPr>
+        <p:spPr/>
+        <p:txBody>
+          <a:bodyPr/>
+          <a:lstStyle/>
+          <a:p>
+            <a:fld id="{2E6DE88F-1F85-4A27-9D34-D74A50E7B0DA}" type="slidenum">
+              <a:rPr lang="en-US" smtClean="0"/>
               <a:t>18</a:t>
             </a:fld>
             <a:endParaRPr lang="en-US" dirty="0"/>
@@ -5017,7 +5214,7 @@
 </p:notes>
 </file>
 
-<file path=ppt/notesSlides/notesSlide16.xml><?xml version="1.0" encoding="utf-8"?>
+<file path=ppt/notesSlides/notesSlide17.xml><?xml version="1.0" encoding="utf-8"?>
 <p:notes xmlns:a="http://schemas.openxmlformats.org/drawingml/2006/main" xmlns:r="http://schemas.openxmlformats.org/officeDocument/2006/relationships" xmlns:p="http://schemas.openxmlformats.org/presentationml/2006/main">
   <p:cSld>
     <p:spTree>
@@ -5145,82 +5342,6 @@
           <a:bodyPr/>
           <a:lstStyle/>
           <a:p>
-            <a:pPr marL="0" marR="0" lvl="0" indent="0" algn="l" defTabSz="914400" rtl="0" eaLnBrk="1" fontAlgn="auto" latinLnBrk="0" hangingPunct="1">
-              <a:lnSpc>
-                <a:spcPct val="100000"/>
-              </a:lnSpc>
-              <a:spcBef>
-                <a:spcPts val="0"/>
-              </a:spcBef>
-              <a:spcAft>
-                <a:spcPts val="0"/>
-              </a:spcAft>
-              <a:buClrTx/>
-              <a:buSzTx/>
-              <a:buFontTx/>
-              <a:buNone/>
-              <a:tabLst/>
-              <a:defRPr/>
-            </a:pPr>
-            <a:r>
-              <a:rPr lang="it-IT" dirty="0"/>
-              <a:t>Simplesso </a:t>
-            </a:r>
-            <a:r>
-              <a:rPr lang="en-US" dirty="0"/>
-              <a:t>= </a:t>
-            </a:r>
-            <a:r>
-              <a:rPr lang="it-IT" sz="1800" dirty="0">
-                <a:effectLst/>
-                <a:latin typeface="Segoe UI" panose="020B0502040204020203" pitchFamily="34" charset="0"/>
-              </a:rPr>
-              <a:t>Oggetto k-dimensionale formato unendo k+1 punti</a:t>
-            </a:r>
-            <a:endParaRPr lang="it-IT" sz="1800" dirty="0">
-              <a:effectLst/>
-              <a:latin typeface="Arial" panose="020B0604020202020204" pitchFamily="34" charset="0"/>
-            </a:endParaRPr>
-          </a:p>
-          <a:p>
-            <a:pPr marL="0" marR="0" lvl="0" indent="0" algn="l" defTabSz="914400" rtl="0" eaLnBrk="1" fontAlgn="auto" latinLnBrk="0" hangingPunct="1">
-              <a:lnSpc>
-                <a:spcPct val="100000"/>
-              </a:lnSpc>
-              <a:spcBef>
-                <a:spcPts val="0"/>
-              </a:spcBef>
-              <a:spcAft>
-                <a:spcPts val="0"/>
-              </a:spcAft>
-              <a:buClrTx/>
-              <a:buSzTx/>
-              <a:buFontTx/>
-              <a:buNone/>
-              <a:tabLst/>
-              <a:defRPr/>
-            </a:pPr>
-            <a:r>
-              <a:rPr lang="it-IT" dirty="0" err="1"/>
-              <a:t>Coomologia</a:t>
-            </a:r>
-            <a:r>
-              <a:rPr lang="it-IT" dirty="0"/>
-              <a:t> di Cech = </a:t>
-            </a:r>
-            <a:r>
-              <a:rPr lang="it-IT" sz="1800" dirty="0">
-                <a:effectLst/>
-                <a:latin typeface="Segoe UI" panose="020B0502040204020203" pitchFamily="34" charset="0"/>
-              </a:rPr>
-              <a:t>Metodo per rappresentare una topologia in modo combinatorio, al posto di lavorare in uno spazio continuo lavoriamo con degli insiemi. Costruendo la topologia in questo modo abbiamo delle garanzie sul fatto che rimanga ben rappresentata.</a:t>
-            </a:r>
-            <a:endParaRPr lang="it-IT" sz="1800" dirty="0">
-              <a:effectLst/>
-              <a:latin typeface="Arial" panose="020B0604020202020204" pitchFamily="34" charset="0"/>
-            </a:endParaRPr>
-          </a:p>
-          <a:p>
             <a:endParaRPr lang="it-IT" dirty="0"/>
           </a:p>
         </p:txBody>
@@ -5242,7 +5363,7 @@
           <a:p>
             <a:fld id="{2E6DE88F-1F85-4A27-9D34-D74A50E7B0DA}" type="slidenum">
               <a:rPr lang="en-US" smtClean="0"/>
-              <a:t>4</a:t>
+              <a:t>3</a:t>
             </a:fld>
             <a:endParaRPr lang="en-US" dirty="0"/>
           </a:p>
@@ -5251,7 +5372,7 @@
     </p:spTree>
     <p:extLst>
       <p:ext uri="{BB962C8B-B14F-4D97-AF65-F5344CB8AC3E}">
-        <p14:creationId xmlns:p14="http://schemas.microsoft.com/office/powerpoint/2010/main" val="1458914622"/>
+        <p14:creationId xmlns:p14="http://schemas.microsoft.com/office/powerpoint/2010/main" val="4236069999"/>
       </p:ext>
     </p:extLst>
   </p:cSld>
@@ -5323,11 +5444,57 @@
               <a:defRPr/>
             </a:pPr>
             <a:r>
+              <a:rPr lang="it-IT" dirty="0"/>
+              <a:t>Simplesso </a:t>
+            </a:r>
+            <a:r>
+              <a:rPr lang="en-US" dirty="0"/>
+              <a:t>= </a:t>
+            </a:r>
+            <a:r>
               <a:rPr lang="it-IT" sz="1800" dirty="0">
                 <a:effectLst/>
                 <a:latin typeface="Segoe UI" panose="020B0502040204020203" pitchFamily="34" charset="0"/>
               </a:rPr>
-              <a:t>Questi sono i punti del nostro dataset, dato che prima abbiamo detto che i punti equivalgono a dei simplessi-0, questo potrebbe essere considerato un insieme di simplessi-0</a:t>
+              <a:t>Oggetto k-dimensionale formato unendo k+1 punti</a:t>
+            </a:r>
+            <a:endParaRPr lang="it-IT" sz="1800" dirty="0">
+              <a:effectLst/>
+              <a:latin typeface="Arial" panose="020B0604020202020204" pitchFamily="34" charset="0"/>
+            </a:endParaRPr>
+          </a:p>
+          <a:p>
+            <a:pPr marL="0" marR="0" lvl="0" indent="0" algn="l" defTabSz="914400" rtl="0" eaLnBrk="1" fontAlgn="auto" latinLnBrk="0" hangingPunct="1">
+              <a:lnSpc>
+                <a:spcPct val="100000"/>
+              </a:lnSpc>
+              <a:spcBef>
+                <a:spcPts val="0"/>
+              </a:spcBef>
+              <a:spcAft>
+                <a:spcPts val="0"/>
+              </a:spcAft>
+              <a:buClrTx/>
+              <a:buSzTx/>
+              <a:buFontTx/>
+              <a:buNone/>
+              <a:tabLst/>
+              <a:defRPr/>
+            </a:pPr>
+            <a:r>
+              <a:rPr lang="it-IT" dirty="0" err="1"/>
+              <a:t>Coomologia</a:t>
+            </a:r>
+            <a:r>
+              <a:rPr lang="it-IT" dirty="0"/>
+              <a:t> di Cech = </a:t>
+            </a:r>
+            <a:r>
+              <a:rPr lang="it-IT" sz="1800" dirty="0">
+                <a:effectLst/>
+                <a:latin typeface="Segoe UI" panose="020B0502040204020203" pitchFamily="34" charset="0"/>
+              </a:rPr>
+              <a:t>Metodo per rappresentare una topologia in modo combinatorio, al posto di lavorare in uno spazio continuo lavoriamo con degli insiemi. Costruendo la topologia in questo modo abbiamo delle garanzie sul fatto che rimanga ben rappresentata.</a:t>
             </a:r>
             <a:endParaRPr lang="it-IT" sz="1800" dirty="0">
               <a:effectLst/>
@@ -5356,7 +5523,7 @@
           <a:p>
             <a:fld id="{2E6DE88F-1F85-4A27-9D34-D74A50E7B0DA}" type="slidenum">
               <a:rPr lang="en-US" smtClean="0"/>
-              <a:t>5</a:t>
+              <a:t>4</a:t>
             </a:fld>
             <a:endParaRPr lang="en-US" dirty="0"/>
           </a:p>
@@ -5365,7 +5532,7 @@
     </p:spTree>
     <p:extLst>
       <p:ext uri="{BB962C8B-B14F-4D97-AF65-F5344CB8AC3E}">
-        <p14:creationId xmlns:p14="http://schemas.microsoft.com/office/powerpoint/2010/main" val="262943223"/>
+        <p14:creationId xmlns:p14="http://schemas.microsoft.com/office/powerpoint/2010/main" val="1458914622"/>
       </p:ext>
     </p:extLst>
   </p:cSld>
@@ -5441,7 +5608,7 @@
                 <a:effectLst/>
                 <a:latin typeface="Segoe UI" panose="020B0502040204020203" pitchFamily="34" charset="0"/>
               </a:rPr>
-              <a:t>Possiamo usare ognuno di questi punti come centro di una circonferenza di raggio r.</a:t>
+              <a:t>Questi sono i punti del nostro dataset, dato che prima abbiamo detto che i punti equivalgono a dei simplessi-0, questo potrebbe essere considerato un insieme di simplessi-0</a:t>
             </a:r>
             <a:endParaRPr lang="it-IT" sz="1800" dirty="0">
               <a:effectLst/>
@@ -5470,7 +5637,7 @@
           <a:p>
             <a:fld id="{2E6DE88F-1F85-4A27-9D34-D74A50E7B0DA}" type="slidenum">
               <a:rPr lang="en-US" smtClean="0"/>
-              <a:t>6</a:t>
+              <a:t>5</a:t>
             </a:fld>
             <a:endParaRPr lang="en-US" dirty="0"/>
           </a:p>
@@ -5479,7 +5646,7 @@
     </p:spTree>
     <p:extLst>
       <p:ext uri="{BB962C8B-B14F-4D97-AF65-F5344CB8AC3E}">
-        <p14:creationId xmlns:p14="http://schemas.microsoft.com/office/powerpoint/2010/main" val="1131012255"/>
+        <p14:creationId xmlns:p14="http://schemas.microsoft.com/office/powerpoint/2010/main" val="262943223"/>
       </p:ext>
     </p:extLst>
   </p:cSld>
@@ -5555,79 +5722,7 @@
                 <a:effectLst/>
                 <a:latin typeface="Segoe UI" panose="020B0502040204020203" pitchFamily="34" charset="0"/>
               </a:rPr>
-              <a:t>Verifichiamo dove queste circonferenze si sovrappongono e uniamo i punti. Questo ci permette di costruire degli insiemi di simplessi che formeranno la </a:t>
-            </a:r>
-            <a:r>
-              <a:rPr lang="it-IT" sz="1800" dirty="0" err="1">
-                <a:effectLst/>
-                <a:latin typeface="Segoe UI" panose="020B0502040204020203" pitchFamily="34" charset="0"/>
-              </a:rPr>
-              <a:t>coomologia</a:t>
-            </a:r>
-            <a:r>
-              <a:rPr lang="it-IT" sz="1800" dirty="0">
-                <a:effectLst/>
-                <a:latin typeface="Segoe UI" panose="020B0502040204020203" pitchFamily="34" charset="0"/>
-              </a:rPr>
-              <a:t> di Cech</a:t>
-            </a:r>
-            <a:endParaRPr lang="it-IT" sz="1800" dirty="0">
-              <a:effectLst/>
-              <a:latin typeface="Arial" panose="020B0604020202020204" pitchFamily="34" charset="0"/>
-            </a:endParaRPr>
-          </a:p>
-          <a:p>
-            <a:pPr marL="0" marR="0" lvl="0" indent="0" algn="l" defTabSz="914400" rtl="0" eaLnBrk="1" fontAlgn="auto" latinLnBrk="0" hangingPunct="1">
-              <a:lnSpc>
-                <a:spcPct val="100000"/>
-              </a:lnSpc>
-              <a:spcBef>
-                <a:spcPts val="0"/>
-              </a:spcBef>
-              <a:spcAft>
-                <a:spcPts val="0"/>
-              </a:spcAft>
-              <a:buClrTx/>
-              <a:buSzTx/>
-              <a:buFontTx/>
-              <a:buNone/>
-              <a:tabLst/>
-              <a:defRPr/>
-            </a:pPr>
-            <a:r>
-              <a:rPr lang="it-IT" sz="1800" dirty="0">
-                <a:effectLst/>
-                <a:latin typeface="Segoe UI" panose="020B0502040204020203" pitchFamily="34" charset="0"/>
-              </a:rPr>
-              <a:t>Questo insieme di complessi, anche chiamato complesso simpliciale, grazie a come è stato costruito ci da una garanzia di quanto bene approssima la topologia sottostante grazie al </a:t>
-            </a:r>
-            <a:r>
-              <a:rPr lang="it-IT" sz="1800" dirty="0" err="1">
-                <a:effectLst/>
-                <a:latin typeface="Segoe UI" panose="020B0502040204020203" pitchFamily="34" charset="0"/>
-              </a:rPr>
-              <a:t>Nerve</a:t>
-            </a:r>
-            <a:r>
-              <a:rPr lang="it-IT" sz="1800" dirty="0">
-                <a:effectLst/>
-                <a:latin typeface="Segoe UI" panose="020B0502040204020203" pitchFamily="34" charset="0"/>
-              </a:rPr>
-              <a:t> </a:t>
-            </a:r>
-            <a:r>
-              <a:rPr lang="it-IT" sz="1800" dirty="0" err="1">
-                <a:effectLst/>
-                <a:latin typeface="Segoe UI" panose="020B0502040204020203" pitchFamily="34" charset="0"/>
-              </a:rPr>
-              <a:t>Theorem</a:t>
-            </a:r>
-            <a:r>
-              <a:rPr lang="it-IT" sz="1800" dirty="0">
-                <a:effectLst/>
-                <a:latin typeface="Segoe UI" panose="020B0502040204020203" pitchFamily="34" charset="0"/>
-              </a:rPr>
-              <a:t>.</a:t>
+              <a:t>Possiamo usare ognuno di questi punti come centro di una circonferenza di raggio r.</a:t>
             </a:r>
             <a:endParaRPr lang="it-IT" sz="1800" dirty="0">
               <a:effectLst/>
@@ -5656,7 +5751,7 @@
           <a:p>
             <a:fld id="{2E6DE88F-1F85-4A27-9D34-D74A50E7B0DA}" type="slidenum">
               <a:rPr lang="en-US" smtClean="0"/>
-              <a:t>7</a:t>
+              <a:t>6</a:t>
             </a:fld>
             <a:endParaRPr lang="en-US" dirty="0"/>
           </a:p>
@@ -5665,7 +5760,7 @@
     </p:spTree>
     <p:extLst>
       <p:ext uri="{BB962C8B-B14F-4D97-AF65-F5344CB8AC3E}">
-        <p14:creationId xmlns:p14="http://schemas.microsoft.com/office/powerpoint/2010/main" val="2302900523"/>
+        <p14:creationId xmlns:p14="http://schemas.microsoft.com/office/powerpoint/2010/main" val="1131012255"/>
       </p:ext>
     </p:extLst>
   </p:cSld>
@@ -5741,7 +5836,21 @@
                 <a:effectLst/>
                 <a:latin typeface="Segoe UI" panose="020B0502040204020203" pitchFamily="34" charset="0"/>
               </a:rPr>
-              <a:t>Come si può vedere, avere lo stesso raggio per tutti i punti crea dei problemi nella struttura. Come si può vedere, abbiamo dei punti isolati e dei gruppi separati dal resto</a:t>
+              <a:t>Verifichiamo dove queste circonferenze si sovrappongono e uniamo i punti. Questo ci permette di costruire degli insiemi di simplessi che formeranno la </a:t>
+            </a:r>
+            <a:r>
+              <a:rPr lang="it-IT" sz="1800" dirty="0" err="1">
+                <a:effectLst/>
+                <a:latin typeface="Segoe UI" panose="020B0502040204020203" pitchFamily="34" charset="0"/>
+              </a:rPr>
+              <a:t>coomologia</a:t>
+            </a:r>
+            <a:r>
+              <a:rPr lang="it-IT" sz="1800" dirty="0">
+                <a:effectLst/>
+                <a:latin typeface="Segoe UI" panose="020B0502040204020203" pitchFamily="34" charset="0"/>
+              </a:rPr>
+              <a:t> di Cech</a:t>
             </a:r>
             <a:endParaRPr lang="it-IT" sz="1800" dirty="0">
               <a:effectLst/>
@@ -5771,93 +5880,35 @@
                 <a:effectLst/>
                 <a:latin typeface="Segoe UI" panose="020B0502040204020203" pitchFamily="34" charset="0"/>
               </a:rPr>
-              <a:t>Questo problema potrebbe essere scaricato all'utente dicendo, è l'utente che dovrà occuparsi di scegliere un </a:t>
+              <a:t>Questo insieme di complessi, anche chiamato complesso simpliciale, grazie a come è stato costruito ci da una garanzia di quanto bene approssima la topologia sottostante grazie al </a:t>
             </a:r>
             <a:r>
               <a:rPr lang="it-IT" sz="1800" dirty="0" err="1">
                 <a:effectLst/>
                 <a:latin typeface="Segoe UI" panose="020B0502040204020203" pitchFamily="34" charset="0"/>
               </a:rPr>
-              <a:t>raggo</a:t>
+              <a:t>Nerve</a:t>
             </a:r>
             <a:r>
               <a:rPr lang="it-IT" sz="1800" dirty="0">
                 <a:effectLst/>
                 <a:latin typeface="Segoe UI" panose="020B0502040204020203" pitchFamily="34" charset="0"/>
               </a:rPr>
-              <a:t> corretto in base ai suoi dati. Scegliendo un dato piccolo si avrà un isolamento maggiore, un valore troppo grande invece renderebbe tutto connesso.</a:t>
-            </a:r>
-            <a:endParaRPr lang="it-IT" sz="1800" dirty="0">
-              <a:effectLst/>
-              <a:latin typeface="Arial" panose="020B0604020202020204" pitchFamily="34" charset="0"/>
-            </a:endParaRPr>
-          </a:p>
-          <a:p>
-            <a:pPr marL="0" marR="0" lvl="0" indent="0" algn="l" defTabSz="914400" rtl="0" eaLnBrk="1" fontAlgn="auto" latinLnBrk="0" hangingPunct="1">
-              <a:lnSpc>
-                <a:spcPct val="100000"/>
-              </a:lnSpc>
-              <a:spcBef>
-                <a:spcPts val="0"/>
-              </a:spcBef>
-              <a:spcAft>
-                <a:spcPts val="0"/>
-              </a:spcAft>
-              <a:buClrTx/>
-              <a:buSzTx/>
-              <a:buFontTx/>
-              <a:buNone/>
-              <a:tabLst/>
-              <a:defRPr/>
-            </a:pPr>
+              <a:t> </a:t>
+            </a:r>
+            <a:r>
+              <a:rPr lang="it-IT" sz="1800" dirty="0" err="1">
+                <a:effectLst/>
+                <a:latin typeface="Segoe UI" panose="020B0502040204020203" pitchFamily="34" charset="0"/>
+              </a:rPr>
+              <a:t>Theorem</a:t>
+            </a:r>
             <a:r>
               <a:rPr lang="it-IT" sz="1800" dirty="0">
                 <a:effectLst/>
                 <a:latin typeface="Segoe UI" panose="020B0502040204020203" pitchFamily="34" charset="0"/>
               </a:rPr>
-              <a:t>Questo problema è aumentato anche dalla </a:t>
-            </a:r>
-            <a:r>
-              <a:rPr lang="it-IT" sz="1800" dirty="0" err="1">
-                <a:effectLst/>
-                <a:latin typeface="Segoe UI" panose="020B0502040204020203" pitchFamily="34" charset="0"/>
-              </a:rPr>
-              <a:t>curse</a:t>
-            </a:r>
-            <a:r>
-              <a:rPr lang="it-IT" sz="1800" dirty="0">
-                <a:effectLst/>
-                <a:latin typeface="Segoe UI" panose="020B0502040204020203" pitchFamily="34" charset="0"/>
-              </a:rPr>
-              <a:t> of </a:t>
-            </a:r>
-            <a:r>
-              <a:rPr lang="it-IT" sz="1800" dirty="0" err="1">
-                <a:effectLst/>
-                <a:latin typeface="Segoe UI" panose="020B0502040204020203" pitchFamily="34" charset="0"/>
-              </a:rPr>
-              <a:t>dimensionality</a:t>
-            </a:r>
-            <a:r>
-              <a:rPr lang="it-IT" sz="1800" dirty="0">
-                <a:effectLst/>
-                <a:latin typeface="Segoe UI" panose="020B0502040204020203" pitchFamily="34" charset="0"/>
-              </a:rPr>
-              <a:t>. Dato che stiamo lavorando in uno spazio ad alta dimensionalità, il significato di distanza fra i punti si perde </a:t>
-            </a:r>
-            <a:r>
-              <a:rPr lang="it-IT" sz="1800" dirty="0" err="1">
-                <a:effectLst/>
-                <a:latin typeface="Segoe UI" panose="020B0502040204020203" pitchFamily="34" charset="0"/>
-              </a:rPr>
-              <a:t>perchè</a:t>
-            </a:r>
-            <a:r>
-              <a:rPr lang="it-IT" sz="1800" dirty="0">
-                <a:effectLst/>
-                <a:latin typeface="Segoe UI" panose="020B0502040204020203" pitchFamily="34" charset="0"/>
-              </a:rPr>
-              <a:t> diventano sempre più simili.</a:t>
+              <a:t>.</a:t>
             </a:r>
             <a:endParaRPr lang="it-IT" sz="1800" dirty="0">
               <a:effectLst/>
@@ -5886,7 +5937,7 @@
           <a:p>
             <a:fld id="{2E6DE88F-1F85-4A27-9D34-D74A50E7B0DA}" type="slidenum">
               <a:rPr lang="en-US" smtClean="0"/>
-              <a:t>8</a:t>
+              <a:t>7</a:t>
             </a:fld>
             <a:endParaRPr lang="en-US" dirty="0"/>
           </a:p>
@@ -5895,7 +5946,7 @@
     </p:spTree>
     <p:extLst>
       <p:ext uri="{BB962C8B-B14F-4D97-AF65-F5344CB8AC3E}">
-        <p14:creationId xmlns:p14="http://schemas.microsoft.com/office/powerpoint/2010/main" val="1494289711"/>
+        <p14:creationId xmlns:p14="http://schemas.microsoft.com/office/powerpoint/2010/main" val="2302900523"/>
       </p:ext>
     </p:extLst>
   </p:cSld>
@@ -5971,7 +6022,7 @@
                 <a:effectLst/>
                 <a:latin typeface="Segoe UI" panose="020B0502040204020203" pitchFamily="34" charset="0"/>
               </a:rPr>
-              <a:t>Per risolvere questo problema, UMAP, usa un raggio variabile in base al numero di vicini. Dato che non vogliamo nessun punto isolato, questo ci garantisce che ogni punto sarà in contatto con almeno un vicino.</a:t>
+              <a:t>Come si può vedere, avere lo stesso raggio per tutti i punti crea dei problemi nella struttura. Abbiamo dei punti isolati e dei gruppi separati dal resto</a:t>
             </a:r>
             <a:endParaRPr lang="it-IT" sz="1800" dirty="0">
               <a:effectLst/>
@@ -6001,7 +6052,65 @@
                 <a:effectLst/>
                 <a:latin typeface="Segoe UI" panose="020B0502040204020203" pitchFamily="34" charset="0"/>
               </a:rPr>
-              <a:t>Come si può vedere da questa slide le circonferenze non sono più ben definite come prima, </a:t>
+              <a:t>Questo problema potrebbe essere scaricato all'utente dicendo, è l'utente che dovrà occuparsi di scegliere un raggio corretto in base ai suoi dati. Scegliendo un dato piccolo si avrà un isolamento maggiore, un valore troppo grande invece renderebbe tutto connesso.</a:t>
+            </a:r>
+            <a:endParaRPr lang="it-IT" sz="1800" dirty="0">
+              <a:effectLst/>
+              <a:latin typeface="Arial" panose="020B0604020202020204" pitchFamily="34" charset="0"/>
+            </a:endParaRPr>
+          </a:p>
+          <a:p>
+            <a:pPr marL="0" marR="0" lvl="0" indent="0" algn="l" defTabSz="914400" rtl="0" eaLnBrk="1" fontAlgn="auto" latinLnBrk="0" hangingPunct="1">
+              <a:lnSpc>
+                <a:spcPct val="100000"/>
+              </a:lnSpc>
+              <a:spcBef>
+                <a:spcPts val="0"/>
+              </a:spcBef>
+              <a:spcAft>
+                <a:spcPts val="0"/>
+              </a:spcAft>
+              <a:buClrTx/>
+              <a:buSzTx/>
+              <a:buFontTx/>
+              <a:buNone/>
+              <a:tabLst/>
+              <a:defRPr/>
+            </a:pPr>
+            <a:r>
+              <a:rPr lang="it-IT" sz="1800" dirty="0">
+                <a:effectLst/>
+                <a:latin typeface="Segoe UI" panose="020B0502040204020203" pitchFamily="34" charset="0"/>
+              </a:rPr>
+              <a:t>Questo problema è reso più complicata dalla </a:t>
+            </a:r>
+            <a:r>
+              <a:rPr lang="it-IT" sz="1800" dirty="0" err="1">
+                <a:effectLst/>
+                <a:latin typeface="Segoe UI" panose="020B0502040204020203" pitchFamily="34" charset="0"/>
+              </a:rPr>
+              <a:t>curse</a:t>
+            </a:r>
+            <a:r>
+              <a:rPr lang="it-IT" sz="1800" dirty="0">
+                <a:effectLst/>
+                <a:latin typeface="Segoe UI" panose="020B0502040204020203" pitchFamily="34" charset="0"/>
+              </a:rPr>
+              <a:t> of </a:t>
+            </a:r>
+            <a:r>
+              <a:rPr lang="it-IT" sz="1800" dirty="0" err="1">
+                <a:effectLst/>
+                <a:latin typeface="Segoe UI" panose="020B0502040204020203" pitchFamily="34" charset="0"/>
+              </a:rPr>
+              <a:t>dimensionality</a:t>
+            </a:r>
+            <a:r>
+              <a:rPr lang="it-IT" sz="1800" dirty="0">
+                <a:effectLst/>
+                <a:latin typeface="Segoe UI" panose="020B0502040204020203" pitchFamily="34" charset="0"/>
+              </a:rPr>
+              <a:t>. Dato che stiamo lavorando in uno spazio ad alta dimensionalità, il significato di distanza fra i punti si perde </a:t>
             </a:r>
             <a:r>
               <a:rPr lang="it-IT" sz="1800" dirty="0" err="1">
@@ -6015,7 +6124,7 @@
                 <a:effectLst/>
                 <a:latin typeface="Segoe UI" panose="020B0502040204020203" pitchFamily="34" charset="0"/>
               </a:rPr>
-              <a:t> ora sono considerate come delle percentuali. Più un punto x è vicino al punto y, più è probabile che l'arco che li collega esista.</a:t>
+              <a:t> diventano sempre più simili.</a:t>
             </a:r>
             <a:endParaRPr lang="it-IT" sz="1800" dirty="0">
               <a:effectLst/>
@@ -6044,7 +6153,7 @@
           <a:p>
             <a:fld id="{2E6DE88F-1F85-4A27-9D34-D74A50E7B0DA}" type="slidenum">
               <a:rPr lang="en-US" smtClean="0"/>
-              <a:t>9</a:t>
+              <a:t>8</a:t>
             </a:fld>
             <a:endParaRPr lang="en-US" dirty="0"/>
           </a:p>
@@ -6053,7 +6162,7 @@
     </p:spTree>
     <p:extLst>
       <p:ext uri="{BB962C8B-B14F-4D97-AF65-F5344CB8AC3E}">
-        <p14:creationId xmlns:p14="http://schemas.microsoft.com/office/powerpoint/2010/main" val="4146691286"/>
+        <p14:creationId xmlns:p14="http://schemas.microsoft.com/office/powerpoint/2010/main" val="1494289711"/>
       </p:ext>
     </p:extLst>
   </p:cSld>
@@ -6129,7 +6238,7 @@
                 <a:effectLst/>
                 <a:latin typeface="Segoe UI" panose="020B0502040204020203" pitchFamily="34" charset="0"/>
               </a:rPr>
-              <a:t>Arrivati ad avere queste circonferenza possiamo rifare lo stesso procedimento che abbiamo fatto con le circonferenze di raggio fisso: colleghiamo ogni punto le cui circonferenze si sovrappongono.</a:t>
+              <a:t>Per risolvere questo problema, UMAP, usa un raggio variabile in base al numero di vicini. Dato che non vogliamo nessun punto isolato, questo ci garantisce che ogni punto sarà in contatto con almeno un vicino.</a:t>
             </a:r>
             <a:endParaRPr lang="it-IT" sz="1800" dirty="0">
               <a:effectLst/>
@@ -6137,38 +6246,43 @@
             </a:endParaRPr>
           </a:p>
           <a:p>
+            <a:pPr marL="0" marR="0" lvl="0" indent="0" algn="l" defTabSz="914400" rtl="0" eaLnBrk="1" fontAlgn="auto" latinLnBrk="0" hangingPunct="1">
+              <a:lnSpc>
+                <a:spcPct val="100000"/>
+              </a:lnSpc>
+              <a:spcBef>
+                <a:spcPts val="0"/>
+              </a:spcBef>
+              <a:spcAft>
+                <a:spcPts val="0"/>
+              </a:spcAft>
+              <a:buClrTx/>
+              <a:buSzTx/>
+              <a:buFontTx/>
+              <a:buNone/>
+              <a:tabLst/>
+              <a:defRPr/>
+            </a:pPr>
             <a:r>
               <a:rPr lang="it-IT" sz="1800" dirty="0">
                 <a:effectLst/>
                 <a:latin typeface="Segoe UI" panose="020B0502040204020203" pitchFamily="34" charset="0"/>
               </a:rPr>
-              <a:t>Come possiamo notare ora abbiamo un nuovo problema, dato che ogni punto ha un suo raggio e quindi una sua nozione di distanza. Essa potrebbe essere diversa da quella dei vicini e questo porta ad avere raggi doppi fra la stessa coppia di punti. </a:t>
-            </a:r>
-            <a:endParaRPr lang="it-IT" sz="1800" dirty="0">
-              <a:effectLst/>
-              <a:latin typeface="Arial" panose="020B0604020202020204" pitchFamily="34" charset="0"/>
-            </a:endParaRPr>
-          </a:p>
-          <a:p>
+              <a:t>Come si può vedere da questa slide le circonferenze non sono più ben definite come prima, </a:t>
+            </a:r>
+            <a:r>
+              <a:rPr lang="it-IT" sz="1800" dirty="0" err="1">
+                <a:effectLst/>
+                <a:latin typeface="Segoe UI" panose="020B0502040204020203" pitchFamily="34" charset="0"/>
+              </a:rPr>
+              <a:t>perchè</a:t>
+            </a:r>
             <a:r>
               <a:rPr lang="it-IT" sz="1800" dirty="0">
                 <a:effectLst/>
                 <a:latin typeface="Segoe UI" panose="020B0502040204020203" pitchFamily="34" charset="0"/>
               </a:rPr>
-              <a:t>Per risolvere dato che la circonferenza precedente era una probabilità, consideriamo che ogni arco abbia un peso che indica la probabilità della sua esistenza. </a:t>
-            </a:r>
-            <a:endParaRPr lang="it-IT" sz="1800" dirty="0">
-              <a:effectLst/>
-              <a:latin typeface="Arial" panose="020B0604020202020204" pitchFamily="34" charset="0"/>
-            </a:endParaRPr>
-          </a:p>
-          <a:p>
-            <a:r>
-              <a:rPr lang="it-IT" sz="1800" dirty="0">
-                <a:effectLst/>
-                <a:latin typeface="Segoe UI" panose="020B0502040204020203" pitchFamily="34" charset="0"/>
-              </a:rPr>
-              <a:t>In questo modo possiamo unire le due probabilità calcolandone la probabilità che almeno uno dei due esista.</a:t>
+              <a:t> ora sono considerate come delle percentuali. Più un punto x è vicino al punto y, più è probabile che l'arco che li collega esista.</a:t>
             </a:r>
             <a:endParaRPr lang="it-IT" sz="1800" dirty="0">
               <a:effectLst/>
@@ -6197,7 +6311,7 @@
           <a:p>
             <a:fld id="{2E6DE88F-1F85-4A27-9D34-D74A50E7B0DA}" type="slidenum">
               <a:rPr lang="en-US" smtClean="0"/>
-              <a:t>10</a:t>
+              <a:t>9</a:t>
             </a:fld>
             <a:endParaRPr lang="en-US" dirty="0"/>
           </a:p>
@@ -6206,7 +6320,7 @@
     </p:spTree>
     <p:extLst>
       <p:ext uri="{BB962C8B-B14F-4D97-AF65-F5344CB8AC3E}">
-        <p14:creationId xmlns:p14="http://schemas.microsoft.com/office/powerpoint/2010/main" val="1359898815"/>
+        <p14:creationId xmlns:p14="http://schemas.microsoft.com/office/powerpoint/2010/main" val="4146691286"/>
       </p:ext>
     </p:extLst>
   </p:cSld>
@@ -6260,60 +6374,76 @@
           <a:bodyPr/>
           <a:lstStyle/>
           <a:p>
-            <a:r>
-              <a:rPr lang="en-US" dirty="0" err="1"/>
-              <a:t>Arrivati</a:t>
-            </a:r>
-            <a:r>
-              <a:rPr lang="en-US" dirty="0"/>
-              <a:t> a </a:t>
-            </a:r>
-            <a:r>
-              <a:rPr lang="en-US" dirty="0" err="1"/>
-              <a:t>questo</a:t>
-            </a:r>
-            <a:r>
-              <a:rPr lang="en-US" dirty="0"/>
-              <a:t> punto </a:t>
-            </a:r>
-            <a:r>
-              <a:rPr lang="en-US" dirty="0" err="1"/>
-              <a:t>abbiamo</a:t>
-            </a:r>
-            <a:r>
-              <a:rPr lang="en-US" dirty="0"/>
-              <a:t> un </a:t>
-            </a:r>
-            <a:r>
-              <a:rPr lang="en-US" dirty="0" err="1"/>
-              <a:t>grafo</a:t>
-            </a:r>
-            <a:r>
-              <a:rPr lang="en-US" dirty="0"/>
-              <a:t> ad </a:t>
-            </a:r>
-            <a:r>
-              <a:rPr lang="en-US" dirty="0" err="1"/>
-              <a:t>alta</a:t>
-            </a:r>
-            <a:r>
-              <a:rPr lang="en-US" dirty="0"/>
-              <a:t> </a:t>
-            </a:r>
-            <a:r>
-              <a:rPr lang="en-US" dirty="0" err="1"/>
-              <a:t>dimensionalit</a:t>
-            </a:r>
-            <a:r>
-              <a:rPr lang="it-IT" dirty="0"/>
-              <a:t>à, che grazie alle garanzie della teoria sottostante, ci garantisce di essere sicuri sia una buona approssimazione della topologia.</a:t>
-            </a:r>
-          </a:p>
-          <a:p>
-            <a:r>
-              <a:rPr lang="it-IT" dirty="0"/>
-              <a:t>Come si può notare qui non abbiamo più i simplessi di grado maggiore al primo </a:t>
-            </a:r>
+            <a:pPr marL="0" marR="0" lvl="0" indent="0" algn="l" defTabSz="914400" rtl="0" eaLnBrk="1" fontAlgn="auto" latinLnBrk="0" hangingPunct="1">
+              <a:lnSpc>
+                <a:spcPct val="100000"/>
+              </a:lnSpc>
+              <a:spcBef>
+                <a:spcPts val="0"/>
+              </a:spcBef>
+              <a:spcAft>
+                <a:spcPts val="0"/>
+              </a:spcAft>
+              <a:buClrTx/>
+              <a:buSzTx/>
+              <a:buFontTx/>
+              <a:buNone/>
+              <a:tabLst/>
+              <a:defRPr/>
+            </a:pPr>
+            <a:r>
+              <a:rPr lang="it-IT" sz="1800" dirty="0">
+                <a:effectLst/>
+                <a:latin typeface="Segoe UI" panose="020B0502040204020203" pitchFamily="34" charset="0"/>
+              </a:rPr>
+              <a:t>Arrivati ad avere queste circonferenza possiamo rifare lo stesso procedimento che abbiamo fatto con le circonferenze di raggio fisso: colleghiamo ogni punto le cui circonferenze si sovrappongono.</a:t>
+            </a:r>
+            <a:endParaRPr lang="it-IT" sz="1800" dirty="0">
+              <a:effectLst/>
+              <a:latin typeface="Arial" panose="020B0604020202020204" pitchFamily="34" charset="0"/>
+            </a:endParaRPr>
+          </a:p>
+          <a:p>
+            <a:r>
+              <a:rPr lang="it-IT" sz="1800" dirty="0">
+                <a:effectLst/>
+                <a:latin typeface="Segoe UI" panose="020B0502040204020203" pitchFamily="34" charset="0"/>
+              </a:rPr>
+              <a:t>Come possiamo notare ora abbiamo un nuovo problema, dato che ogni punto ha un suo raggio e quindi una sua nozione di distanza. Essa potrebbe essere diversa da quella dei vicini e questo porta ad avere raggi doppi fra la stessa coppia di punti. </a:t>
+            </a:r>
+            <a:endParaRPr lang="it-IT" sz="1800" dirty="0">
+              <a:effectLst/>
+              <a:latin typeface="Arial" panose="020B0604020202020204" pitchFamily="34" charset="0"/>
+            </a:endParaRPr>
+          </a:p>
+          <a:p>
+            <a:r>
+              <a:rPr lang="it-IT" sz="1800" dirty="0">
+                <a:effectLst/>
+                <a:latin typeface="Segoe UI" panose="020B0502040204020203" pitchFamily="34" charset="0"/>
+              </a:rPr>
+              <a:t>Per risolvere, dato che la circonferenza era una probabilità, consideriamo che ogni arco abbia un peso che indica la probabilità della sua esistenza. </a:t>
+            </a:r>
+            <a:endParaRPr lang="it-IT" sz="1800" dirty="0">
+              <a:effectLst/>
+              <a:latin typeface="Arial" panose="020B0604020202020204" pitchFamily="34" charset="0"/>
+            </a:endParaRPr>
+          </a:p>
+          <a:p>
+            <a:r>
+              <a:rPr lang="it-IT" sz="1800" dirty="0">
+                <a:effectLst/>
+                <a:latin typeface="Segoe UI" panose="020B0502040204020203" pitchFamily="34" charset="0"/>
+              </a:rPr>
+              <a:t>In questo modo possiamo unire le due probabilità calcolandone la probabilità che almeno uno dei due esista.</a:t>
+            </a:r>
+            <a:endParaRPr lang="it-IT" sz="1800" dirty="0">
+              <a:effectLst/>
+              <a:latin typeface="Arial" panose="020B0604020202020204" pitchFamily="34" charset="0"/>
+            </a:endParaRPr>
+          </a:p>
+          <a:p>
+            <a:endParaRPr lang="it-IT" dirty="0"/>
           </a:p>
         </p:txBody>
       </p:sp>
@@ -6334,7 +6464,7 @@
           <a:p>
             <a:fld id="{2E6DE88F-1F85-4A27-9D34-D74A50E7B0DA}" type="slidenum">
               <a:rPr lang="en-US" smtClean="0"/>
-              <a:t>11</a:t>
+              <a:t>10</a:t>
             </a:fld>
             <a:endParaRPr lang="en-US" dirty="0"/>
           </a:p>
@@ -6343,7 +6473,7 @@
     </p:spTree>
     <p:extLst>
       <p:ext uri="{BB962C8B-B14F-4D97-AF65-F5344CB8AC3E}">
-        <p14:creationId xmlns:p14="http://schemas.microsoft.com/office/powerpoint/2010/main" val="1686818726"/>
+        <p14:creationId xmlns:p14="http://schemas.microsoft.com/office/powerpoint/2010/main" val="1359898815"/>
       </p:ext>
     </p:extLst>
   </p:cSld>
@@ -6502,7 +6632,7 @@
           <a:p>
             <a:fld id="{60BD2A46-065E-4C6F-842C-064F55942E69}" type="datetime1">
               <a:rPr lang="en-US" smtClean="0"/>
-              <a:t>5/14/2021</a:t>
+              <a:t>5/19/2021</a:t>
             </a:fld>
             <a:endParaRPr lang="en-US" dirty="0"/>
           </a:p>
@@ -6703,7 +6833,7 @@
           <a:p>
             <a:fld id="{2976B3B4-C22F-4487-B68B-929280E59469}" type="datetime1">
               <a:rPr lang="en-US" smtClean="0"/>
-              <a:t>5/14/2021</a:t>
+              <a:t>5/19/2021</a:t>
             </a:fld>
             <a:endParaRPr lang="en-US" dirty="0"/>
           </a:p>
@@ -6913,7 +7043,7 @@
           <a:p>
             <a:fld id="{BF1F001F-F31C-41A9-9088-6D883EAAAAB2}" type="datetime1">
               <a:rPr lang="en-US" smtClean="0"/>
-              <a:t>5/14/2021</a:t>
+              <a:t>5/19/2021</a:t>
             </a:fld>
             <a:endParaRPr lang="en-US" dirty="0"/>
           </a:p>
@@ -7026,7 +7156,7 @@
           <a:p>
             <a:fld id="{75019B29-A095-40CC-8D78-E25CFBAE68BC}" type="datetime1">
               <a:rPr lang="en-US" smtClean="0"/>
-              <a:t>5/14/2021</a:t>
+              <a:t>5/19/2021</a:t>
             </a:fld>
             <a:endParaRPr lang="en-US" dirty="0"/>
           </a:p>
@@ -7290,7 +7420,7 @@
           <a:p>
             <a:fld id="{10195A8C-C7F7-493C-98CE-28C116BE4B4B}" type="datetime1">
               <a:rPr lang="it-IT" smtClean="0"/>
-              <a:t>14/05/2021</a:t>
+              <a:t>19/05/2021</a:t>
             </a:fld>
             <a:endParaRPr lang="it-IT"/>
           </a:p>
@@ -7653,7 +7783,7 @@
           <a:p>
             <a:fld id="{083A22BE-8A6D-467B-9C66-ECAF8AF9BC57}" type="datetime1">
               <a:rPr lang="en-US" smtClean="0"/>
-              <a:t>5/14/2021</a:t>
+              <a:t>5/19/2021</a:t>
             </a:fld>
             <a:endParaRPr lang="en-US" dirty="0"/>
           </a:p>
@@ -7929,7 +8059,7 @@
           <a:p>
             <a:fld id="{41297F15-CACB-42ED-A655-4A51162D3C0A}" type="datetime1">
               <a:rPr lang="en-US" smtClean="0"/>
-              <a:t>5/14/2021</a:t>
+              <a:t>5/19/2021</a:t>
             </a:fld>
             <a:endParaRPr lang="en-US" dirty="0"/>
           </a:p>
@@ -8198,7 +8328,7 @@
           <a:p>
             <a:fld id="{684797E9-3BED-4909-BF1B-A96BCE5DCF86}" type="datetime1">
               <a:rPr lang="en-US" smtClean="0"/>
-              <a:t>5/14/2021</a:t>
+              <a:t>5/19/2021</a:t>
             </a:fld>
             <a:endParaRPr lang="en-US" dirty="0"/>
           </a:p>
@@ -8613,7 +8743,7 @@
           <a:p>
             <a:fld id="{BAAFE497-169B-4AC0-BA05-28709655A9F9}" type="datetime1">
               <a:rPr lang="en-US" smtClean="0"/>
-              <a:t>5/14/2021</a:t>
+              <a:t>5/19/2021</a:t>
             </a:fld>
             <a:endParaRPr lang="en-US" dirty="0"/>
           </a:p>
@@ -8755,7 +8885,7 @@
           <a:p>
             <a:fld id="{1F811A5A-5EA2-4F71-9D52-4432471E1E0C}" type="datetime1">
               <a:rPr lang="en-US" smtClean="0"/>
-              <a:t>5/14/2021</a:t>
+              <a:t>5/19/2021</a:t>
             </a:fld>
             <a:endParaRPr lang="en-US" dirty="0"/>
           </a:p>
@@ -8868,7 +8998,7 @@
           <a:p>
             <a:fld id="{FB8206C2-2FA9-4B87-8C43-5F917DB886D5}" type="datetime1">
               <a:rPr lang="en-US" smtClean="0"/>
-              <a:t>5/14/2021</a:t>
+              <a:t>5/19/2021</a:t>
             </a:fld>
             <a:endParaRPr lang="en-US" dirty="0"/>
           </a:p>
@@ -9181,7 +9311,7 @@
           <a:p>
             <a:fld id="{013C9E0C-DCB7-4A4B-A2E7-7D0DC579EE7B}" type="datetime1">
               <a:rPr lang="en-US" smtClean="0"/>
-              <a:t>5/14/2021</a:t>
+              <a:t>5/19/2021</a:t>
             </a:fld>
             <a:endParaRPr lang="en-US" dirty="0"/>
           </a:p>
@@ -9471,7 +9601,7 @@
           <a:p>
             <a:fld id="{CEB72E66-427D-467D-BA16-D3D140667F77}" type="datetime1">
               <a:rPr lang="en-US" smtClean="0"/>
-              <a:t>5/14/2021</a:t>
+              <a:t>5/19/2021</a:t>
             </a:fld>
             <a:endParaRPr lang="en-US" dirty="0"/>
           </a:p>
@@ -9715,7 +9845,7 @@
           <a:p>
             <a:fld id="{33DFD85C-8750-471F-AD9C-24AEAD6172E6}" type="datetime1">
               <a:rPr lang="en-US" smtClean="0"/>
-              <a:t>5/14/2021</a:t>
+              <a:t>5/19/2021</a:t>
             </a:fld>
             <a:endParaRPr lang="en-US" dirty="0"/>
           </a:p>
@@ -10465,7 +10595,7 @@
           <a:p>
             <a:fld id="{87C63B65-1C5B-474C-AD6B-DA1133078133}" type="datetime1">
               <a:rPr lang="it-IT" smtClean="0"/>
-              <a:t>14/05/2021</a:t>
+              <a:t>19/05/2021</a:t>
             </a:fld>
             <a:endParaRPr lang="it-IT"/>
           </a:p>
@@ -13227,21 +13357,21 @@
           <a:lstStyle/>
           <a:p>
             <a:r>
-              <a:rPr lang="it-IT" dirty="0"/>
+              <a:rPr lang="it-IT" sz="2400" dirty="0"/>
               <a:t>Sappiamo dove vogliamo che i dati finiscano</a:t>
             </a:r>
             <a:r>
-              <a:rPr lang="en-US" dirty="0"/>
+              <a:rPr lang="en-US" sz="2400" dirty="0"/>
               <a:t>:</a:t>
             </a:r>
             <a:r>
-              <a:rPr lang="it-IT" dirty="0"/>
+              <a:rPr lang="it-IT" sz="2400" dirty="0"/>
               <a:t> in uno spazio euclideo a bassa dimensionalità. Quindi non avremo nozioni diverse di distanza per ogni punto.</a:t>
             </a:r>
           </a:p>
           <a:p>
             <a:r>
-              <a:rPr lang="it-IT" dirty="0"/>
+              <a:rPr lang="it-IT" sz="2400" dirty="0"/>
               <a:t>Continueremo ad usare il numero di vicini in modo da avere una proprietà comune ad entrambe le rappresentazioni.</a:t>
             </a:r>
           </a:p>
@@ -14618,8 +14748,8 @@
         </p:nvSpPr>
         <p:spPr>
           <a:xfrm>
-            <a:off x="637486" y="1"/>
-            <a:ext cx="10917025" cy="866554"/>
+            <a:off x="530802" y="60333"/>
+            <a:ext cx="11130392" cy="866554"/>
           </a:xfrm>
         </p:spPr>
         <p:txBody>
@@ -14674,7 +14804,7 @@
                   <a:srgbClr val="3F568A"/>
                 </a:solidFill>
               </a:rPr>
-              <a:t>entropia</a:t>
+              <a:t>Entropia</a:t>
             </a:r>
             <a:r>
               <a:rPr lang="en-US" sz="3200" dirty="0">
@@ -14690,7 +14820,7 @@
                   <a:srgbClr val="3F568A"/>
                 </a:solidFill>
               </a:rPr>
-              <a:t>incrociata</a:t>
+              <a:t>Incrociata</a:t>
             </a:r>
             <a:endParaRPr lang="it-IT" sz="3200" dirty="0">
               <a:solidFill>
@@ -16988,8 +17118,8 @@
           </a:p>
         </p:txBody>
       </p:sp>
-      <mc:AlternateContent xmlns:mc="http://schemas.openxmlformats.org/markup-compatibility/2006">
-        <mc:Choice xmlns:a14="http://schemas.microsoft.com/office/drawing/2010/main" Requires="a14">
+      <mc:AlternateContent xmlns:mc="http://schemas.openxmlformats.org/markup-compatibility/2006" xmlns:a14="http://schemas.microsoft.com/office/drawing/2010/main">
+        <mc:Choice Requires="a14">
           <p:sp>
             <p:nvSpPr>
               <p:cNvPr id="15" name="Content Placeholder 2">
@@ -18754,7 +18884,7 @@
             </p:txBody>
           </p:sp>
         </mc:Choice>
-        <mc:Fallback>
+        <mc:Fallback xmlns="">
           <p:sp>
             <p:nvSpPr>
               <p:cNvPr id="15" name="Content Placeholder 2">
@@ -19748,9 +19878,82 @@
           <a:p>
             <a:pPr algn="ctr"/>
             <a:r>
-              <a:rPr lang="en-US" sz="3600"/>
-              <a:t>Confronto fra Kullback-Leibler ed entropia incrociata</a:t>
-            </a:r>
+              <a:rPr lang="en-US" sz="3600" dirty="0" err="1">
+                <a:solidFill>
+                  <a:srgbClr val="3F568A"/>
+                </a:solidFill>
+              </a:rPr>
+              <a:t>Confronto</a:t>
+            </a:r>
+            <a:r>
+              <a:rPr lang="en-US" sz="3600" dirty="0">
+                <a:solidFill>
+                  <a:srgbClr val="3F568A"/>
+                </a:solidFill>
+              </a:rPr>
+              <a:t> </a:t>
+            </a:r>
+            <a:r>
+              <a:rPr lang="en-US" sz="3600" dirty="0" err="1">
+                <a:solidFill>
+                  <a:srgbClr val="3F568A"/>
+                </a:solidFill>
+              </a:rPr>
+              <a:t>fra</a:t>
+            </a:r>
+            <a:r>
+              <a:rPr lang="en-US" sz="3600" dirty="0">
+                <a:solidFill>
+                  <a:srgbClr val="3F568A"/>
+                </a:solidFill>
+              </a:rPr>
+              <a:t> </a:t>
+            </a:r>
+            <a:r>
+              <a:rPr lang="en-US" sz="3600" dirty="0" err="1">
+                <a:solidFill>
+                  <a:srgbClr val="3F568A"/>
+                </a:solidFill>
+              </a:rPr>
+              <a:t>Kullback-Leibler</a:t>
+            </a:r>
+            <a:r>
+              <a:rPr lang="en-US" sz="3600" dirty="0">
+                <a:solidFill>
+                  <a:srgbClr val="3F568A"/>
+                </a:solidFill>
+              </a:rPr>
+              <a:t> ed </a:t>
+            </a:r>
+            <a:r>
+              <a:rPr lang="en-US" sz="3600" dirty="0" err="1">
+                <a:solidFill>
+                  <a:srgbClr val="3F568A"/>
+                </a:solidFill>
+              </a:rPr>
+              <a:t>entropia</a:t>
+            </a:r>
+            <a:r>
+              <a:rPr lang="en-US" sz="3600" dirty="0">
+                <a:solidFill>
+                  <a:srgbClr val="3F568A"/>
+                </a:solidFill>
+              </a:rPr>
+              <a:t> </a:t>
+            </a:r>
+            <a:r>
+              <a:rPr lang="en-US" sz="3600" dirty="0" err="1">
+                <a:solidFill>
+                  <a:srgbClr val="3F568A"/>
+                </a:solidFill>
+              </a:rPr>
+              <a:t>incrociata</a:t>
+            </a:r>
+            <a:endParaRPr lang="en-US" sz="3600" dirty="0">
+              <a:solidFill>
+                <a:srgbClr val="3F568A"/>
+              </a:solidFill>
+            </a:endParaRPr>
           </a:p>
         </p:txBody>
       </p:sp>
@@ -20743,7 +20946,7 @@
           <p:nvPr/>
         </p:nvPicPr>
         <p:blipFill>
-          <a:blip r:embed="rId2"/>
+          <a:blip r:embed="rId3"/>
           <a:stretch>
             <a:fillRect/>
           </a:stretch>

</xml_diff>